<commit_message>
Updated tests and fixed overflow bug.
</commit_message>
<xml_diff>
--- a/plots/frequency_response_paper_figures.pptx
+++ b/plots/frequency_response_paper_figures.pptx
@@ -5,13 +5,14 @@
     <p:sldMasterId id="2147483648" r:id="rId1"/>
   </p:sldMasterIdLst>
   <p:notesMasterIdLst>
-    <p:notesMasterId r:id="rId3"/>
+    <p:notesMasterId r:id="rId4"/>
   </p:notesMasterIdLst>
   <p:handoutMasterIdLst>
-    <p:handoutMasterId r:id="rId4"/>
+    <p:handoutMasterId r:id="rId5"/>
   </p:handoutMasterIdLst>
   <p:sldIdLst>
     <p:sldId id="260" r:id="rId2"/>
+    <p:sldId id="261" r:id="rId3"/>
   </p:sldIdLst>
   <p:sldSz cx="9144000" cy="6858000" type="screen4x3"/>
   <p:notesSz cx="6858000" cy="9144000"/>
@@ -800,6 +801,272 @@
     </a:lvl9pPr>
   </p:notesStyle>
 </p:notesMaster>
+</file>
+
+<file path=ppt/notesSlides/notesSlide1.xml><?xml version="1.0" encoding="utf-8"?>
+<p:notes xmlns:a="http://schemas.openxmlformats.org/drawingml/2006/main" xmlns:r="http://schemas.openxmlformats.org/officeDocument/2006/relationships" xmlns:p="http://schemas.openxmlformats.org/presentationml/2006/main">
+  <p:cSld>
+    <p:spTree>
+      <p:nvGrpSpPr>
+        <p:cNvPr id="1" name=""/>
+        <p:cNvGrpSpPr/>
+        <p:nvPr/>
+      </p:nvGrpSpPr>
+      <p:grpSpPr>
+        <a:xfrm>
+          <a:off x="0" y="0"/>
+          <a:ext cx="0" cy="0"/>
+          <a:chOff x="0" y="0"/>
+          <a:chExt cx="0" cy="0"/>
+        </a:xfrm>
+      </p:grpSpPr>
+      <p:sp>
+        <p:nvSpPr>
+          <p:cNvPr id="2" name="Slide Image Placeholder 1"/>
+          <p:cNvSpPr>
+            <a:spLocks noGrp="1" noRot="1" noChangeAspect="1"/>
+          </p:cNvSpPr>
+          <p:nvPr>
+            <p:ph type="sldImg"/>
+          </p:nvPr>
+        </p:nvSpPr>
+        <p:spPr/>
+      </p:sp>
+      <p:sp>
+        <p:nvSpPr>
+          <p:cNvPr id="3" name="Notes Placeholder 2"/>
+          <p:cNvSpPr>
+            <a:spLocks noGrp="1"/>
+          </p:cNvSpPr>
+          <p:nvPr>
+            <p:ph type="body" idx="1"/>
+          </p:nvPr>
+        </p:nvSpPr>
+        <p:spPr/>
+        <p:txBody>
+          <a:bodyPr/>
+          <a:lstStyle/>
+          <a:p>
+            <a:r>
+              <a:rPr lang="en-US" dirty="0"/>
+              <a:t>1. $</a:t>
+            </a:r>
+            <a:r>
+              <a:rPr lang="en-US" dirty="0" err="1"/>
+              <a:t>lim</a:t>
+            </a:r>
+            <a:r>
+              <a:rPr lang="en-US" dirty="0"/>
+              <a:t>_{r_1 \</a:t>
+            </a:r>
+            <a:r>
+              <a:rPr lang="en-US" dirty="0" err="1"/>
+              <a:t>rightarrow</a:t>
+            </a:r>
+            <a:r>
+              <a:rPr lang="en-US" dirty="0"/>
+              <a:t> \</a:t>
+            </a:r>
+            <a:r>
+              <a:rPr lang="en-US" dirty="0" err="1"/>
+              <a:t>infty</a:t>
+            </a:r>
+            <a:r>
+              <a:rPr lang="en-US" dirty="0"/>
+              <a:t>}~ \</a:t>
+            </a:r>
+            <a:r>
+              <a:rPr lang="en-US" dirty="0" err="1"/>
+              <a:t>mathcal</a:t>
+            </a:r>
+            <a:r>
+              <a:rPr lang="en-US" dirty="0"/>
+              <a:t>{C}^{S_N}_{</a:t>
+            </a:r>
+            <a:r>
+              <a:rPr lang="en-US" dirty="0" err="1"/>
+              <a:t>r_m</a:t>
+            </a:r>
+            <a:r>
+              <a:rPr lang="en-US" dirty="0"/>
+              <a:t>} = 1$ for $m &lt; N$.</a:t>
+            </a:r>
+          </a:p>
+        </p:txBody>
+      </p:sp>
+      <p:sp>
+        <p:nvSpPr>
+          <p:cNvPr id="4" name="Slide Number Placeholder 3"/>
+          <p:cNvSpPr>
+            <a:spLocks noGrp="1"/>
+          </p:cNvSpPr>
+          <p:nvPr>
+            <p:ph type="sldNum" sz="quarter" idx="5"/>
+          </p:nvPr>
+        </p:nvSpPr>
+        <p:spPr/>
+        <p:txBody>
+          <a:bodyPr/>
+          <a:lstStyle/>
+          <a:p>
+            <a:pPr>
+              <a:defRPr/>
+            </a:pPr>
+            <a:fld id="{1E3608CA-DBCA-4E8F-8DAB-6E1AFAF19782}" type="slidenum">
+              <a:rPr lang="en-US" altLang="x-none" smtClean="0"/>
+              <a:pPr>
+                <a:defRPr/>
+              </a:pPr>
+              <a:t>1</a:t>
+            </a:fld>
+            <a:endParaRPr lang="en-US" altLang="x-none"/>
+          </a:p>
+        </p:txBody>
+      </p:sp>
+    </p:spTree>
+    <p:extLst>
+      <p:ext uri="{BB962C8B-B14F-4D97-AF65-F5344CB8AC3E}">
+        <p14:creationId xmlns:p14="http://schemas.microsoft.com/office/powerpoint/2010/main" val="111646838"/>
+      </p:ext>
+    </p:extLst>
+  </p:cSld>
+  <p:clrMapOvr>
+    <a:masterClrMapping/>
+  </p:clrMapOvr>
+</p:notes>
+</file>
+
+<file path=ppt/notesSlides/notesSlide2.xml><?xml version="1.0" encoding="utf-8"?>
+<p:notes xmlns:a="http://schemas.openxmlformats.org/drawingml/2006/main" xmlns:r="http://schemas.openxmlformats.org/officeDocument/2006/relationships" xmlns:p="http://schemas.openxmlformats.org/presentationml/2006/main">
+  <p:cSld>
+    <p:spTree>
+      <p:nvGrpSpPr>
+        <p:cNvPr id="1" name=""/>
+        <p:cNvGrpSpPr/>
+        <p:nvPr/>
+      </p:nvGrpSpPr>
+      <p:grpSpPr>
+        <a:xfrm>
+          <a:off x="0" y="0"/>
+          <a:ext cx="0" cy="0"/>
+          <a:chOff x="0" y="0"/>
+          <a:chExt cx="0" cy="0"/>
+        </a:xfrm>
+      </p:grpSpPr>
+      <p:sp>
+        <p:nvSpPr>
+          <p:cNvPr id="2" name="Slide Image Placeholder 1"/>
+          <p:cNvSpPr>
+            <a:spLocks noGrp="1" noRot="1" noChangeAspect="1"/>
+          </p:cNvSpPr>
+          <p:nvPr>
+            <p:ph type="sldImg"/>
+          </p:nvPr>
+        </p:nvSpPr>
+        <p:spPr/>
+      </p:sp>
+      <p:sp>
+        <p:nvSpPr>
+          <p:cNvPr id="3" name="Notes Placeholder 2"/>
+          <p:cNvSpPr>
+            <a:spLocks noGrp="1"/>
+          </p:cNvSpPr>
+          <p:nvPr>
+            <p:ph type="body" idx="1"/>
+          </p:nvPr>
+        </p:nvSpPr>
+        <p:spPr/>
+        <p:txBody>
+          <a:bodyPr/>
+          <a:lstStyle/>
+          <a:p>
+            <a:r>
+              <a:rPr lang="en-US" dirty="0"/>
+              <a:t>1. $</a:t>
+            </a:r>
+            <a:r>
+              <a:rPr lang="en-US" dirty="0" err="1"/>
+              <a:t>lim</a:t>
+            </a:r>
+            <a:r>
+              <a:rPr lang="en-US" dirty="0"/>
+              <a:t>_{r_1 \</a:t>
+            </a:r>
+            <a:r>
+              <a:rPr lang="en-US" dirty="0" err="1"/>
+              <a:t>rightarrow</a:t>
+            </a:r>
+            <a:r>
+              <a:rPr lang="en-US" dirty="0"/>
+              <a:t> \</a:t>
+            </a:r>
+            <a:r>
+              <a:rPr lang="en-US" dirty="0" err="1"/>
+              <a:t>infty</a:t>
+            </a:r>
+            <a:r>
+              <a:rPr lang="en-US" dirty="0"/>
+              <a:t>}~ \</a:t>
+            </a:r>
+            <a:r>
+              <a:rPr lang="en-US" dirty="0" err="1"/>
+              <a:t>mathcal</a:t>
+            </a:r>
+            <a:r>
+              <a:rPr lang="en-US" dirty="0"/>
+              <a:t>{C}^{S_N}_{</a:t>
+            </a:r>
+            <a:r>
+              <a:rPr lang="en-US" dirty="0" err="1"/>
+              <a:t>r_m</a:t>
+            </a:r>
+            <a:r>
+              <a:rPr lang="en-US" dirty="0"/>
+              <a:t>} = 1$ for $m &lt; N$.</a:t>
+            </a:r>
+          </a:p>
+        </p:txBody>
+      </p:sp>
+      <p:sp>
+        <p:nvSpPr>
+          <p:cNvPr id="4" name="Slide Number Placeholder 3"/>
+          <p:cNvSpPr>
+            <a:spLocks noGrp="1"/>
+          </p:cNvSpPr>
+          <p:nvPr>
+            <p:ph type="sldNum" sz="quarter" idx="5"/>
+          </p:nvPr>
+        </p:nvSpPr>
+        <p:spPr/>
+        <p:txBody>
+          <a:bodyPr/>
+          <a:lstStyle/>
+          <a:p>
+            <a:pPr>
+              <a:defRPr/>
+            </a:pPr>
+            <a:fld id="{1E3608CA-DBCA-4E8F-8DAB-6E1AFAF19782}" type="slidenum">
+              <a:rPr lang="en-US" altLang="x-none" smtClean="0"/>
+              <a:pPr>
+                <a:defRPr/>
+              </a:pPr>
+              <a:t>2</a:t>
+            </a:fld>
+            <a:endParaRPr lang="en-US" altLang="x-none"/>
+          </a:p>
+        </p:txBody>
+      </p:sp>
+    </p:spTree>
+    <p:extLst>
+      <p:ext uri="{BB962C8B-B14F-4D97-AF65-F5344CB8AC3E}">
+        <p14:creationId xmlns:p14="http://schemas.microsoft.com/office/powerpoint/2010/main" val="1026110309"/>
+      </p:ext>
+    </p:extLst>
+  </p:cSld>
+  <p:clrMapOvr>
+    <a:masterClrMapping/>
+  </p:clrMapOvr>
+</p:notes>
 </file>
 
 <file path=ppt/slideLayouts/slideLayout1.xml><?xml version="1.0" encoding="utf-8"?>
@@ -5244,6 +5511,1226 @@
     <p:extLst>
       <p:ext uri="{BB962C8B-B14F-4D97-AF65-F5344CB8AC3E}">
         <p14:creationId xmlns:p14="http://schemas.microsoft.com/office/powerpoint/2010/main" val="1649153078"/>
+      </p:ext>
+    </p:extLst>
+  </p:cSld>
+  <p:clrMapOvr>
+    <a:masterClrMapping/>
+  </p:clrMapOvr>
+</p:sld>
+</file>
+
+<file path=ppt/slides/slide2.xml><?xml version="1.0" encoding="utf-8"?>
+<p:sld xmlns:a="http://schemas.openxmlformats.org/drawingml/2006/main" xmlns:r="http://schemas.openxmlformats.org/officeDocument/2006/relationships" xmlns:p="http://schemas.openxmlformats.org/presentationml/2006/main">
+  <p:cSld>
+    <p:spTree>
+      <p:nvGrpSpPr>
+        <p:cNvPr id="1" name=""/>
+        <p:cNvGrpSpPr/>
+        <p:nvPr/>
+      </p:nvGrpSpPr>
+      <p:grpSpPr>
+        <a:xfrm>
+          <a:off x="0" y="0"/>
+          <a:ext cx="0" cy="0"/>
+          <a:chOff x="0" y="0"/>
+          <a:chExt cx="0" cy="0"/>
+        </a:xfrm>
+      </p:grpSpPr>
+      <p:sp>
+        <p:nvSpPr>
+          <p:cNvPr id="2" name="Oval 1">
+            <a:extLst>
+              <a:ext uri="{FF2B5EF4-FFF2-40B4-BE49-F238E27FC236}">
+                <a16:creationId xmlns:a16="http://schemas.microsoft.com/office/drawing/2014/main" id="{8714B4FE-B7AB-F9F2-A8BC-4C06FE5B92C9}"/>
+              </a:ext>
+            </a:extLst>
+          </p:cNvPr>
+          <p:cNvSpPr/>
+          <p:nvPr/>
+        </p:nvSpPr>
+        <p:spPr>
+          <a:xfrm>
+            <a:off x="1192192" y="2754775"/>
+            <a:ext cx="914400" cy="914400"/>
+          </a:xfrm>
+          <a:prstGeom prst="ellipse">
+            <a:avLst/>
+          </a:prstGeom>
+          <a:solidFill>
+            <a:schemeClr val="bg1">
+              <a:lumMod val="85000"/>
+            </a:schemeClr>
+          </a:solidFill>
+          <a:ln>
+            <a:noFill/>
+          </a:ln>
+        </p:spPr>
+        <p:style>
+          <a:lnRef idx="1">
+            <a:schemeClr val="accent1"/>
+          </a:lnRef>
+          <a:fillRef idx="3">
+            <a:schemeClr val="accent1"/>
+          </a:fillRef>
+          <a:effectRef idx="2">
+            <a:schemeClr val="accent1"/>
+          </a:effectRef>
+          <a:fontRef idx="minor">
+            <a:schemeClr val="lt1"/>
+          </a:fontRef>
+        </p:style>
+        <p:txBody>
+          <a:bodyPr rtlCol="0" anchor="ctr"/>
+          <a:lstStyle/>
+          <a:p>
+            <a:pPr algn="ctr"/>
+            <a:r>
+              <a:rPr lang="en-US" sz="2400" dirty="0">
+                <a:solidFill>
+                  <a:schemeClr val="tx1"/>
+                </a:solidFill>
+              </a:rPr>
+              <a:t>S</a:t>
+            </a:r>
+            <a:r>
+              <a:rPr lang="en-US" sz="2400" baseline="-25000" dirty="0">
+                <a:solidFill>
+                  <a:schemeClr val="tx1"/>
+                </a:solidFill>
+              </a:rPr>
+              <a:t>1</a:t>
+            </a:r>
+          </a:p>
+        </p:txBody>
+      </p:sp>
+      <p:sp>
+        <p:nvSpPr>
+          <p:cNvPr id="3" name="Oval 2">
+            <a:extLst>
+              <a:ext uri="{FF2B5EF4-FFF2-40B4-BE49-F238E27FC236}">
+                <a16:creationId xmlns:a16="http://schemas.microsoft.com/office/drawing/2014/main" id="{568412B1-3522-F8D2-9712-5DE2B3F21A63}"/>
+              </a:ext>
+            </a:extLst>
+          </p:cNvPr>
+          <p:cNvSpPr/>
+          <p:nvPr/>
+        </p:nvSpPr>
+        <p:spPr>
+          <a:xfrm>
+            <a:off x="3189790" y="2754775"/>
+            <a:ext cx="914400" cy="914400"/>
+          </a:xfrm>
+          <a:prstGeom prst="ellipse">
+            <a:avLst/>
+          </a:prstGeom>
+          <a:solidFill>
+            <a:schemeClr val="bg1">
+              <a:lumMod val="85000"/>
+            </a:schemeClr>
+          </a:solidFill>
+          <a:ln>
+            <a:noFill/>
+          </a:ln>
+        </p:spPr>
+        <p:style>
+          <a:lnRef idx="1">
+            <a:schemeClr val="accent1"/>
+          </a:lnRef>
+          <a:fillRef idx="3">
+            <a:schemeClr val="accent1"/>
+          </a:fillRef>
+          <a:effectRef idx="2">
+            <a:schemeClr val="accent1"/>
+          </a:effectRef>
+          <a:fontRef idx="minor">
+            <a:schemeClr val="lt1"/>
+          </a:fontRef>
+        </p:style>
+        <p:txBody>
+          <a:bodyPr rtlCol="0" anchor="ctr"/>
+          <a:lstStyle/>
+          <a:p>
+            <a:pPr algn="ctr"/>
+            <a:r>
+              <a:rPr lang="en-US" sz="2400" dirty="0">
+                <a:solidFill>
+                  <a:schemeClr val="tx1"/>
+                </a:solidFill>
+              </a:rPr>
+              <a:t>S</a:t>
+            </a:r>
+            <a:r>
+              <a:rPr lang="en-US" sz="2400" baseline="-25000" dirty="0">
+                <a:solidFill>
+                  <a:schemeClr val="tx1"/>
+                </a:solidFill>
+              </a:rPr>
+              <a:t>2</a:t>
+            </a:r>
+          </a:p>
+        </p:txBody>
+      </p:sp>
+      <p:sp>
+        <p:nvSpPr>
+          <p:cNvPr id="4" name="Oval 3">
+            <a:extLst>
+              <a:ext uri="{FF2B5EF4-FFF2-40B4-BE49-F238E27FC236}">
+                <a16:creationId xmlns:a16="http://schemas.microsoft.com/office/drawing/2014/main" id="{37EB4A1B-4728-A356-D4D9-9CD8EBC08452}"/>
+              </a:ext>
+            </a:extLst>
+          </p:cNvPr>
+          <p:cNvSpPr/>
+          <p:nvPr/>
+        </p:nvSpPr>
+        <p:spPr>
+          <a:xfrm>
+            <a:off x="5210534" y="2754775"/>
+            <a:ext cx="914400" cy="914400"/>
+          </a:xfrm>
+          <a:prstGeom prst="ellipse">
+            <a:avLst/>
+          </a:prstGeom>
+          <a:solidFill>
+            <a:schemeClr val="bg1">
+              <a:lumMod val="85000"/>
+            </a:schemeClr>
+          </a:solidFill>
+          <a:ln>
+            <a:noFill/>
+          </a:ln>
+        </p:spPr>
+        <p:style>
+          <a:lnRef idx="1">
+            <a:schemeClr val="accent1"/>
+          </a:lnRef>
+          <a:fillRef idx="3">
+            <a:schemeClr val="accent1"/>
+          </a:fillRef>
+          <a:effectRef idx="2">
+            <a:schemeClr val="accent1"/>
+          </a:effectRef>
+          <a:fontRef idx="minor">
+            <a:schemeClr val="lt1"/>
+          </a:fontRef>
+        </p:style>
+        <p:txBody>
+          <a:bodyPr rtlCol="0" anchor="ctr"/>
+          <a:lstStyle/>
+          <a:p>
+            <a:pPr algn="ctr"/>
+            <a:r>
+              <a:rPr lang="en-US" sz="2400" dirty="0">
+                <a:solidFill>
+                  <a:schemeClr val="tx1"/>
+                </a:solidFill>
+              </a:rPr>
+              <a:t>S</a:t>
+            </a:r>
+            <a:r>
+              <a:rPr lang="en-US" sz="2400" baseline="-25000" dirty="0">
+                <a:solidFill>
+                  <a:schemeClr val="tx1"/>
+                </a:solidFill>
+              </a:rPr>
+              <a:t>N-1</a:t>
+            </a:r>
+          </a:p>
+        </p:txBody>
+      </p:sp>
+      <p:sp>
+        <p:nvSpPr>
+          <p:cNvPr id="13" name="U-Turn Arrow 12">
+            <a:extLst>
+              <a:ext uri="{FF2B5EF4-FFF2-40B4-BE49-F238E27FC236}">
+                <a16:creationId xmlns:a16="http://schemas.microsoft.com/office/drawing/2014/main" id="{D02A8D38-8177-1A34-E334-03876B46F18B}"/>
+              </a:ext>
+            </a:extLst>
+          </p:cNvPr>
+          <p:cNvSpPr/>
+          <p:nvPr/>
+        </p:nvSpPr>
+        <p:spPr>
+          <a:xfrm>
+            <a:off x="1649392" y="2453834"/>
+            <a:ext cx="1997598" cy="300942"/>
+          </a:xfrm>
+          <a:prstGeom prst="uturnArrow">
+            <a:avLst/>
+          </a:prstGeom>
+          <a:solidFill>
+            <a:schemeClr val="accent6"/>
+          </a:solidFill>
+          <a:ln>
+            <a:noFill/>
+          </a:ln>
+        </p:spPr>
+        <p:style>
+          <a:lnRef idx="1">
+            <a:schemeClr val="accent1"/>
+          </a:lnRef>
+          <a:fillRef idx="3">
+            <a:schemeClr val="accent1"/>
+          </a:fillRef>
+          <a:effectRef idx="2">
+            <a:schemeClr val="accent1"/>
+          </a:effectRef>
+          <a:fontRef idx="minor">
+            <a:schemeClr val="lt1"/>
+          </a:fontRef>
+        </p:style>
+        <p:txBody>
+          <a:bodyPr rtlCol="0" anchor="ctr"/>
+          <a:lstStyle/>
+          <a:p>
+            <a:pPr algn="ctr"/>
+            <a:endParaRPr lang="en-US">
+              <a:solidFill>
+                <a:schemeClr val="tx1"/>
+              </a:solidFill>
+            </a:endParaRPr>
+          </a:p>
+        </p:txBody>
+      </p:sp>
+      <p:sp>
+        <p:nvSpPr>
+          <p:cNvPr id="16" name="U-Turn Arrow 15">
+            <a:extLst>
+              <a:ext uri="{FF2B5EF4-FFF2-40B4-BE49-F238E27FC236}">
+                <a16:creationId xmlns:a16="http://schemas.microsoft.com/office/drawing/2014/main" id="{F8590D0E-2DC6-0EAB-A2C0-0997A038E83B}"/>
+              </a:ext>
+            </a:extLst>
+          </p:cNvPr>
+          <p:cNvSpPr/>
+          <p:nvPr/>
+        </p:nvSpPr>
+        <p:spPr>
+          <a:xfrm rot="10800000">
+            <a:off x="1632029" y="3669172"/>
+            <a:ext cx="1997598" cy="763931"/>
+          </a:xfrm>
+          <a:prstGeom prst="uturnArrow">
+            <a:avLst/>
+          </a:prstGeom>
+          <a:solidFill>
+            <a:srgbClr val="00B050"/>
+          </a:solidFill>
+        </p:spPr>
+        <p:style>
+          <a:lnRef idx="1">
+            <a:schemeClr val="accent1"/>
+          </a:lnRef>
+          <a:fillRef idx="3">
+            <a:schemeClr val="accent1"/>
+          </a:fillRef>
+          <a:effectRef idx="2">
+            <a:schemeClr val="accent1"/>
+          </a:effectRef>
+          <a:fontRef idx="minor">
+            <a:schemeClr val="lt1"/>
+          </a:fontRef>
+        </p:style>
+        <p:txBody>
+          <a:bodyPr rtlCol="0" anchor="ctr"/>
+          <a:lstStyle/>
+          <a:p>
+            <a:pPr algn="ctr"/>
+            <a:endParaRPr lang="en-US">
+              <a:solidFill>
+                <a:schemeClr val="tx1"/>
+              </a:solidFill>
+            </a:endParaRPr>
+          </a:p>
+        </p:txBody>
+      </p:sp>
+      <p:sp>
+        <p:nvSpPr>
+          <p:cNvPr id="19" name="TextBox 18">
+            <a:extLst>
+              <a:ext uri="{FF2B5EF4-FFF2-40B4-BE49-F238E27FC236}">
+                <a16:creationId xmlns:a16="http://schemas.microsoft.com/office/drawing/2014/main" id="{1FCBC3C1-7101-4782-84B2-6BAEB32233B0}"/>
+              </a:ext>
+            </a:extLst>
+          </p:cNvPr>
+          <p:cNvSpPr txBox="1"/>
+          <p:nvPr/>
+        </p:nvSpPr>
+        <p:spPr>
+          <a:xfrm>
+            <a:off x="2255575" y="2003479"/>
+            <a:ext cx="697627" cy="369332"/>
+          </a:xfrm>
+          <a:prstGeom prst="rect">
+            <a:avLst/>
+          </a:prstGeom>
+          <a:noFill/>
+        </p:spPr>
+        <p:txBody>
+          <a:bodyPr wrap="none" rtlCol="0">
+            <a:spAutoFit/>
+          </a:bodyPr>
+          <a:lstStyle/>
+          <a:p>
+            <a:r>
+              <a:rPr lang="en-US" b="1" dirty="0">
+                <a:solidFill>
+                  <a:schemeClr val="accent6"/>
+                </a:solidFill>
+              </a:rPr>
+              <a:t>slow</a:t>
+            </a:r>
+          </a:p>
+        </p:txBody>
+      </p:sp>
+      <p:sp>
+        <p:nvSpPr>
+          <p:cNvPr id="20" name="TextBox 19">
+            <a:extLst>
+              <a:ext uri="{FF2B5EF4-FFF2-40B4-BE49-F238E27FC236}">
+                <a16:creationId xmlns:a16="http://schemas.microsoft.com/office/drawing/2014/main" id="{C038D1B2-D8D8-1232-18B0-F9BCD20256CB}"/>
+              </a:ext>
+            </a:extLst>
+          </p:cNvPr>
+          <p:cNvSpPr txBox="1"/>
+          <p:nvPr/>
+        </p:nvSpPr>
+        <p:spPr>
+          <a:xfrm>
+            <a:off x="2302364" y="4526229"/>
+            <a:ext cx="595035" cy="369332"/>
+          </a:xfrm>
+          <a:prstGeom prst="rect">
+            <a:avLst/>
+          </a:prstGeom>
+          <a:noFill/>
+        </p:spPr>
+        <p:txBody>
+          <a:bodyPr wrap="none" rtlCol="0">
+            <a:spAutoFit/>
+          </a:bodyPr>
+          <a:lstStyle/>
+          <a:p>
+            <a:r>
+              <a:rPr lang="en-US" b="1" dirty="0">
+                <a:solidFill>
+                  <a:srgbClr val="00B050"/>
+                </a:solidFill>
+              </a:rPr>
+              <a:t>fast</a:t>
+            </a:r>
+          </a:p>
+        </p:txBody>
+      </p:sp>
+      <p:sp>
+        <p:nvSpPr>
+          <p:cNvPr id="22" name="TextBox 21">
+            <a:extLst>
+              <a:ext uri="{FF2B5EF4-FFF2-40B4-BE49-F238E27FC236}">
+                <a16:creationId xmlns:a16="http://schemas.microsoft.com/office/drawing/2014/main" id="{5A431F6B-7B21-91DA-F498-5F184ADC8D2A}"/>
+              </a:ext>
+            </a:extLst>
+          </p:cNvPr>
+          <p:cNvSpPr txBox="1"/>
+          <p:nvPr/>
+        </p:nvSpPr>
+        <p:spPr>
+          <a:xfrm>
+            <a:off x="3813599" y="925852"/>
+            <a:ext cx="385042" cy="369332"/>
+          </a:xfrm>
+          <a:prstGeom prst="rect">
+            <a:avLst/>
+          </a:prstGeom>
+          <a:noFill/>
+        </p:spPr>
+        <p:txBody>
+          <a:bodyPr wrap="none" rtlCol="0">
+            <a:spAutoFit/>
+          </a:bodyPr>
+          <a:lstStyle/>
+          <a:p>
+            <a:r>
+              <a:rPr lang="en-US" i="1" dirty="0"/>
+              <a:t>k</a:t>
+            </a:r>
+            <a:r>
+              <a:rPr lang="en-US" i="1" baseline="-25000" dirty="0"/>
+              <a:t>3</a:t>
+            </a:r>
+          </a:p>
+        </p:txBody>
+      </p:sp>
+      <p:sp>
+        <p:nvSpPr>
+          <p:cNvPr id="23" name="TextBox 22">
+            <a:extLst>
+              <a:ext uri="{FF2B5EF4-FFF2-40B4-BE49-F238E27FC236}">
+                <a16:creationId xmlns:a16="http://schemas.microsoft.com/office/drawing/2014/main" id="{74B766F0-D7B5-4941-618F-6879A59FCEB9}"/>
+              </a:ext>
+            </a:extLst>
+          </p:cNvPr>
+          <p:cNvSpPr txBox="1"/>
+          <p:nvPr/>
+        </p:nvSpPr>
+        <p:spPr>
+          <a:xfrm>
+            <a:off x="1780131" y="4433103"/>
+            <a:ext cx="397866" cy="369332"/>
+          </a:xfrm>
+          <a:prstGeom prst="rect">
+            <a:avLst/>
+          </a:prstGeom>
+          <a:noFill/>
+        </p:spPr>
+        <p:txBody>
+          <a:bodyPr wrap="none" rtlCol="0">
+            <a:spAutoFit/>
+          </a:bodyPr>
+          <a:lstStyle/>
+          <a:p>
+            <a:r>
+              <a:rPr lang="en-US" b="1" i="1" dirty="0">
+                <a:solidFill>
+                  <a:srgbClr val="00B050"/>
+                </a:solidFill>
+              </a:rPr>
+              <a:t>k</a:t>
+            </a:r>
+            <a:r>
+              <a:rPr lang="en-US" b="1" i="1" baseline="-25000" dirty="0">
+                <a:solidFill>
+                  <a:srgbClr val="00B050"/>
+                </a:solidFill>
+              </a:rPr>
+              <a:t>2</a:t>
+            </a:r>
+          </a:p>
+        </p:txBody>
+      </p:sp>
+      <p:sp>
+        <p:nvSpPr>
+          <p:cNvPr id="24" name="TextBox 23">
+            <a:extLst>
+              <a:ext uri="{FF2B5EF4-FFF2-40B4-BE49-F238E27FC236}">
+                <a16:creationId xmlns:a16="http://schemas.microsoft.com/office/drawing/2014/main" id="{E2D3B944-6E56-CAE4-6CF2-364AEE4C758A}"/>
+              </a:ext>
+            </a:extLst>
+          </p:cNvPr>
+          <p:cNvSpPr txBox="1"/>
+          <p:nvPr/>
+        </p:nvSpPr>
+        <p:spPr>
+          <a:xfrm>
+            <a:off x="1780131" y="2109581"/>
+            <a:ext cx="397866" cy="369332"/>
+          </a:xfrm>
+          <a:prstGeom prst="rect">
+            <a:avLst/>
+          </a:prstGeom>
+          <a:noFill/>
+        </p:spPr>
+        <p:txBody>
+          <a:bodyPr wrap="none" rtlCol="0">
+            <a:spAutoFit/>
+          </a:bodyPr>
+          <a:lstStyle/>
+          <a:p>
+            <a:r>
+              <a:rPr lang="en-US" b="1" i="1" dirty="0">
+                <a:solidFill>
+                  <a:srgbClr val="FFC000"/>
+                </a:solidFill>
+              </a:rPr>
+              <a:t>k</a:t>
+            </a:r>
+            <a:r>
+              <a:rPr lang="en-US" b="1" baseline="-25000" dirty="0">
+                <a:solidFill>
+                  <a:srgbClr val="FFC000"/>
+                </a:solidFill>
+              </a:rPr>
+              <a:t>1</a:t>
+            </a:r>
+            <a:endParaRPr lang="en-US" b="1" i="1" baseline="-25000" dirty="0">
+              <a:solidFill>
+                <a:srgbClr val="FFC000"/>
+              </a:solidFill>
+            </a:endParaRPr>
+          </a:p>
+        </p:txBody>
+      </p:sp>
+      <p:sp>
+        <p:nvSpPr>
+          <p:cNvPr id="35" name="TextBox 34">
+            <a:extLst>
+              <a:ext uri="{FF2B5EF4-FFF2-40B4-BE49-F238E27FC236}">
+                <a16:creationId xmlns:a16="http://schemas.microsoft.com/office/drawing/2014/main" id="{D3450114-AC17-3FDD-F414-3288610EC5FF}"/>
+              </a:ext>
+            </a:extLst>
+          </p:cNvPr>
+          <p:cNvSpPr txBox="1"/>
+          <p:nvPr/>
+        </p:nvSpPr>
+        <p:spPr>
+          <a:xfrm>
+            <a:off x="3864498" y="4433103"/>
+            <a:ext cx="397866" cy="369332"/>
+          </a:xfrm>
+          <a:prstGeom prst="rect">
+            <a:avLst/>
+          </a:prstGeom>
+          <a:noFill/>
+        </p:spPr>
+        <p:txBody>
+          <a:bodyPr wrap="none" rtlCol="0">
+            <a:spAutoFit/>
+          </a:bodyPr>
+          <a:lstStyle/>
+          <a:p>
+            <a:r>
+              <a:rPr lang="en-US" b="1" i="1" dirty="0">
+                <a:solidFill>
+                  <a:srgbClr val="00B050"/>
+                </a:solidFill>
+              </a:rPr>
+              <a:t>k</a:t>
+            </a:r>
+            <a:r>
+              <a:rPr lang="en-US" b="1" i="1" baseline="-25000" dirty="0">
+                <a:solidFill>
+                  <a:srgbClr val="00B050"/>
+                </a:solidFill>
+              </a:rPr>
+              <a:t>4</a:t>
+            </a:r>
+          </a:p>
+        </p:txBody>
+      </p:sp>
+      <p:sp>
+        <p:nvSpPr>
+          <p:cNvPr id="5" name="Oval 4">
+            <a:extLst>
+              <a:ext uri="{FF2B5EF4-FFF2-40B4-BE49-F238E27FC236}">
+                <a16:creationId xmlns:a16="http://schemas.microsoft.com/office/drawing/2014/main" id="{B5F84B92-940E-2206-9AF5-BFCCE3F8C878}"/>
+              </a:ext>
+            </a:extLst>
+          </p:cNvPr>
+          <p:cNvSpPr/>
+          <p:nvPr/>
+        </p:nvSpPr>
+        <p:spPr>
+          <a:xfrm>
+            <a:off x="7186906" y="2754775"/>
+            <a:ext cx="914400" cy="914400"/>
+          </a:xfrm>
+          <a:prstGeom prst="ellipse">
+            <a:avLst/>
+          </a:prstGeom>
+          <a:solidFill>
+            <a:schemeClr val="bg1">
+              <a:lumMod val="85000"/>
+            </a:schemeClr>
+          </a:solidFill>
+          <a:ln>
+            <a:noFill/>
+          </a:ln>
+        </p:spPr>
+        <p:style>
+          <a:lnRef idx="1">
+            <a:schemeClr val="accent1"/>
+          </a:lnRef>
+          <a:fillRef idx="3">
+            <a:schemeClr val="accent1"/>
+          </a:fillRef>
+          <a:effectRef idx="2">
+            <a:schemeClr val="accent1"/>
+          </a:effectRef>
+          <a:fontRef idx="minor">
+            <a:schemeClr val="lt1"/>
+          </a:fontRef>
+        </p:style>
+        <p:txBody>
+          <a:bodyPr rtlCol="0" anchor="ctr"/>
+          <a:lstStyle/>
+          <a:p>
+            <a:pPr algn="ctr"/>
+            <a:r>
+              <a:rPr lang="en-US" sz="2400" dirty="0">
+                <a:solidFill>
+                  <a:schemeClr val="tx1"/>
+                </a:solidFill>
+              </a:rPr>
+              <a:t>S</a:t>
+            </a:r>
+            <a:r>
+              <a:rPr lang="en-US" sz="2400" baseline="-25000" dirty="0">
+                <a:solidFill>
+                  <a:schemeClr val="tx1"/>
+                </a:solidFill>
+              </a:rPr>
+              <a:t>N</a:t>
+            </a:r>
+          </a:p>
+        </p:txBody>
+      </p:sp>
+      <p:grpSp>
+        <p:nvGrpSpPr>
+          <p:cNvPr id="11" name="Group 10">
+            <a:extLst>
+              <a:ext uri="{FF2B5EF4-FFF2-40B4-BE49-F238E27FC236}">
+                <a16:creationId xmlns:a16="http://schemas.microsoft.com/office/drawing/2014/main" id="{4AF511A9-6323-1EA0-4469-EEB5C7CE74A9}"/>
+              </a:ext>
+            </a:extLst>
+          </p:cNvPr>
+          <p:cNvGrpSpPr/>
+          <p:nvPr/>
+        </p:nvGrpSpPr>
+        <p:grpSpPr>
+          <a:xfrm>
+            <a:off x="4427120" y="3211975"/>
+            <a:ext cx="396240" cy="91440"/>
+            <a:chOff x="5521124" y="5626696"/>
+            <a:chExt cx="396240" cy="91440"/>
+          </a:xfrm>
+        </p:grpSpPr>
+        <p:sp>
+          <p:nvSpPr>
+            <p:cNvPr id="6" name="Oval 5">
+              <a:extLst>
+                <a:ext uri="{FF2B5EF4-FFF2-40B4-BE49-F238E27FC236}">
+                  <a16:creationId xmlns:a16="http://schemas.microsoft.com/office/drawing/2014/main" id="{B5C9A6BA-4298-F812-017B-E53E05E1480A}"/>
+                </a:ext>
+              </a:extLst>
+            </p:cNvPr>
+            <p:cNvSpPr>
+              <a:spLocks noChangeAspect="1"/>
+            </p:cNvSpPr>
+            <p:nvPr/>
+          </p:nvSpPr>
+          <p:spPr>
+            <a:xfrm>
+              <a:off x="5521124" y="5626696"/>
+              <a:ext cx="91440" cy="91440"/>
+            </a:xfrm>
+            <a:prstGeom prst="ellipse">
+              <a:avLst/>
+            </a:prstGeom>
+            <a:solidFill>
+              <a:schemeClr val="tx1"/>
+            </a:solidFill>
+            <a:ln>
+              <a:noFill/>
+            </a:ln>
+            <a:effectLst>
+              <a:outerShdw dist="23000" sx="1000" sy="1000" rotWithShape="0">
+                <a:srgbClr val="000000"/>
+              </a:outerShdw>
+            </a:effectLst>
+          </p:spPr>
+          <p:style>
+            <a:lnRef idx="1">
+              <a:schemeClr val="accent1"/>
+            </a:lnRef>
+            <a:fillRef idx="3">
+              <a:schemeClr val="accent1"/>
+            </a:fillRef>
+            <a:effectRef idx="2">
+              <a:schemeClr val="accent1"/>
+            </a:effectRef>
+            <a:fontRef idx="minor">
+              <a:schemeClr val="lt1"/>
+            </a:fontRef>
+          </p:style>
+          <p:txBody>
+            <a:bodyPr rtlCol="0" anchor="ctr"/>
+            <a:lstStyle/>
+            <a:p>
+              <a:pPr algn="ctr"/>
+              <a:endParaRPr lang="en-US"/>
+            </a:p>
+          </p:txBody>
+        </p:sp>
+        <p:sp>
+          <p:nvSpPr>
+            <p:cNvPr id="7" name="Oval 6">
+              <a:extLst>
+                <a:ext uri="{FF2B5EF4-FFF2-40B4-BE49-F238E27FC236}">
+                  <a16:creationId xmlns:a16="http://schemas.microsoft.com/office/drawing/2014/main" id="{0C310972-098B-57C1-0BD2-B0A96E5098AF}"/>
+                </a:ext>
+              </a:extLst>
+            </p:cNvPr>
+            <p:cNvSpPr>
+              <a:spLocks noChangeAspect="1"/>
+            </p:cNvSpPr>
+            <p:nvPr/>
+          </p:nvSpPr>
+          <p:spPr>
+            <a:xfrm>
+              <a:off x="5673524" y="5626696"/>
+              <a:ext cx="91440" cy="91440"/>
+            </a:xfrm>
+            <a:prstGeom prst="ellipse">
+              <a:avLst/>
+            </a:prstGeom>
+            <a:solidFill>
+              <a:schemeClr val="tx1"/>
+            </a:solidFill>
+            <a:ln>
+              <a:noFill/>
+            </a:ln>
+            <a:effectLst>
+              <a:outerShdw dist="23000" sx="1000" sy="1000" rotWithShape="0">
+                <a:srgbClr val="000000"/>
+              </a:outerShdw>
+            </a:effectLst>
+          </p:spPr>
+          <p:style>
+            <a:lnRef idx="1">
+              <a:schemeClr val="accent1"/>
+            </a:lnRef>
+            <a:fillRef idx="3">
+              <a:schemeClr val="accent1"/>
+            </a:fillRef>
+            <a:effectRef idx="2">
+              <a:schemeClr val="accent1"/>
+            </a:effectRef>
+            <a:fontRef idx="minor">
+              <a:schemeClr val="lt1"/>
+            </a:fontRef>
+          </p:style>
+          <p:txBody>
+            <a:bodyPr rtlCol="0" anchor="ctr"/>
+            <a:lstStyle/>
+            <a:p>
+              <a:pPr algn="ctr"/>
+              <a:endParaRPr lang="en-US"/>
+            </a:p>
+          </p:txBody>
+        </p:sp>
+        <p:sp>
+          <p:nvSpPr>
+            <p:cNvPr id="8" name="Oval 7">
+              <a:extLst>
+                <a:ext uri="{FF2B5EF4-FFF2-40B4-BE49-F238E27FC236}">
+                  <a16:creationId xmlns:a16="http://schemas.microsoft.com/office/drawing/2014/main" id="{7467B83E-7D5B-A73A-6E1F-3A79FC777422}"/>
+                </a:ext>
+              </a:extLst>
+            </p:cNvPr>
+            <p:cNvSpPr>
+              <a:spLocks noChangeAspect="1"/>
+            </p:cNvSpPr>
+            <p:nvPr/>
+          </p:nvSpPr>
+          <p:spPr>
+            <a:xfrm>
+              <a:off x="5825924" y="5626696"/>
+              <a:ext cx="91440" cy="91440"/>
+            </a:xfrm>
+            <a:prstGeom prst="ellipse">
+              <a:avLst/>
+            </a:prstGeom>
+            <a:solidFill>
+              <a:schemeClr val="tx1"/>
+            </a:solidFill>
+            <a:ln>
+              <a:noFill/>
+            </a:ln>
+            <a:effectLst>
+              <a:outerShdw dist="23000" sx="1000" sy="1000" rotWithShape="0">
+                <a:srgbClr val="000000"/>
+              </a:outerShdw>
+            </a:effectLst>
+          </p:spPr>
+          <p:style>
+            <a:lnRef idx="1">
+              <a:schemeClr val="accent1"/>
+            </a:lnRef>
+            <a:fillRef idx="3">
+              <a:schemeClr val="accent1"/>
+            </a:fillRef>
+            <a:effectRef idx="2">
+              <a:schemeClr val="accent1"/>
+            </a:effectRef>
+            <a:fontRef idx="minor">
+              <a:schemeClr val="lt1"/>
+            </a:fontRef>
+          </p:style>
+          <p:txBody>
+            <a:bodyPr rtlCol="0" anchor="ctr"/>
+            <a:lstStyle/>
+            <a:p>
+              <a:pPr algn="ctr"/>
+              <a:endParaRPr lang="en-US"/>
+            </a:p>
+          </p:txBody>
+        </p:sp>
+      </p:grpSp>
+      <p:sp>
+        <p:nvSpPr>
+          <p:cNvPr id="12" name="U-Turn Arrow 11">
+            <a:extLst>
+              <a:ext uri="{FF2B5EF4-FFF2-40B4-BE49-F238E27FC236}">
+                <a16:creationId xmlns:a16="http://schemas.microsoft.com/office/drawing/2014/main" id="{45294067-4FB5-36BD-79A1-9C644F3B4E82}"/>
+              </a:ext>
+            </a:extLst>
+          </p:cNvPr>
+          <p:cNvSpPr/>
+          <p:nvPr/>
+        </p:nvSpPr>
+        <p:spPr>
+          <a:xfrm>
+            <a:off x="3672161" y="2389908"/>
+            <a:ext cx="914400" cy="300942"/>
+          </a:xfrm>
+          <a:prstGeom prst="uturnArrow">
+            <a:avLst/>
+          </a:prstGeom>
+          <a:solidFill>
+            <a:schemeClr val="accent6"/>
+          </a:solidFill>
+          <a:ln>
+            <a:noFill/>
+          </a:ln>
+        </p:spPr>
+        <p:style>
+          <a:lnRef idx="1">
+            <a:schemeClr val="accent1"/>
+          </a:lnRef>
+          <a:fillRef idx="3">
+            <a:schemeClr val="accent1"/>
+          </a:fillRef>
+          <a:effectRef idx="2">
+            <a:schemeClr val="accent1"/>
+          </a:effectRef>
+          <a:fontRef idx="minor">
+            <a:schemeClr val="lt1"/>
+          </a:fontRef>
+        </p:style>
+        <p:txBody>
+          <a:bodyPr rtlCol="0" anchor="ctr"/>
+          <a:lstStyle/>
+          <a:p>
+            <a:pPr algn="ctr"/>
+            <a:endParaRPr lang="en-US">
+              <a:solidFill>
+                <a:schemeClr val="tx1"/>
+              </a:solidFill>
+            </a:endParaRPr>
+          </a:p>
+        </p:txBody>
+      </p:sp>
+      <p:sp>
+        <p:nvSpPr>
+          <p:cNvPr id="14" name="U-Turn Arrow 13">
+            <a:extLst>
+              <a:ext uri="{FF2B5EF4-FFF2-40B4-BE49-F238E27FC236}">
+                <a16:creationId xmlns:a16="http://schemas.microsoft.com/office/drawing/2014/main" id="{C0AD8EE0-C243-504A-422B-F3A7D4C051DD}"/>
+              </a:ext>
+            </a:extLst>
+          </p:cNvPr>
+          <p:cNvSpPr/>
+          <p:nvPr/>
+        </p:nvSpPr>
+        <p:spPr>
+          <a:xfrm>
+            <a:off x="4834935" y="2407778"/>
+            <a:ext cx="914400" cy="300942"/>
+          </a:xfrm>
+          <a:prstGeom prst="uturnArrow">
+            <a:avLst/>
+          </a:prstGeom>
+          <a:solidFill>
+            <a:schemeClr val="accent6"/>
+          </a:solidFill>
+          <a:ln>
+            <a:noFill/>
+          </a:ln>
+        </p:spPr>
+        <p:style>
+          <a:lnRef idx="1">
+            <a:schemeClr val="accent1"/>
+          </a:lnRef>
+          <a:fillRef idx="3">
+            <a:schemeClr val="accent1"/>
+          </a:fillRef>
+          <a:effectRef idx="2">
+            <a:schemeClr val="accent1"/>
+          </a:effectRef>
+          <a:fontRef idx="minor">
+            <a:schemeClr val="lt1"/>
+          </a:fontRef>
+        </p:style>
+        <p:txBody>
+          <a:bodyPr rtlCol="0" anchor="ctr"/>
+          <a:lstStyle/>
+          <a:p>
+            <a:pPr algn="ctr"/>
+            <a:endParaRPr lang="en-US">
+              <a:solidFill>
+                <a:schemeClr val="tx1"/>
+              </a:solidFill>
+            </a:endParaRPr>
+          </a:p>
+        </p:txBody>
+      </p:sp>
+      <p:sp>
+        <p:nvSpPr>
+          <p:cNvPr id="15" name="TextBox 14">
+            <a:extLst>
+              <a:ext uri="{FF2B5EF4-FFF2-40B4-BE49-F238E27FC236}">
+                <a16:creationId xmlns:a16="http://schemas.microsoft.com/office/drawing/2014/main" id="{9C41B707-C0C7-2FF5-B510-C4AA6BB1548D}"/>
+              </a:ext>
+            </a:extLst>
+          </p:cNvPr>
+          <p:cNvSpPr txBox="1"/>
+          <p:nvPr/>
+        </p:nvSpPr>
+        <p:spPr>
+          <a:xfrm>
+            <a:off x="3781636" y="2044498"/>
+            <a:ext cx="397866" cy="369332"/>
+          </a:xfrm>
+          <a:prstGeom prst="rect">
+            <a:avLst/>
+          </a:prstGeom>
+          <a:noFill/>
+        </p:spPr>
+        <p:txBody>
+          <a:bodyPr wrap="none" rtlCol="0">
+            <a:spAutoFit/>
+          </a:bodyPr>
+          <a:lstStyle/>
+          <a:p>
+            <a:r>
+              <a:rPr lang="en-US" b="1" i="1" dirty="0">
+                <a:solidFill>
+                  <a:srgbClr val="FFC000"/>
+                </a:solidFill>
+              </a:rPr>
+              <a:t>k</a:t>
+            </a:r>
+            <a:r>
+              <a:rPr lang="en-US" b="1" i="1" baseline="-25000" dirty="0">
+                <a:solidFill>
+                  <a:srgbClr val="FFC000"/>
+                </a:solidFill>
+              </a:rPr>
+              <a:t>3</a:t>
+            </a:r>
+          </a:p>
+        </p:txBody>
+      </p:sp>
+      <p:sp>
+        <p:nvSpPr>
+          <p:cNvPr id="21" name="U-Turn Arrow 20">
+            <a:extLst>
+              <a:ext uri="{FF2B5EF4-FFF2-40B4-BE49-F238E27FC236}">
+                <a16:creationId xmlns:a16="http://schemas.microsoft.com/office/drawing/2014/main" id="{0CFAAC6B-E789-5B79-2D13-C9842CCE4EC6}"/>
+              </a:ext>
+            </a:extLst>
+          </p:cNvPr>
+          <p:cNvSpPr/>
+          <p:nvPr/>
+        </p:nvSpPr>
+        <p:spPr>
+          <a:xfrm rot="10800000">
+            <a:off x="3699744" y="3719317"/>
+            <a:ext cx="727376" cy="625564"/>
+          </a:xfrm>
+          <a:prstGeom prst="uturnArrow">
+            <a:avLst/>
+          </a:prstGeom>
+          <a:solidFill>
+            <a:srgbClr val="00B050"/>
+          </a:solidFill>
+        </p:spPr>
+        <p:style>
+          <a:lnRef idx="1">
+            <a:schemeClr val="accent1"/>
+          </a:lnRef>
+          <a:fillRef idx="3">
+            <a:schemeClr val="accent1"/>
+          </a:fillRef>
+          <a:effectRef idx="2">
+            <a:schemeClr val="accent1"/>
+          </a:effectRef>
+          <a:fontRef idx="minor">
+            <a:schemeClr val="lt1"/>
+          </a:fontRef>
+        </p:style>
+        <p:txBody>
+          <a:bodyPr rtlCol="0" anchor="ctr"/>
+          <a:lstStyle/>
+          <a:p>
+            <a:pPr algn="ctr"/>
+            <a:endParaRPr lang="en-US">
+              <a:solidFill>
+                <a:schemeClr val="tx1"/>
+              </a:solidFill>
+            </a:endParaRPr>
+          </a:p>
+        </p:txBody>
+      </p:sp>
+      <p:sp>
+        <p:nvSpPr>
+          <p:cNvPr id="25" name="U-Turn Arrow 24">
+            <a:extLst>
+              <a:ext uri="{FF2B5EF4-FFF2-40B4-BE49-F238E27FC236}">
+                <a16:creationId xmlns:a16="http://schemas.microsoft.com/office/drawing/2014/main" id="{5E82315B-15C7-39B6-A49B-77606449AB27}"/>
+              </a:ext>
+            </a:extLst>
+          </p:cNvPr>
+          <p:cNvSpPr/>
+          <p:nvPr/>
+        </p:nvSpPr>
+        <p:spPr>
+          <a:xfrm rot="10800000">
+            <a:off x="4940358" y="3719317"/>
+            <a:ext cx="727376" cy="625564"/>
+          </a:xfrm>
+          <a:prstGeom prst="uturnArrow">
+            <a:avLst/>
+          </a:prstGeom>
+          <a:solidFill>
+            <a:srgbClr val="00B050"/>
+          </a:solidFill>
+        </p:spPr>
+        <p:style>
+          <a:lnRef idx="1">
+            <a:schemeClr val="accent1"/>
+          </a:lnRef>
+          <a:fillRef idx="3">
+            <a:schemeClr val="accent1"/>
+          </a:fillRef>
+          <a:effectRef idx="2">
+            <a:schemeClr val="accent1"/>
+          </a:effectRef>
+          <a:fontRef idx="minor">
+            <a:schemeClr val="lt1"/>
+          </a:fontRef>
+        </p:style>
+        <p:txBody>
+          <a:bodyPr rtlCol="0" anchor="ctr"/>
+          <a:lstStyle/>
+          <a:p>
+            <a:pPr algn="ctr"/>
+            <a:endParaRPr lang="en-US">
+              <a:solidFill>
+                <a:schemeClr val="tx1"/>
+              </a:solidFill>
+            </a:endParaRPr>
+          </a:p>
+        </p:txBody>
+      </p:sp>
+      <p:sp>
+        <p:nvSpPr>
+          <p:cNvPr id="27" name="U-Turn Arrow 26">
+            <a:extLst>
+              <a:ext uri="{FF2B5EF4-FFF2-40B4-BE49-F238E27FC236}">
+                <a16:creationId xmlns:a16="http://schemas.microsoft.com/office/drawing/2014/main" id="{35F94AFA-25A6-0DDA-2DC8-FE5FE783CBD5}"/>
+              </a:ext>
+            </a:extLst>
+          </p:cNvPr>
+          <p:cNvSpPr/>
+          <p:nvPr/>
+        </p:nvSpPr>
+        <p:spPr>
+          <a:xfrm rot="10800000">
+            <a:off x="5827140" y="3738376"/>
+            <a:ext cx="1997598" cy="763931"/>
+          </a:xfrm>
+          <a:prstGeom prst="uturnArrow">
+            <a:avLst/>
+          </a:prstGeom>
+          <a:solidFill>
+            <a:srgbClr val="00B050"/>
+          </a:solidFill>
+        </p:spPr>
+        <p:style>
+          <a:lnRef idx="1">
+            <a:schemeClr val="accent1"/>
+          </a:lnRef>
+          <a:fillRef idx="3">
+            <a:schemeClr val="accent1"/>
+          </a:fillRef>
+          <a:effectRef idx="2">
+            <a:schemeClr val="accent1"/>
+          </a:effectRef>
+          <a:fontRef idx="minor">
+            <a:schemeClr val="lt1"/>
+          </a:fontRef>
+        </p:style>
+        <p:txBody>
+          <a:bodyPr rtlCol="0" anchor="ctr"/>
+          <a:lstStyle/>
+          <a:p>
+            <a:pPr algn="ctr"/>
+            <a:endParaRPr lang="en-US">
+              <a:solidFill>
+                <a:schemeClr val="tx1"/>
+              </a:solidFill>
+            </a:endParaRPr>
+          </a:p>
+        </p:txBody>
+      </p:sp>
+      <p:sp>
+        <p:nvSpPr>
+          <p:cNvPr id="28" name="U-Turn Arrow 27">
+            <a:extLst>
+              <a:ext uri="{FF2B5EF4-FFF2-40B4-BE49-F238E27FC236}">
+                <a16:creationId xmlns:a16="http://schemas.microsoft.com/office/drawing/2014/main" id="{05F2509A-FBE5-B764-62CB-3AE4C393B6E4}"/>
+              </a:ext>
+            </a:extLst>
+          </p:cNvPr>
+          <p:cNvSpPr/>
+          <p:nvPr/>
+        </p:nvSpPr>
+        <p:spPr>
+          <a:xfrm>
+            <a:off x="5763720" y="2338577"/>
+            <a:ext cx="1997598" cy="300942"/>
+          </a:xfrm>
+          <a:prstGeom prst="uturnArrow">
+            <a:avLst/>
+          </a:prstGeom>
+          <a:solidFill>
+            <a:schemeClr val="accent6"/>
+          </a:solidFill>
+          <a:ln>
+            <a:noFill/>
+          </a:ln>
+        </p:spPr>
+        <p:style>
+          <a:lnRef idx="1">
+            <a:schemeClr val="accent1"/>
+          </a:lnRef>
+          <a:fillRef idx="3">
+            <a:schemeClr val="accent1"/>
+          </a:fillRef>
+          <a:effectRef idx="2">
+            <a:schemeClr val="accent1"/>
+          </a:effectRef>
+          <a:fontRef idx="minor">
+            <a:schemeClr val="lt1"/>
+          </a:fontRef>
+        </p:style>
+        <p:txBody>
+          <a:bodyPr rtlCol="0" anchor="ctr"/>
+          <a:lstStyle/>
+          <a:p>
+            <a:pPr algn="ctr"/>
+            <a:endParaRPr lang="en-US">
+              <a:solidFill>
+                <a:schemeClr val="tx1"/>
+              </a:solidFill>
+            </a:endParaRPr>
+          </a:p>
+        </p:txBody>
+      </p:sp>
+    </p:spTree>
+    <p:extLst>
+      <p:ext uri="{BB962C8B-B14F-4D97-AF65-F5344CB8AC3E}">
+        <p14:creationId xmlns:p14="http://schemas.microsoft.com/office/powerpoint/2010/main" val="3520516607"/>
       </p:ext>
     </p:extLst>
   </p:cSld>

</xml_diff>

<commit_message>
Plot control coefficients for cascade design
</commit_message>
<xml_diff>
--- a/plots/frequency_response_paper_figures.pptx
+++ b/plots/frequency_response_paper_figures.pptx
@@ -980,50 +980,7 @@
           <a:bodyPr/>
           <a:lstStyle/>
           <a:p>
-            <a:r>
-              <a:rPr lang="en-US" dirty="0"/>
-              <a:t>1. $</a:t>
-            </a:r>
-            <a:r>
-              <a:rPr lang="en-US" dirty="0" err="1"/>
-              <a:t>lim</a:t>
-            </a:r>
-            <a:r>
-              <a:rPr lang="en-US" dirty="0"/>
-              <a:t>_{r_1 \</a:t>
-            </a:r>
-            <a:r>
-              <a:rPr lang="en-US" dirty="0" err="1"/>
-              <a:t>rightarrow</a:t>
-            </a:r>
-            <a:r>
-              <a:rPr lang="en-US" dirty="0"/>
-              <a:t> \</a:t>
-            </a:r>
-            <a:r>
-              <a:rPr lang="en-US" dirty="0" err="1"/>
-              <a:t>infty</a:t>
-            </a:r>
-            <a:r>
-              <a:rPr lang="en-US" dirty="0"/>
-              <a:t>}~ \</a:t>
-            </a:r>
-            <a:r>
-              <a:rPr lang="en-US" dirty="0" err="1"/>
-              <a:t>mathcal</a:t>
-            </a:r>
-            <a:r>
-              <a:rPr lang="en-US" dirty="0"/>
-              <a:t>{C}^{S_N}_{</a:t>
-            </a:r>
-            <a:r>
-              <a:rPr lang="en-US" dirty="0" err="1"/>
-              <a:t>r_m</a:t>
-            </a:r>
-            <a:r>
-              <a:rPr lang="en-US" dirty="0"/>
-              <a:t>} = 1$ for $m &lt; N$.</a:t>
-            </a:r>
+            <a:endParaRPr lang="en-US" dirty="0"/>
           </a:p>
         </p:txBody>
       </p:sp>
@@ -5551,7 +5508,7 @@
         </p:nvSpPr>
         <p:spPr>
           <a:xfrm>
-            <a:off x="1192192" y="2754775"/>
+            <a:off x="208344" y="2754775"/>
             <a:ext cx="914400" cy="914400"/>
           </a:xfrm>
           <a:prstGeom prst="ellipse">
@@ -5618,7 +5575,7 @@
         </p:nvSpPr>
         <p:spPr>
           <a:xfrm>
-            <a:off x="3189790" y="2754775"/>
+            <a:off x="2205942" y="2754775"/>
             <a:ext cx="914400" cy="914400"/>
           </a:xfrm>
           <a:prstGeom prst="ellipse">
@@ -5685,7 +5642,7 @@
         </p:nvSpPr>
         <p:spPr>
           <a:xfrm>
-            <a:off x="5210534" y="2754775"/>
+            <a:off x="6113359" y="2754775"/>
             <a:ext cx="914400" cy="914400"/>
           </a:xfrm>
           <a:prstGeom prst="ellipse">
@@ -5735,60 +5692,6 @@
               </a:rPr>
               <a:t>N-1</a:t>
             </a:r>
-          </a:p>
-        </p:txBody>
-      </p:sp>
-      <p:sp>
-        <p:nvSpPr>
-          <p:cNvPr id="13" name="U-Turn Arrow 12">
-            <a:extLst>
-              <a:ext uri="{FF2B5EF4-FFF2-40B4-BE49-F238E27FC236}">
-                <a16:creationId xmlns:a16="http://schemas.microsoft.com/office/drawing/2014/main" id="{D02A8D38-8177-1A34-E334-03876B46F18B}"/>
-              </a:ext>
-            </a:extLst>
-          </p:cNvPr>
-          <p:cNvSpPr/>
-          <p:nvPr/>
-        </p:nvSpPr>
-        <p:spPr>
-          <a:xfrm>
-            <a:off x="1649392" y="2453834"/>
-            <a:ext cx="1997598" cy="300942"/>
-          </a:xfrm>
-          <a:prstGeom prst="uturnArrow">
-            <a:avLst/>
-          </a:prstGeom>
-          <a:solidFill>
-            <a:schemeClr val="accent6"/>
-          </a:solidFill>
-          <a:ln>
-            <a:noFill/>
-          </a:ln>
-        </p:spPr>
-        <p:style>
-          <a:lnRef idx="1">
-            <a:schemeClr val="accent1"/>
-          </a:lnRef>
-          <a:fillRef idx="3">
-            <a:schemeClr val="accent1"/>
-          </a:fillRef>
-          <a:effectRef idx="2">
-            <a:schemeClr val="accent1"/>
-          </a:effectRef>
-          <a:fontRef idx="minor">
-            <a:schemeClr val="lt1"/>
-          </a:fontRef>
-        </p:style>
-        <p:txBody>
-          <a:bodyPr rtlCol="0" anchor="ctr"/>
-          <a:lstStyle/>
-          <a:p>
-            <a:pPr algn="ctr"/>
-            <a:endParaRPr lang="en-US">
-              <a:solidFill>
-                <a:schemeClr val="tx1"/>
-              </a:solidFill>
-            </a:endParaRPr>
           </a:p>
         </p:txBody>
       </p:sp>
@@ -5805,8 +5708,8 @@
           <p:nvPr/>
         </p:nvSpPr>
         <p:spPr>
-          <a:xfrm rot="10800000">
-            <a:off x="1632029" y="3669172"/>
+          <a:xfrm rot="10800000" flipH="1" flipV="1">
+            <a:off x="6630939" y="1949045"/>
             <a:ext cx="1997598" cy="763931"/>
           </a:xfrm>
           <a:prstGeom prst="uturnArrow">
@@ -5835,7 +5738,7 @@
           <a:lstStyle/>
           <a:p>
             <a:pPr algn="ctr"/>
-            <a:endParaRPr lang="en-US">
+            <a:endParaRPr lang="en-US" dirty="0">
               <a:solidFill>
                 <a:schemeClr val="tx1"/>
               </a:solidFill>
@@ -5857,8 +5760,8 @@
         </p:nvSpPr>
         <p:spPr>
           <a:xfrm>
-            <a:off x="2255575" y="2003479"/>
-            <a:ext cx="697627" cy="369332"/>
+            <a:off x="801304" y="4514816"/>
+            <a:ext cx="595035" cy="369332"/>
           </a:xfrm>
           <a:prstGeom prst="rect">
             <a:avLst/>
@@ -5874,10 +5777,10 @@
             <a:r>
               <a:rPr lang="en-US" b="1" dirty="0">
                 <a:solidFill>
-                  <a:schemeClr val="accent6"/>
+                  <a:srgbClr val="00B050"/>
                 </a:solidFill>
               </a:rPr>
-              <a:t>slow</a:t>
+              <a:t>fast</a:t>
             </a:r>
           </a:p>
         </p:txBody>
@@ -5896,8 +5799,8 @@
         </p:nvSpPr>
         <p:spPr>
           <a:xfrm>
-            <a:off x="2302364" y="4526229"/>
-            <a:ext cx="595035" cy="369332"/>
+            <a:off x="481811" y="1956611"/>
+            <a:ext cx="697627" cy="369332"/>
           </a:xfrm>
           <a:prstGeom prst="rect">
             <a:avLst/>
@@ -5913,96 +5816,10 @@
             <a:r>
               <a:rPr lang="en-US" b="1" dirty="0">
                 <a:solidFill>
-                  <a:srgbClr val="00B050"/>
+                  <a:srgbClr val="FFC000"/>
                 </a:solidFill>
               </a:rPr>
-              <a:t>fast</a:t>
-            </a:r>
-          </a:p>
-        </p:txBody>
-      </p:sp>
-      <p:sp>
-        <p:nvSpPr>
-          <p:cNvPr id="22" name="TextBox 21">
-            <a:extLst>
-              <a:ext uri="{FF2B5EF4-FFF2-40B4-BE49-F238E27FC236}">
-                <a16:creationId xmlns:a16="http://schemas.microsoft.com/office/drawing/2014/main" id="{5A431F6B-7B21-91DA-F498-5F184ADC8D2A}"/>
-              </a:ext>
-            </a:extLst>
-          </p:cNvPr>
-          <p:cNvSpPr txBox="1"/>
-          <p:nvPr/>
-        </p:nvSpPr>
-        <p:spPr>
-          <a:xfrm>
-            <a:off x="3813599" y="925852"/>
-            <a:ext cx="385042" cy="369332"/>
-          </a:xfrm>
-          <a:prstGeom prst="rect">
-            <a:avLst/>
-          </a:prstGeom>
-          <a:noFill/>
-        </p:spPr>
-        <p:txBody>
-          <a:bodyPr wrap="none" rtlCol="0">
-            <a:spAutoFit/>
-          </a:bodyPr>
-          <a:lstStyle/>
-          <a:p>
-            <a:r>
-              <a:rPr lang="en-US" i="1" dirty="0"/>
-              <a:t>k</a:t>
-            </a:r>
-            <a:r>
-              <a:rPr lang="en-US" i="1" baseline="-25000" dirty="0"/>
-              <a:t>3</a:t>
-            </a:r>
-          </a:p>
-        </p:txBody>
-      </p:sp>
-      <p:sp>
-        <p:nvSpPr>
-          <p:cNvPr id="23" name="TextBox 22">
-            <a:extLst>
-              <a:ext uri="{FF2B5EF4-FFF2-40B4-BE49-F238E27FC236}">
-                <a16:creationId xmlns:a16="http://schemas.microsoft.com/office/drawing/2014/main" id="{74B766F0-D7B5-4941-618F-6879A59FCEB9}"/>
-              </a:ext>
-            </a:extLst>
-          </p:cNvPr>
-          <p:cNvSpPr txBox="1"/>
-          <p:nvPr/>
-        </p:nvSpPr>
-        <p:spPr>
-          <a:xfrm>
-            <a:off x="1780131" y="4433103"/>
-            <a:ext cx="397866" cy="369332"/>
-          </a:xfrm>
-          <a:prstGeom prst="rect">
-            <a:avLst/>
-          </a:prstGeom>
-          <a:noFill/>
-        </p:spPr>
-        <p:txBody>
-          <a:bodyPr wrap="none" rtlCol="0">
-            <a:spAutoFit/>
-          </a:bodyPr>
-          <a:lstStyle/>
-          <a:p>
-            <a:r>
-              <a:rPr lang="en-US" b="1" i="1" dirty="0">
-                <a:solidFill>
-                  <a:srgbClr val="00B050"/>
-                </a:solidFill>
-              </a:rPr>
-              <a:t>k</a:t>
-            </a:r>
-            <a:r>
-              <a:rPr lang="en-US" b="1" i="1" baseline="-25000" dirty="0">
-                <a:solidFill>
-                  <a:srgbClr val="00B050"/>
-                </a:solidFill>
-              </a:rPr>
-              <a:t>2</a:t>
+              <a:t>slow</a:t>
             </a:r>
           </a:p>
         </p:txBody>
@@ -6021,59 +5838,7 @@
         </p:nvSpPr>
         <p:spPr>
           <a:xfrm>
-            <a:off x="1780131" y="2109581"/>
-            <a:ext cx="397866" cy="369332"/>
-          </a:xfrm>
-          <a:prstGeom prst="rect">
-            <a:avLst/>
-          </a:prstGeom>
-          <a:noFill/>
-        </p:spPr>
-        <p:txBody>
-          <a:bodyPr wrap="none" rtlCol="0">
-            <a:spAutoFit/>
-          </a:bodyPr>
-          <a:lstStyle/>
-          <a:p>
-            <a:r>
-              <a:rPr lang="en-US" b="1" i="1" dirty="0">
-                <a:solidFill>
-                  <a:srgbClr val="FFC000"/>
-                </a:solidFill>
-              </a:rPr>
-              <a:t>k</a:t>
-            </a:r>
-            <a:r>
-              <a:rPr lang="en-US" b="1" baseline="-25000" dirty="0">
-                <a:solidFill>
-                  <a:srgbClr val="FFC000"/>
-                </a:solidFill>
-              </a:rPr>
-              <a:t>1</a:t>
-            </a:r>
-            <a:endParaRPr lang="en-US" b="1" i="1" baseline="-25000" dirty="0">
-              <a:solidFill>
-                <a:srgbClr val="FFC000"/>
-              </a:solidFill>
-            </a:endParaRPr>
-          </a:p>
-        </p:txBody>
-      </p:sp>
-      <p:sp>
-        <p:nvSpPr>
-          <p:cNvPr id="35" name="TextBox 34">
-            <a:extLst>
-              <a:ext uri="{FF2B5EF4-FFF2-40B4-BE49-F238E27FC236}">
-                <a16:creationId xmlns:a16="http://schemas.microsoft.com/office/drawing/2014/main" id="{D3450114-AC17-3FDD-F414-3288610EC5FF}"/>
-              </a:ext>
-            </a:extLst>
-          </p:cNvPr>
-          <p:cNvSpPr txBox="1"/>
-          <p:nvPr/>
-        </p:nvSpPr>
-        <p:spPr>
-          <a:xfrm>
-            <a:off x="3864498" y="4433103"/>
+            <a:off x="932043" y="4801531"/>
             <a:ext cx="397866" cy="369332"/>
           </a:xfrm>
           <a:prstGeom prst="rect">
@@ -6101,7 +5866,7 @@
                   <a:srgbClr val="00B050"/>
                 </a:solidFill>
               </a:rPr>
-              <a:t>4</a:t>
+              <a:t>2</a:t>
             </a:r>
           </a:p>
         </p:txBody>
@@ -6120,7 +5885,7 @@
         </p:nvSpPr>
         <p:spPr>
           <a:xfrm>
-            <a:off x="7186906" y="2754775"/>
+            <a:off x="8089731" y="2754775"/>
             <a:ext cx="914400" cy="914400"/>
           </a:xfrm>
           <a:prstGeom prst="ellipse">
@@ -6187,7 +5952,7 @@
         </p:nvGrpSpPr>
         <p:grpSpPr>
           <a:xfrm>
-            <a:off x="4427120" y="3211975"/>
+            <a:off x="3258072" y="3211975"/>
             <a:ext cx="396240" cy="91440"/>
             <a:chOff x="5521124" y="5626696"/>
             <a:chExt cx="396240" cy="91440"/>
@@ -6367,10 +6132,57 @@
       </p:grpSp>
       <p:sp>
         <p:nvSpPr>
-          <p:cNvPr id="12" name="U-Turn Arrow 11">
+          <p:cNvPr id="30" name="TextBox 29">
             <a:extLst>
               <a:ext uri="{FF2B5EF4-FFF2-40B4-BE49-F238E27FC236}">
-                <a16:creationId xmlns:a16="http://schemas.microsoft.com/office/drawing/2014/main" id="{45294067-4FB5-36BD-79A1-9C644F3B4E82}"/>
+                <a16:creationId xmlns:a16="http://schemas.microsoft.com/office/drawing/2014/main" id="{A36B80BE-0A5B-8BE4-8325-220BEB28D483}"/>
+              </a:ext>
+            </a:extLst>
+          </p:cNvPr>
+          <p:cNvSpPr txBox="1"/>
+          <p:nvPr/>
+        </p:nvSpPr>
+        <p:spPr>
+          <a:xfrm>
+            <a:off x="7832251" y="1428797"/>
+            <a:ext cx="883575" cy="369332"/>
+          </a:xfrm>
+          <a:prstGeom prst="rect">
+            <a:avLst/>
+          </a:prstGeom>
+          <a:noFill/>
+        </p:spPr>
+        <p:txBody>
+          <a:bodyPr wrap="none" rtlCol="0">
+            <a:spAutoFit/>
+          </a:bodyPr>
+          <a:lstStyle/>
+          <a:p>
+            <a:r>
+              <a:rPr lang="en-US" b="1" i="1" dirty="0">
+                <a:solidFill>
+                  <a:srgbClr val="00B050"/>
+                </a:solidFill>
+              </a:rPr>
+              <a:t>k</a:t>
+            </a:r>
+            <a:r>
+              <a:rPr lang="en-US" b="1" i="1" baseline="-25000" dirty="0">
+                <a:solidFill>
+                  <a:srgbClr val="00B050"/>
+                </a:solidFill>
+              </a:rPr>
+              <a:t>2(N-1)-1</a:t>
+            </a:r>
+          </a:p>
+        </p:txBody>
+      </p:sp>
+      <p:sp>
+        <p:nvSpPr>
+          <p:cNvPr id="33" name="U-Turn Arrow 32">
+            <a:extLst>
+              <a:ext uri="{FF2B5EF4-FFF2-40B4-BE49-F238E27FC236}">
+                <a16:creationId xmlns:a16="http://schemas.microsoft.com/office/drawing/2014/main" id="{6E652211-F7B8-1349-484D-1D4500801A5C}"/>
               </a:ext>
             </a:extLst>
           </p:cNvPr>
@@ -6378,9 +6190,9 @@
           <p:nvPr/>
         </p:nvSpPr>
         <p:spPr>
-          <a:xfrm>
-            <a:off x="3672161" y="2389908"/>
-            <a:ext cx="914400" cy="300942"/>
+          <a:xfrm rot="10800000">
+            <a:off x="4479552" y="3689920"/>
+            <a:ext cx="914400" cy="359879"/>
           </a:xfrm>
           <a:prstGeom prst="uturnArrow">
             <a:avLst/>
@@ -6421,10 +6233,10 @@
       </p:sp>
       <p:sp>
         <p:nvSpPr>
-          <p:cNvPr id="14" name="U-Turn Arrow 13">
+          <p:cNvPr id="34" name="U-Turn Arrow 33">
             <a:extLst>
               <a:ext uri="{FF2B5EF4-FFF2-40B4-BE49-F238E27FC236}">
-                <a16:creationId xmlns:a16="http://schemas.microsoft.com/office/drawing/2014/main" id="{C0AD8EE0-C243-504A-422B-F3A7D4C051DD}"/>
+                <a16:creationId xmlns:a16="http://schemas.microsoft.com/office/drawing/2014/main" id="{25581FC3-334F-40E9-BD8F-B7BB437B2AA3}"/>
               </a:ext>
             </a:extLst>
           </p:cNvPr>
@@ -6432,8 +6244,8 @@
           <p:nvPr/>
         </p:nvSpPr>
         <p:spPr>
-          <a:xfrm>
-            <a:off x="4834935" y="2407778"/>
+          <a:xfrm flipH="1" flipV="1">
+            <a:off x="5716539" y="3669172"/>
             <a:ext cx="914400" cy="300942"/>
           </a:xfrm>
           <a:prstGeom prst="uturnArrow">
@@ -6475,10 +6287,700 @@
       </p:sp>
       <p:sp>
         <p:nvSpPr>
-          <p:cNvPr id="15" name="TextBox 14">
+          <p:cNvPr id="36" name="U-Turn Arrow 35">
             <a:extLst>
               <a:ext uri="{FF2B5EF4-FFF2-40B4-BE49-F238E27FC236}">
-                <a16:creationId xmlns:a16="http://schemas.microsoft.com/office/drawing/2014/main" id="{9C41B707-C0C7-2FF5-B510-C4AA6BB1548D}"/>
+                <a16:creationId xmlns:a16="http://schemas.microsoft.com/office/drawing/2014/main" id="{70051180-F37C-AFD3-0A58-029D270B0B44}"/>
+              </a:ext>
+            </a:extLst>
+          </p:cNvPr>
+          <p:cNvSpPr/>
+          <p:nvPr/>
+        </p:nvSpPr>
+        <p:spPr>
+          <a:xfrm>
+            <a:off x="612032" y="2431150"/>
+            <a:ext cx="1997598" cy="300942"/>
+          </a:xfrm>
+          <a:prstGeom prst="uturnArrow">
+            <a:avLst/>
+          </a:prstGeom>
+          <a:solidFill>
+            <a:schemeClr val="accent6"/>
+          </a:solidFill>
+          <a:ln>
+            <a:noFill/>
+          </a:ln>
+        </p:spPr>
+        <p:style>
+          <a:lnRef idx="1">
+            <a:schemeClr val="accent1"/>
+          </a:lnRef>
+          <a:fillRef idx="3">
+            <a:schemeClr val="accent1"/>
+          </a:fillRef>
+          <a:effectRef idx="2">
+            <a:schemeClr val="accent1"/>
+          </a:effectRef>
+          <a:fontRef idx="minor">
+            <a:schemeClr val="lt1"/>
+          </a:fontRef>
+        </p:style>
+        <p:txBody>
+          <a:bodyPr rtlCol="0" anchor="ctr"/>
+          <a:lstStyle/>
+          <a:p>
+            <a:pPr algn="ctr"/>
+            <a:endParaRPr lang="en-US">
+              <a:solidFill>
+                <a:schemeClr val="tx1"/>
+              </a:solidFill>
+            </a:endParaRPr>
+          </a:p>
+        </p:txBody>
+      </p:sp>
+      <p:sp>
+        <p:nvSpPr>
+          <p:cNvPr id="40" name="U-Turn Arrow 39">
+            <a:extLst>
+              <a:ext uri="{FF2B5EF4-FFF2-40B4-BE49-F238E27FC236}">
+                <a16:creationId xmlns:a16="http://schemas.microsoft.com/office/drawing/2014/main" id="{B8D8C4D8-ECC6-C938-34E8-43EE6EAC7FB9}"/>
+              </a:ext>
+            </a:extLst>
+          </p:cNvPr>
+          <p:cNvSpPr/>
+          <p:nvPr/>
+        </p:nvSpPr>
+        <p:spPr>
+          <a:xfrm flipH="1" flipV="1">
+            <a:off x="6718228" y="3710974"/>
+            <a:ext cx="1997598" cy="300942"/>
+          </a:xfrm>
+          <a:prstGeom prst="uturnArrow">
+            <a:avLst/>
+          </a:prstGeom>
+          <a:solidFill>
+            <a:schemeClr val="accent6"/>
+          </a:solidFill>
+          <a:ln>
+            <a:noFill/>
+          </a:ln>
+        </p:spPr>
+        <p:style>
+          <a:lnRef idx="1">
+            <a:schemeClr val="accent1"/>
+          </a:lnRef>
+          <a:fillRef idx="3">
+            <a:schemeClr val="accent1"/>
+          </a:fillRef>
+          <a:effectRef idx="2">
+            <a:schemeClr val="accent1"/>
+          </a:effectRef>
+          <a:fontRef idx="minor">
+            <a:schemeClr val="lt1"/>
+          </a:fontRef>
+        </p:style>
+        <p:txBody>
+          <a:bodyPr rtlCol="0" anchor="ctr"/>
+          <a:lstStyle/>
+          <a:p>
+            <a:pPr algn="ctr"/>
+            <a:endParaRPr lang="en-US">
+              <a:solidFill>
+                <a:schemeClr val="tx1"/>
+              </a:solidFill>
+            </a:endParaRPr>
+          </a:p>
+        </p:txBody>
+      </p:sp>
+      <p:grpSp>
+        <p:nvGrpSpPr>
+          <p:cNvPr id="41" name="Group 40">
+            <a:extLst>
+              <a:ext uri="{FF2B5EF4-FFF2-40B4-BE49-F238E27FC236}">
+                <a16:creationId xmlns:a16="http://schemas.microsoft.com/office/drawing/2014/main" id="{1EDBA584-A859-E02C-525F-62951021D7B1}"/>
+              </a:ext>
+            </a:extLst>
+          </p:cNvPr>
+          <p:cNvGrpSpPr/>
+          <p:nvPr/>
+        </p:nvGrpSpPr>
+        <p:grpSpPr>
+          <a:xfrm>
+            <a:off x="5245850" y="3166255"/>
+            <a:ext cx="396240" cy="91440"/>
+            <a:chOff x="5521124" y="5626696"/>
+            <a:chExt cx="396240" cy="91440"/>
+          </a:xfrm>
+        </p:grpSpPr>
+        <p:sp>
+          <p:nvSpPr>
+            <p:cNvPr id="42" name="Oval 41">
+              <a:extLst>
+                <a:ext uri="{FF2B5EF4-FFF2-40B4-BE49-F238E27FC236}">
+                  <a16:creationId xmlns:a16="http://schemas.microsoft.com/office/drawing/2014/main" id="{15B89FF7-ECA7-9620-22A5-19B5B57C7321}"/>
+                </a:ext>
+              </a:extLst>
+            </p:cNvPr>
+            <p:cNvSpPr>
+              <a:spLocks noChangeAspect="1"/>
+            </p:cNvSpPr>
+            <p:nvPr/>
+          </p:nvSpPr>
+          <p:spPr>
+            <a:xfrm>
+              <a:off x="5521124" y="5626696"/>
+              <a:ext cx="91440" cy="91440"/>
+            </a:xfrm>
+            <a:prstGeom prst="ellipse">
+              <a:avLst/>
+            </a:prstGeom>
+            <a:solidFill>
+              <a:schemeClr val="tx1"/>
+            </a:solidFill>
+            <a:ln>
+              <a:noFill/>
+            </a:ln>
+            <a:effectLst>
+              <a:outerShdw dist="23000" sx="1000" sy="1000" rotWithShape="0">
+                <a:srgbClr val="000000"/>
+              </a:outerShdw>
+            </a:effectLst>
+          </p:spPr>
+          <p:style>
+            <a:lnRef idx="1">
+              <a:schemeClr val="accent1"/>
+            </a:lnRef>
+            <a:fillRef idx="3">
+              <a:schemeClr val="accent1"/>
+            </a:fillRef>
+            <a:effectRef idx="2">
+              <a:schemeClr val="accent1"/>
+            </a:effectRef>
+            <a:fontRef idx="minor">
+              <a:schemeClr val="lt1"/>
+            </a:fontRef>
+          </p:style>
+          <p:txBody>
+            <a:bodyPr rtlCol="0" anchor="ctr"/>
+            <a:lstStyle/>
+            <a:p>
+              <a:pPr algn="ctr"/>
+              <a:endParaRPr lang="en-US"/>
+            </a:p>
+          </p:txBody>
+        </p:sp>
+        <p:sp>
+          <p:nvSpPr>
+            <p:cNvPr id="43" name="Oval 42">
+              <a:extLst>
+                <a:ext uri="{FF2B5EF4-FFF2-40B4-BE49-F238E27FC236}">
+                  <a16:creationId xmlns:a16="http://schemas.microsoft.com/office/drawing/2014/main" id="{FA597A74-AD26-8E86-61E0-9F9247E8E426}"/>
+                </a:ext>
+              </a:extLst>
+            </p:cNvPr>
+            <p:cNvSpPr>
+              <a:spLocks noChangeAspect="1"/>
+            </p:cNvSpPr>
+            <p:nvPr/>
+          </p:nvSpPr>
+          <p:spPr>
+            <a:xfrm>
+              <a:off x="5673524" y="5626696"/>
+              <a:ext cx="91440" cy="91440"/>
+            </a:xfrm>
+            <a:prstGeom prst="ellipse">
+              <a:avLst/>
+            </a:prstGeom>
+            <a:solidFill>
+              <a:schemeClr val="tx1"/>
+            </a:solidFill>
+            <a:ln>
+              <a:noFill/>
+            </a:ln>
+            <a:effectLst>
+              <a:outerShdw dist="23000" sx="1000" sy="1000" rotWithShape="0">
+                <a:srgbClr val="000000"/>
+              </a:outerShdw>
+            </a:effectLst>
+          </p:spPr>
+          <p:style>
+            <a:lnRef idx="1">
+              <a:schemeClr val="accent1"/>
+            </a:lnRef>
+            <a:fillRef idx="3">
+              <a:schemeClr val="accent1"/>
+            </a:fillRef>
+            <a:effectRef idx="2">
+              <a:schemeClr val="accent1"/>
+            </a:effectRef>
+            <a:fontRef idx="minor">
+              <a:schemeClr val="lt1"/>
+            </a:fontRef>
+          </p:style>
+          <p:txBody>
+            <a:bodyPr rtlCol="0" anchor="ctr"/>
+            <a:lstStyle/>
+            <a:p>
+              <a:pPr algn="ctr"/>
+              <a:endParaRPr lang="en-US"/>
+            </a:p>
+          </p:txBody>
+        </p:sp>
+        <p:sp>
+          <p:nvSpPr>
+            <p:cNvPr id="44" name="Oval 43">
+              <a:extLst>
+                <a:ext uri="{FF2B5EF4-FFF2-40B4-BE49-F238E27FC236}">
+                  <a16:creationId xmlns:a16="http://schemas.microsoft.com/office/drawing/2014/main" id="{1ED3269F-1997-C5F7-DA06-AACA3B14C98F}"/>
+                </a:ext>
+              </a:extLst>
+            </p:cNvPr>
+            <p:cNvSpPr>
+              <a:spLocks noChangeAspect="1"/>
+            </p:cNvSpPr>
+            <p:nvPr/>
+          </p:nvSpPr>
+          <p:spPr>
+            <a:xfrm>
+              <a:off x="5825924" y="5626696"/>
+              <a:ext cx="91440" cy="91440"/>
+            </a:xfrm>
+            <a:prstGeom prst="ellipse">
+              <a:avLst/>
+            </a:prstGeom>
+            <a:solidFill>
+              <a:schemeClr val="tx1"/>
+            </a:solidFill>
+            <a:ln>
+              <a:noFill/>
+            </a:ln>
+            <a:effectLst>
+              <a:outerShdw dist="23000" sx="1000" sy="1000" rotWithShape="0">
+                <a:srgbClr val="000000"/>
+              </a:outerShdw>
+            </a:effectLst>
+          </p:spPr>
+          <p:style>
+            <a:lnRef idx="1">
+              <a:schemeClr val="accent1"/>
+            </a:lnRef>
+            <a:fillRef idx="3">
+              <a:schemeClr val="accent1"/>
+            </a:fillRef>
+            <a:effectRef idx="2">
+              <a:schemeClr val="accent1"/>
+            </a:effectRef>
+            <a:fontRef idx="minor">
+              <a:schemeClr val="lt1"/>
+            </a:fontRef>
+          </p:style>
+          <p:txBody>
+            <a:bodyPr rtlCol="0" anchor="ctr"/>
+            <a:lstStyle/>
+            <a:p>
+              <a:pPr algn="ctr"/>
+              <a:endParaRPr lang="en-US"/>
+            </a:p>
+          </p:txBody>
+        </p:sp>
+      </p:grpSp>
+      <p:sp>
+        <p:nvSpPr>
+          <p:cNvPr id="45" name="Oval 44">
+            <a:extLst>
+              <a:ext uri="{FF2B5EF4-FFF2-40B4-BE49-F238E27FC236}">
+                <a16:creationId xmlns:a16="http://schemas.microsoft.com/office/drawing/2014/main" id="{23EC1654-DA1F-F04A-1080-53913A4C2772}"/>
+              </a:ext>
+            </a:extLst>
+          </p:cNvPr>
+          <p:cNvSpPr/>
+          <p:nvPr/>
+        </p:nvSpPr>
+        <p:spPr>
+          <a:xfrm>
+            <a:off x="3990732" y="2796574"/>
+            <a:ext cx="914400" cy="914400"/>
+          </a:xfrm>
+          <a:prstGeom prst="ellipse">
+            <a:avLst/>
+          </a:prstGeom>
+          <a:solidFill>
+            <a:schemeClr val="bg1">
+              <a:lumMod val="85000"/>
+            </a:schemeClr>
+          </a:solidFill>
+          <a:ln>
+            <a:noFill/>
+          </a:ln>
+        </p:spPr>
+        <p:style>
+          <a:lnRef idx="1">
+            <a:schemeClr val="accent1"/>
+          </a:lnRef>
+          <a:fillRef idx="3">
+            <a:schemeClr val="accent1"/>
+          </a:fillRef>
+          <a:effectRef idx="2">
+            <a:schemeClr val="accent1"/>
+          </a:effectRef>
+          <a:fontRef idx="minor">
+            <a:schemeClr val="lt1"/>
+          </a:fontRef>
+        </p:style>
+        <p:txBody>
+          <a:bodyPr rtlCol="0" anchor="ctr"/>
+          <a:lstStyle/>
+          <a:p>
+            <a:pPr algn="ctr"/>
+            <a:r>
+              <a:rPr lang="en-US" sz="2400" dirty="0" err="1">
+                <a:solidFill>
+                  <a:schemeClr val="tx1"/>
+                </a:solidFill>
+              </a:rPr>
+              <a:t>S</a:t>
+            </a:r>
+            <a:r>
+              <a:rPr lang="en-US" sz="2400" i="1" baseline="-25000" dirty="0" err="1">
+                <a:solidFill>
+                  <a:schemeClr val="tx1"/>
+                </a:solidFill>
+              </a:rPr>
+              <a:t>m</a:t>
+            </a:r>
+            <a:endParaRPr lang="en-US" sz="2400" i="1" baseline="-25000" dirty="0">
+              <a:solidFill>
+                <a:schemeClr val="tx1"/>
+              </a:solidFill>
+            </a:endParaRPr>
+          </a:p>
+        </p:txBody>
+      </p:sp>
+      <p:sp>
+        <p:nvSpPr>
+          <p:cNvPr id="47" name="U-Turn Arrow 46">
+            <a:extLst>
+              <a:ext uri="{FF2B5EF4-FFF2-40B4-BE49-F238E27FC236}">
+                <a16:creationId xmlns:a16="http://schemas.microsoft.com/office/drawing/2014/main" id="{677E82FB-BDB9-0393-6341-E4D701977FB7}"/>
+              </a:ext>
+            </a:extLst>
+          </p:cNvPr>
+          <p:cNvSpPr/>
+          <p:nvPr/>
+        </p:nvSpPr>
+        <p:spPr>
+          <a:xfrm rot="10800000" flipH="1" flipV="1">
+            <a:off x="3813428" y="1956611"/>
+            <a:ext cx="663651" cy="763931"/>
+          </a:xfrm>
+          <a:prstGeom prst="uturnArrow">
+            <a:avLst/>
+          </a:prstGeom>
+          <a:solidFill>
+            <a:srgbClr val="00B050"/>
+          </a:solidFill>
+        </p:spPr>
+        <p:style>
+          <a:lnRef idx="1">
+            <a:schemeClr val="accent1"/>
+          </a:lnRef>
+          <a:fillRef idx="3">
+            <a:schemeClr val="accent1"/>
+          </a:fillRef>
+          <a:effectRef idx="2">
+            <a:schemeClr val="accent1"/>
+          </a:effectRef>
+          <a:fontRef idx="minor">
+            <a:schemeClr val="lt1"/>
+          </a:fontRef>
+        </p:style>
+        <p:txBody>
+          <a:bodyPr rtlCol="0" anchor="ctr"/>
+          <a:lstStyle/>
+          <a:p>
+            <a:pPr algn="ctr"/>
+            <a:endParaRPr lang="en-US">
+              <a:solidFill>
+                <a:schemeClr val="tx1"/>
+              </a:solidFill>
+            </a:endParaRPr>
+          </a:p>
+        </p:txBody>
+      </p:sp>
+      <p:sp>
+        <p:nvSpPr>
+          <p:cNvPr id="48" name="U-Turn Arrow 47">
+            <a:extLst>
+              <a:ext uri="{FF2B5EF4-FFF2-40B4-BE49-F238E27FC236}">
+                <a16:creationId xmlns:a16="http://schemas.microsoft.com/office/drawing/2014/main" id="{94A835E5-D404-14DA-A628-51A52F14BFF2}"/>
+              </a:ext>
+            </a:extLst>
+          </p:cNvPr>
+          <p:cNvSpPr/>
+          <p:nvPr/>
+        </p:nvSpPr>
+        <p:spPr>
+          <a:xfrm rot="10800000" flipH="1" flipV="1">
+            <a:off x="2645779" y="1959598"/>
+            <a:ext cx="663651" cy="763931"/>
+          </a:xfrm>
+          <a:prstGeom prst="uturnArrow">
+            <a:avLst/>
+          </a:prstGeom>
+          <a:solidFill>
+            <a:srgbClr val="00B050"/>
+          </a:solidFill>
+        </p:spPr>
+        <p:style>
+          <a:lnRef idx="1">
+            <a:schemeClr val="accent1"/>
+          </a:lnRef>
+          <a:fillRef idx="3">
+            <a:schemeClr val="accent1"/>
+          </a:fillRef>
+          <a:effectRef idx="2">
+            <a:schemeClr val="accent1"/>
+          </a:effectRef>
+          <a:fontRef idx="minor">
+            <a:schemeClr val="lt1"/>
+          </a:fontRef>
+        </p:style>
+        <p:txBody>
+          <a:bodyPr rtlCol="0" anchor="ctr"/>
+          <a:lstStyle/>
+          <a:p>
+            <a:pPr algn="ctr"/>
+            <a:endParaRPr lang="en-US">
+              <a:solidFill>
+                <a:schemeClr val="tx1"/>
+              </a:solidFill>
+            </a:endParaRPr>
+          </a:p>
+        </p:txBody>
+      </p:sp>
+      <p:sp>
+        <p:nvSpPr>
+          <p:cNvPr id="49" name="U-Turn Arrow 48">
+            <a:extLst>
+              <a:ext uri="{FF2B5EF4-FFF2-40B4-BE49-F238E27FC236}">
+                <a16:creationId xmlns:a16="http://schemas.microsoft.com/office/drawing/2014/main" id="{DA6BF386-8BE0-766C-49FC-67250071CE24}"/>
+              </a:ext>
+            </a:extLst>
+          </p:cNvPr>
+          <p:cNvSpPr/>
+          <p:nvPr/>
+        </p:nvSpPr>
+        <p:spPr>
+          <a:xfrm rot="10800000" flipH="1" flipV="1">
+            <a:off x="5889953" y="2071870"/>
+            <a:ext cx="663651" cy="763931"/>
+          </a:xfrm>
+          <a:prstGeom prst="uturnArrow">
+            <a:avLst/>
+          </a:prstGeom>
+          <a:solidFill>
+            <a:srgbClr val="00B050"/>
+          </a:solidFill>
+        </p:spPr>
+        <p:style>
+          <a:lnRef idx="1">
+            <a:schemeClr val="accent1"/>
+          </a:lnRef>
+          <a:fillRef idx="3">
+            <a:schemeClr val="accent1"/>
+          </a:fillRef>
+          <a:effectRef idx="2">
+            <a:schemeClr val="accent1"/>
+          </a:effectRef>
+          <a:fontRef idx="minor">
+            <a:schemeClr val="lt1"/>
+          </a:fontRef>
+        </p:style>
+        <p:txBody>
+          <a:bodyPr rtlCol="0" anchor="ctr"/>
+          <a:lstStyle/>
+          <a:p>
+            <a:pPr algn="ctr"/>
+            <a:endParaRPr lang="en-US">
+              <a:solidFill>
+                <a:schemeClr val="tx1"/>
+              </a:solidFill>
+            </a:endParaRPr>
+          </a:p>
+        </p:txBody>
+      </p:sp>
+      <p:sp>
+        <p:nvSpPr>
+          <p:cNvPr id="50" name="U-Turn Arrow 49">
+            <a:extLst>
+              <a:ext uri="{FF2B5EF4-FFF2-40B4-BE49-F238E27FC236}">
+                <a16:creationId xmlns:a16="http://schemas.microsoft.com/office/drawing/2014/main" id="{3550B822-2FCB-C37D-D34F-D29E577A389E}"/>
+              </a:ext>
+            </a:extLst>
+          </p:cNvPr>
+          <p:cNvSpPr/>
+          <p:nvPr/>
+        </p:nvSpPr>
+        <p:spPr>
+          <a:xfrm rot="10800000">
+            <a:off x="612032" y="3689920"/>
+            <a:ext cx="1997598" cy="763931"/>
+          </a:xfrm>
+          <a:prstGeom prst="uturnArrow">
+            <a:avLst/>
+          </a:prstGeom>
+          <a:solidFill>
+            <a:srgbClr val="00B050"/>
+          </a:solidFill>
+        </p:spPr>
+        <p:style>
+          <a:lnRef idx="1">
+            <a:schemeClr val="accent1"/>
+          </a:lnRef>
+          <a:fillRef idx="3">
+            <a:schemeClr val="accent1"/>
+          </a:fillRef>
+          <a:effectRef idx="2">
+            <a:schemeClr val="accent1"/>
+          </a:effectRef>
+          <a:fontRef idx="minor">
+            <a:schemeClr val="lt1"/>
+          </a:fontRef>
+        </p:style>
+        <p:txBody>
+          <a:bodyPr rtlCol="0" anchor="ctr"/>
+          <a:lstStyle/>
+          <a:p>
+            <a:pPr algn="ctr"/>
+            <a:endParaRPr lang="en-US">
+              <a:solidFill>
+                <a:schemeClr val="tx1"/>
+              </a:solidFill>
+            </a:endParaRPr>
+          </a:p>
+        </p:txBody>
+      </p:sp>
+      <p:sp>
+        <p:nvSpPr>
+          <p:cNvPr id="51" name="U-Turn Arrow 50">
+            <a:extLst>
+              <a:ext uri="{FF2B5EF4-FFF2-40B4-BE49-F238E27FC236}">
+                <a16:creationId xmlns:a16="http://schemas.microsoft.com/office/drawing/2014/main" id="{A65CA95A-5BD9-97AE-00D1-7004FD9BC19C}"/>
+              </a:ext>
+            </a:extLst>
+          </p:cNvPr>
+          <p:cNvSpPr/>
+          <p:nvPr/>
+        </p:nvSpPr>
+        <p:spPr>
+          <a:xfrm flipH="1" flipV="1">
+            <a:off x="2726012" y="3710974"/>
+            <a:ext cx="731720" cy="300942"/>
+          </a:xfrm>
+          <a:prstGeom prst="uturnArrow">
+            <a:avLst/>
+          </a:prstGeom>
+          <a:solidFill>
+            <a:schemeClr val="accent6"/>
+          </a:solidFill>
+          <a:ln>
+            <a:noFill/>
+          </a:ln>
+        </p:spPr>
+        <p:style>
+          <a:lnRef idx="1">
+            <a:schemeClr val="accent1"/>
+          </a:lnRef>
+          <a:fillRef idx="3">
+            <a:schemeClr val="accent1"/>
+          </a:fillRef>
+          <a:effectRef idx="2">
+            <a:schemeClr val="accent1"/>
+          </a:effectRef>
+          <a:fontRef idx="minor">
+            <a:schemeClr val="lt1"/>
+          </a:fontRef>
+        </p:style>
+        <p:txBody>
+          <a:bodyPr rtlCol="0" anchor="ctr"/>
+          <a:lstStyle/>
+          <a:p>
+            <a:pPr algn="ctr"/>
+            <a:endParaRPr lang="en-US">
+              <a:solidFill>
+                <a:schemeClr val="tx1"/>
+              </a:solidFill>
+            </a:endParaRPr>
+          </a:p>
+        </p:txBody>
+      </p:sp>
+      <p:sp>
+        <p:nvSpPr>
+          <p:cNvPr id="52" name="U-Turn Arrow 51">
+            <a:extLst>
+              <a:ext uri="{FF2B5EF4-FFF2-40B4-BE49-F238E27FC236}">
+                <a16:creationId xmlns:a16="http://schemas.microsoft.com/office/drawing/2014/main" id="{E581BC46-C60F-ABC7-EB51-5C53D40502B4}"/>
+              </a:ext>
+            </a:extLst>
+          </p:cNvPr>
+          <p:cNvSpPr/>
+          <p:nvPr/>
+        </p:nvSpPr>
+        <p:spPr>
+          <a:xfrm flipH="1" flipV="1">
+            <a:off x="3690496" y="3712901"/>
+            <a:ext cx="731720" cy="300942"/>
+          </a:xfrm>
+          <a:prstGeom prst="uturnArrow">
+            <a:avLst>
+              <a:gd name="adj1" fmla="val 25000"/>
+              <a:gd name="adj2" fmla="val 25000"/>
+              <a:gd name="adj3" fmla="val 25000"/>
+              <a:gd name="adj4" fmla="val 0"/>
+              <a:gd name="adj5" fmla="val 75000"/>
+            </a:avLst>
+          </a:prstGeom>
+          <a:solidFill>
+            <a:schemeClr val="accent6"/>
+          </a:solidFill>
+          <a:ln>
+            <a:noFill/>
+          </a:ln>
+        </p:spPr>
+        <p:style>
+          <a:lnRef idx="1">
+            <a:schemeClr val="accent1"/>
+          </a:lnRef>
+          <a:fillRef idx="3">
+            <a:schemeClr val="accent1"/>
+          </a:fillRef>
+          <a:effectRef idx="2">
+            <a:schemeClr val="accent1"/>
+          </a:effectRef>
+          <a:fontRef idx="minor">
+            <a:schemeClr val="lt1"/>
+          </a:fontRef>
+        </p:style>
+        <p:txBody>
+          <a:bodyPr rtlCol="0" anchor="ctr"/>
+          <a:lstStyle/>
+          <a:p>
+            <a:pPr algn="ctr"/>
+            <a:endParaRPr lang="en-US">
+              <a:solidFill>
+                <a:schemeClr val="tx1"/>
+              </a:solidFill>
+            </a:endParaRPr>
+          </a:p>
+        </p:txBody>
+      </p:sp>
+      <p:sp>
+        <p:nvSpPr>
+          <p:cNvPr id="53" name="TextBox 52">
+            <a:extLst>
+              <a:ext uri="{FF2B5EF4-FFF2-40B4-BE49-F238E27FC236}">
+                <a16:creationId xmlns:a16="http://schemas.microsoft.com/office/drawing/2014/main" id="{EEA45F86-FFDD-F0F9-F226-C0C073C3D50F}"/>
               </a:ext>
             </a:extLst>
           </p:cNvPr>
@@ -6487,7 +6989,7 @@
         </p:nvSpPr>
         <p:spPr>
           <a:xfrm>
-            <a:off x="3781636" y="2044498"/>
+            <a:off x="614455" y="1669896"/>
             <a:ext cx="397866" cy="369332"/>
           </a:xfrm>
           <a:prstGeom prst="rect">
@@ -6515,17 +7017,436 @@
                   <a:srgbClr val="FFC000"/>
                 </a:solidFill>
               </a:rPr>
-              <a:t>3</a:t>
-            </a:r>
-          </a:p>
-        </p:txBody>
-      </p:sp>
-      <p:sp>
-        <p:nvSpPr>
-          <p:cNvPr id="21" name="U-Turn Arrow 20">
+              <a:t>1</a:t>
+            </a:r>
+          </a:p>
+        </p:txBody>
+      </p:sp>
+      <p:sp>
+        <p:nvSpPr>
+          <p:cNvPr id="54" name="TextBox 53">
             <a:extLst>
               <a:ext uri="{FF2B5EF4-FFF2-40B4-BE49-F238E27FC236}">
-                <a16:creationId xmlns:a16="http://schemas.microsoft.com/office/drawing/2014/main" id="{0CFAAC6B-E789-5B79-2D13-C9842CCE4EC6}"/>
+                <a16:creationId xmlns:a16="http://schemas.microsoft.com/office/drawing/2014/main" id="{AB0D9267-65F4-49C5-1B3D-C4277A582543}"/>
+              </a:ext>
+            </a:extLst>
+          </p:cNvPr>
+          <p:cNvSpPr txBox="1"/>
+          <p:nvPr/>
+        </p:nvSpPr>
+        <p:spPr>
+          <a:xfrm>
+            <a:off x="4564054" y="1519267"/>
+            <a:ext cx="670376" cy="369332"/>
+          </a:xfrm>
+          <a:prstGeom prst="rect">
+            <a:avLst/>
+          </a:prstGeom>
+          <a:noFill/>
+        </p:spPr>
+        <p:txBody>
+          <a:bodyPr wrap="none" rtlCol="0">
+            <a:spAutoFit/>
+          </a:bodyPr>
+          <a:lstStyle/>
+          <a:p>
+            <a:r>
+              <a:rPr lang="en-US" b="1" i="1" dirty="0">
+                <a:solidFill>
+                  <a:srgbClr val="00B050"/>
+                </a:solidFill>
+              </a:rPr>
+              <a:t>k</a:t>
+            </a:r>
+            <a:r>
+              <a:rPr lang="en-US" b="1" i="1" baseline="-25000" dirty="0">
+                <a:solidFill>
+                  <a:srgbClr val="00B050"/>
+                </a:solidFill>
+              </a:rPr>
+              <a:t>2m-1</a:t>
+            </a:r>
+          </a:p>
+        </p:txBody>
+      </p:sp>
+      <p:sp>
+        <p:nvSpPr>
+          <p:cNvPr id="55" name="TextBox 54">
+            <a:extLst>
+              <a:ext uri="{FF2B5EF4-FFF2-40B4-BE49-F238E27FC236}">
+                <a16:creationId xmlns:a16="http://schemas.microsoft.com/office/drawing/2014/main" id="{F56CCD83-62D1-4A24-16EA-D73B913C6A9F}"/>
+              </a:ext>
+            </a:extLst>
+          </p:cNvPr>
+          <p:cNvSpPr txBox="1"/>
+          <p:nvPr/>
+        </p:nvSpPr>
+        <p:spPr>
+          <a:xfrm>
+            <a:off x="4611767" y="4062172"/>
+            <a:ext cx="811441" cy="369332"/>
+          </a:xfrm>
+          <a:prstGeom prst="rect">
+            <a:avLst/>
+          </a:prstGeom>
+          <a:noFill/>
+        </p:spPr>
+        <p:txBody>
+          <a:bodyPr wrap="none" rtlCol="0">
+            <a:spAutoFit/>
+          </a:bodyPr>
+          <a:lstStyle/>
+          <a:p>
+            <a:r>
+              <a:rPr lang="en-US" b="1" i="1" dirty="0">
+                <a:solidFill>
+                  <a:srgbClr val="FFC000"/>
+                </a:solidFill>
+              </a:rPr>
+              <a:t>k</a:t>
+            </a:r>
+            <a:r>
+              <a:rPr lang="en-US" b="1" i="1" baseline="-25000" dirty="0">
+                <a:solidFill>
+                  <a:srgbClr val="FFC000"/>
+                </a:solidFill>
+              </a:rPr>
+              <a:t>2(m+1)</a:t>
+            </a:r>
+          </a:p>
+        </p:txBody>
+      </p:sp>
+      <mc:AlternateContent xmlns:mc="http://schemas.openxmlformats.org/markup-compatibility/2006">
+        <mc:Choice xmlns:a14="http://schemas.microsoft.com/office/drawing/2010/main" Requires="a14">
+          <p:sp>
+            <p:nvSpPr>
+              <p:cNvPr id="56" name="TextBox 55">
+                <a:extLst>
+                  <a:ext uri="{FF2B5EF4-FFF2-40B4-BE49-F238E27FC236}">
+                    <a16:creationId xmlns:a16="http://schemas.microsoft.com/office/drawing/2014/main" id="{BB30717A-4C06-8D4A-5351-A6F0737548C5}"/>
+                  </a:ext>
+                </a:extLst>
+              </p:cNvPr>
+              <p:cNvSpPr txBox="1"/>
+              <p:nvPr/>
+            </p:nvSpPr>
+            <p:spPr>
+              <a:xfrm>
+                <a:off x="2414929" y="4792656"/>
+                <a:ext cx="3801554" cy="1251818"/>
+              </a:xfrm>
+              <a:prstGeom prst="rect">
+                <a:avLst/>
+              </a:prstGeom>
+              <a:noFill/>
+            </p:spPr>
+            <p:txBody>
+              <a:bodyPr wrap="none" lIns="0" tIns="0" rIns="0" bIns="0" rtlCol="0">
+                <a:spAutoFit/>
+              </a:bodyPr>
+              <a:lstStyle/>
+              <a:p>
+                <a14:m>
+                  <m:oMathPara xmlns:m="http://schemas.openxmlformats.org/officeDocument/2006/math">
+                    <m:oMathParaPr>
+                      <m:jc m:val="centerGroup"/>
+                    </m:oMathParaPr>
+                    <m:oMath xmlns:m="http://schemas.openxmlformats.org/officeDocument/2006/math">
+                      <m:sSub>
+                        <m:sSubPr>
+                          <m:ctrlPr>
+                            <a:rPr lang="en-US" sz="2000" b="0" i="1" smtClean="0">
+                              <a:latin typeface="Cambria Math" panose="02040503050406030204" pitchFamily="18" charset="0"/>
+                            </a:rPr>
+                          </m:ctrlPr>
+                        </m:sSubPr>
+                        <m:e>
+                          <m:r>
+                            <a:rPr lang="en-US" sz="2000" b="0" i="1" smtClean="0">
+                              <a:latin typeface="Cambria Math" panose="02040503050406030204" pitchFamily="18" charset="0"/>
+                            </a:rPr>
+                            <m:t>𝑟</m:t>
+                          </m:r>
+                        </m:e>
+                        <m:sub>
+                          <m:r>
+                            <a:rPr lang="en-US" sz="2000" b="0" i="1" smtClean="0">
+                              <a:latin typeface="Cambria Math" panose="02040503050406030204" pitchFamily="18" charset="0"/>
+                            </a:rPr>
+                            <m:t>1</m:t>
+                          </m:r>
+                        </m:sub>
+                      </m:sSub>
+                      <m:r>
+                        <a:rPr lang="en-US" sz="2000" b="0" i="1" smtClean="0">
+                          <a:latin typeface="Cambria Math" panose="02040503050406030204" pitchFamily="18" charset="0"/>
+                        </a:rPr>
+                        <m:t>=</m:t>
+                      </m:r>
+                      <m:f>
+                        <m:fPr>
+                          <m:ctrlPr>
+                            <a:rPr lang="en-US" sz="2000" b="0" i="1" smtClean="0">
+                              <a:latin typeface="Cambria Math" panose="02040503050406030204" pitchFamily="18" charset="0"/>
+                            </a:rPr>
+                          </m:ctrlPr>
+                        </m:fPr>
+                        <m:num>
+                          <m:sSub>
+                            <m:sSubPr>
+                              <m:ctrlPr>
+                                <a:rPr lang="en-US" sz="2000" b="0" i="1" smtClean="0">
+                                  <a:latin typeface="Cambria Math" panose="02040503050406030204" pitchFamily="18" charset="0"/>
+                                </a:rPr>
+                              </m:ctrlPr>
+                            </m:sSubPr>
+                            <m:e>
+                              <m:r>
+                                <a:rPr lang="en-US" sz="2000" b="0" i="1" smtClean="0">
+                                  <a:latin typeface="Cambria Math" panose="02040503050406030204" pitchFamily="18" charset="0"/>
+                                </a:rPr>
+                                <m:t>𝑘</m:t>
+                              </m:r>
+                            </m:e>
+                            <m:sub>
+                              <m:r>
+                                <a:rPr lang="en-US" sz="2000" b="0" i="1" smtClean="0">
+                                  <a:latin typeface="Cambria Math" panose="02040503050406030204" pitchFamily="18" charset="0"/>
+                                </a:rPr>
+                                <m:t>2</m:t>
+                              </m:r>
+                            </m:sub>
+                          </m:sSub>
+                        </m:num>
+                        <m:den>
+                          <m:sSub>
+                            <m:sSubPr>
+                              <m:ctrlPr>
+                                <a:rPr lang="en-US" sz="2000" b="0" i="1" smtClean="0">
+                                  <a:latin typeface="Cambria Math" panose="02040503050406030204" pitchFamily="18" charset="0"/>
+                                </a:rPr>
+                              </m:ctrlPr>
+                            </m:sSubPr>
+                            <m:e>
+                              <m:r>
+                                <a:rPr lang="en-US" sz="2000" b="0" i="1" smtClean="0">
+                                  <a:latin typeface="Cambria Math" panose="02040503050406030204" pitchFamily="18" charset="0"/>
+                                </a:rPr>
+                                <m:t>𝑘</m:t>
+                              </m:r>
+                            </m:e>
+                            <m:sub>
+                              <m:r>
+                                <a:rPr lang="en-US" sz="2000" b="0" i="1" smtClean="0">
+                                  <a:latin typeface="Cambria Math" panose="02040503050406030204" pitchFamily="18" charset="0"/>
+                                </a:rPr>
+                                <m:t>1</m:t>
+                              </m:r>
+                            </m:sub>
+                          </m:sSub>
+                        </m:den>
+                      </m:f>
+                      <m:r>
+                        <a:rPr lang="en-US" sz="2000" b="0" i="1" smtClean="0">
+                          <a:latin typeface="Cambria Math" panose="02040503050406030204" pitchFamily="18" charset="0"/>
+                        </a:rPr>
+                        <m:t>≫</m:t>
+                      </m:r>
+                      <m:f>
+                        <m:fPr>
+                          <m:ctrlPr>
+                            <a:rPr lang="en-US" sz="2000" b="0" i="1" smtClean="0">
+                              <a:latin typeface="Cambria Math" panose="02040503050406030204" pitchFamily="18" charset="0"/>
+                            </a:rPr>
+                          </m:ctrlPr>
+                        </m:fPr>
+                        <m:num>
+                          <m:sSub>
+                            <m:sSubPr>
+                              <m:ctrlPr>
+                                <a:rPr lang="en-US" sz="2000" b="0" i="1" smtClean="0">
+                                  <a:latin typeface="Cambria Math" panose="02040503050406030204" pitchFamily="18" charset="0"/>
+                                </a:rPr>
+                              </m:ctrlPr>
+                            </m:sSubPr>
+                            <m:e>
+                              <m:r>
+                                <a:rPr lang="en-US" sz="2000" b="0" i="1" smtClean="0">
+                                  <a:latin typeface="Cambria Math" panose="02040503050406030204" pitchFamily="18" charset="0"/>
+                                </a:rPr>
+                                <m:t>𝑘</m:t>
+                              </m:r>
+                            </m:e>
+                            <m:sub>
+                              <m:r>
+                                <a:rPr lang="en-US" sz="2000" b="0" i="1" smtClean="0">
+                                  <a:latin typeface="Cambria Math" panose="02040503050406030204" pitchFamily="18" charset="0"/>
+                                </a:rPr>
+                                <m:t>2</m:t>
+                              </m:r>
+                              <m:r>
+                                <a:rPr lang="en-US" sz="2000" b="0" i="1" smtClean="0">
+                                  <a:latin typeface="Cambria Math" panose="02040503050406030204" pitchFamily="18" charset="0"/>
+                                </a:rPr>
+                                <m:t>𝑚</m:t>
+                              </m:r>
+                            </m:sub>
+                          </m:sSub>
+                        </m:num>
+                        <m:den>
+                          <m:sSub>
+                            <m:sSubPr>
+                              <m:ctrlPr>
+                                <a:rPr lang="en-US" sz="2000" b="0" i="1" smtClean="0">
+                                  <a:latin typeface="Cambria Math" panose="02040503050406030204" pitchFamily="18" charset="0"/>
+                                </a:rPr>
+                              </m:ctrlPr>
+                            </m:sSubPr>
+                            <m:e>
+                              <m:r>
+                                <a:rPr lang="en-US" sz="2000" b="0" i="1" smtClean="0">
+                                  <a:latin typeface="Cambria Math" panose="02040503050406030204" pitchFamily="18" charset="0"/>
+                                </a:rPr>
+                                <m:t>𝑘</m:t>
+                              </m:r>
+                            </m:e>
+                            <m:sub>
+                              <m:r>
+                                <a:rPr lang="en-US" sz="2000" b="0" i="1" smtClean="0">
+                                  <a:latin typeface="Cambria Math" panose="02040503050406030204" pitchFamily="18" charset="0"/>
+                                </a:rPr>
+                                <m:t>2</m:t>
+                              </m:r>
+                              <m:r>
+                                <a:rPr lang="en-US" sz="2000" b="0" i="1" smtClean="0">
+                                  <a:latin typeface="Cambria Math" panose="02040503050406030204" pitchFamily="18" charset="0"/>
+                                </a:rPr>
+                                <m:t>𝑚</m:t>
+                              </m:r>
+                              <m:r>
+                                <a:rPr lang="en-US" sz="2000" b="0" i="1" smtClean="0">
+                                  <a:latin typeface="Cambria Math" panose="02040503050406030204" pitchFamily="18" charset="0"/>
+                                </a:rPr>
+                                <m:t>−1</m:t>
+                              </m:r>
+                            </m:sub>
+                          </m:sSub>
+                        </m:den>
+                      </m:f>
+                      <m:r>
+                        <a:rPr lang="en-US" sz="2000" b="0" i="1" smtClean="0">
+                          <a:latin typeface="Cambria Math" panose="02040503050406030204" pitchFamily="18" charset="0"/>
+                        </a:rPr>
+                        <m:t>=</m:t>
+                      </m:r>
+                      <m:sSub>
+                        <m:sSubPr>
+                          <m:ctrlPr>
+                            <a:rPr lang="en-US" sz="2000" b="0" i="1" smtClean="0">
+                              <a:latin typeface="Cambria Math" panose="02040503050406030204" pitchFamily="18" charset="0"/>
+                            </a:rPr>
+                          </m:ctrlPr>
+                        </m:sSubPr>
+                        <m:e>
+                          <m:r>
+                            <a:rPr lang="en-US" sz="2000" b="0" i="1" smtClean="0">
+                              <a:latin typeface="Cambria Math" panose="02040503050406030204" pitchFamily="18" charset="0"/>
+                            </a:rPr>
+                            <m:t>𝑟</m:t>
+                          </m:r>
+                        </m:e>
+                        <m:sub>
+                          <m:r>
+                            <a:rPr lang="en-US" sz="2000" b="0" i="1" smtClean="0">
+                              <a:latin typeface="Cambria Math" panose="02040503050406030204" pitchFamily="18" charset="0"/>
+                            </a:rPr>
+                            <m:t>𝑚</m:t>
+                          </m:r>
+                        </m:sub>
+                      </m:sSub>
+                      <m:r>
+                        <a:rPr lang="en-US" sz="2000" b="0" i="1" smtClean="0">
+                          <a:latin typeface="Cambria Math" panose="02040503050406030204" pitchFamily="18" charset="0"/>
+                        </a:rPr>
+                        <m:t>&lt;1, </m:t>
+                      </m:r>
+                      <m:r>
+                        <a:rPr lang="en-US" sz="2000" b="0" i="1" smtClean="0">
+                          <a:latin typeface="Cambria Math" panose="02040503050406030204" pitchFamily="18" charset="0"/>
+                        </a:rPr>
+                        <m:t>𝑚</m:t>
+                      </m:r>
+                      <m:r>
+                        <a:rPr lang="en-US" sz="2000" b="0" i="1" smtClean="0">
+                          <a:latin typeface="Cambria Math" panose="02040503050406030204" pitchFamily="18" charset="0"/>
+                        </a:rPr>
+                        <m:t>&gt;1</m:t>
+                      </m:r>
+                    </m:oMath>
+                  </m:oMathPara>
+                </a14:m>
+                <a:endParaRPr lang="en-US" sz="2000" b="0" dirty="0"/>
+              </a:p>
+              <a:p>
+                <a:endParaRPr lang="en-US" sz="2000" b="0" dirty="0"/>
+              </a:p>
+              <a:p>
+                <a:endParaRPr lang="en-US" sz="2000" dirty="0"/>
+              </a:p>
+            </p:txBody>
+          </p:sp>
+        </mc:Choice>
+        <mc:Fallback>
+          <p:sp>
+            <p:nvSpPr>
+              <p:cNvPr id="56" name="TextBox 55">
+                <a:extLst>
+                  <a:ext uri="{FF2B5EF4-FFF2-40B4-BE49-F238E27FC236}">
+                    <a16:creationId xmlns:a16="http://schemas.microsoft.com/office/drawing/2014/main" id="{BB30717A-4C06-8D4A-5351-A6F0737548C5}"/>
+                  </a:ext>
+                </a:extLst>
+              </p:cNvPr>
+              <p:cNvSpPr txBox="1">
+                <a:spLocks noRot="1" noChangeAspect="1" noMove="1" noResize="1" noEditPoints="1" noAdjustHandles="1" noChangeArrowheads="1" noChangeShapeType="1" noTextEdit="1"/>
+              </p:cNvSpPr>
+              <p:nvPr/>
+            </p:nvSpPr>
+            <p:spPr>
+              <a:xfrm>
+                <a:off x="2414929" y="4792656"/>
+                <a:ext cx="3801554" cy="1251818"/>
+              </a:xfrm>
+              <a:prstGeom prst="rect">
+                <a:avLst/>
+              </a:prstGeom>
+              <a:blipFill>
+                <a:blip r:embed="rId3"/>
+                <a:stretch>
+                  <a:fillRect l="-333" t="-1000" r="-1000"/>
+                </a:stretch>
+              </a:blipFill>
+            </p:spPr>
+            <p:txBody>
+              <a:bodyPr/>
+              <a:lstStyle/>
+              <a:p>
+                <a:r>
+                  <a:rPr lang="en-US">
+                    <a:noFill/>
+                  </a:rPr>
+                  <a:t> </a:t>
+                </a:r>
+              </a:p>
+            </p:txBody>
+          </p:sp>
+        </mc:Fallback>
+      </mc:AlternateContent>
+      <p:sp>
+        <p:nvSpPr>
+          <p:cNvPr id="57" name="U-Turn Arrow 56">
+            <a:extLst>
+              <a:ext uri="{FF2B5EF4-FFF2-40B4-BE49-F238E27FC236}">
+                <a16:creationId xmlns:a16="http://schemas.microsoft.com/office/drawing/2014/main" id="{F41A5AD8-1DC5-C48C-CA5B-7145D6C0AD56}"/>
               </a:ext>
             </a:extLst>
           </p:cNvPr>
@@ -6533,9 +7454,9 @@
           <p:nvPr/>
         </p:nvSpPr>
         <p:spPr>
-          <a:xfrm rot="10800000">
-            <a:off x="3699744" y="3719317"/>
-            <a:ext cx="727376" cy="625564"/>
+          <a:xfrm rot="10800000" flipH="1" flipV="1">
+            <a:off x="4574588" y="1979261"/>
+            <a:ext cx="663651" cy="763931"/>
           </a:xfrm>
           <a:prstGeom prst="uturnArrow">
             <a:avLst/>
@@ -6573,157 +7494,48 @@
       </p:sp>
       <p:sp>
         <p:nvSpPr>
-          <p:cNvPr id="25" name="U-Turn Arrow 24">
+          <p:cNvPr id="58" name="TextBox 57">
             <a:extLst>
               <a:ext uri="{FF2B5EF4-FFF2-40B4-BE49-F238E27FC236}">
-                <a16:creationId xmlns:a16="http://schemas.microsoft.com/office/drawing/2014/main" id="{5E82315B-15C7-39B6-A49B-77606449AB27}"/>
+                <a16:creationId xmlns:a16="http://schemas.microsoft.com/office/drawing/2014/main" id="{2EF59675-530D-7064-0B37-55699E87A2ED}"/>
               </a:ext>
             </a:extLst>
           </p:cNvPr>
-          <p:cNvSpPr/>
+          <p:cNvSpPr txBox="1"/>
           <p:nvPr/>
         </p:nvSpPr>
         <p:spPr>
-          <a:xfrm rot="10800000">
-            <a:off x="4940358" y="3719317"/>
-            <a:ext cx="727376" cy="625564"/>
-          </a:xfrm>
-          <a:prstGeom prst="uturnArrow">
-            <a:avLst/>
-          </a:prstGeom>
-          <a:solidFill>
-            <a:srgbClr val="00B050"/>
-          </a:solidFill>
-        </p:spPr>
-        <p:style>
-          <a:lnRef idx="1">
-            <a:schemeClr val="accent1"/>
-          </a:lnRef>
-          <a:fillRef idx="3">
-            <a:schemeClr val="accent1"/>
-          </a:fillRef>
-          <a:effectRef idx="2">
-            <a:schemeClr val="accent1"/>
-          </a:effectRef>
-          <a:fontRef idx="minor">
-            <a:schemeClr val="lt1"/>
-          </a:fontRef>
-        </p:style>
-        <p:txBody>
-          <a:bodyPr rtlCol="0" anchor="ctr"/>
+          <a:xfrm>
+            <a:off x="7784648" y="4238976"/>
+            <a:ext cx="747320" cy="369332"/>
+          </a:xfrm>
+          <a:prstGeom prst="rect">
+            <a:avLst/>
+          </a:prstGeom>
+          <a:noFill/>
+        </p:spPr>
+        <p:txBody>
+          <a:bodyPr wrap="none" rtlCol="0">
+            <a:spAutoFit/>
+          </a:bodyPr>
           <a:lstStyle/>
           <a:p>
-            <a:pPr algn="ctr"/>
-            <a:endParaRPr lang="en-US">
-              <a:solidFill>
-                <a:schemeClr val="tx1"/>
-              </a:solidFill>
-            </a:endParaRPr>
-          </a:p>
-        </p:txBody>
-      </p:sp>
-      <p:sp>
-        <p:nvSpPr>
-          <p:cNvPr id="27" name="U-Turn Arrow 26">
-            <a:extLst>
-              <a:ext uri="{FF2B5EF4-FFF2-40B4-BE49-F238E27FC236}">
-                <a16:creationId xmlns:a16="http://schemas.microsoft.com/office/drawing/2014/main" id="{35F94AFA-25A6-0DDA-2DC8-FE5FE783CBD5}"/>
-              </a:ext>
-            </a:extLst>
-          </p:cNvPr>
-          <p:cNvSpPr/>
-          <p:nvPr/>
-        </p:nvSpPr>
-        <p:spPr>
-          <a:xfrm rot="10800000">
-            <a:off x="5827140" y="3738376"/>
-            <a:ext cx="1997598" cy="763931"/>
-          </a:xfrm>
-          <a:prstGeom prst="uturnArrow">
-            <a:avLst/>
-          </a:prstGeom>
-          <a:solidFill>
-            <a:srgbClr val="00B050"/>
-          </a:solidFill>
-        </p:spPr>
-        <p:style>
-          <a:lnRef idx="1">
-            <a:schemeClr val="accent1"/>
-          </a:lnRef>
-          <a:fillRef idx="3">
-            <a:schemeClr val="accent1"/>
-          </a:fillRef>
-          <a:effectRef idx="2">
-            <a:schemeClr val="accent1"/>
-          </a:effectRef>
-          <a:fontRef idx="minor">
-            <a:schemeClr val="lt1"/>
-          </a:fontRef>
-        </p:style>
-        <p:txBody>
-          <a:bodyPr rtlCol="0" anchor="ctr"/>
-          <a:lstStyle/>
-          <a:p>
-            <a:pPr algn="ctr"/>
-            <a:endParaRPr lang="en-US">
-              <a:solidFill>
-                <a:schemeClr val="tx1"/>
-              </a:solidFill>
-            </a:endParaRPr>
-          </a:p>
-        </p:txBody>
-      </p:sp>
-      <p:sp>
-        <p:nvSpPr>
-          <p:cNvPr id="28" name="U-Turn Arrow 27">
-            <a:extLst>
-              <a:ext uri="{FF2B5EF4-FFF2-40B4-BE49-F238E27FC236}">
-                <a16:creationId xmlns:a16="http://schemas.microsoft.com/office/drawing/2014/main" id="{05F2509A-FBE5-B764-62CB-3AE4C393B6E4}"/>
-              </a:ext>
-            </a:extLst>
-          </p:cNvPr>
-          <p:cNvSpPr/>
-          <p:nvPr/>
-        </p:nvSpPr>
-        <p:spPr>
-          <a:xfrm>
-            <a:off x="5763720" y="2338577"/>
-            <a:ext cx="1997598" cy="300942"/>
-          </a:xfrm>
-          <a:prstGeom prst="uturnArrow">
-            <a:avLst/>
-          </a:prstGeom>
-          <a:solidFill>
-            <a:schemeClr val="accent6"/>
-          </a:solidFill>
-          <a:ln>
-            <a:noFill/>
-          </a:ln>
-        </p:spPr>
-        <p:style>
-          <a:lnRef idx="1">
-            <a:schemeClr val="accent1"/>
-          </a:lnRef>
-          <a:fillRef idx="3">
-            <a:schemeClr val="accent1"/>
-          </a:fillRef>
-          <a:effectRef idx="2">
-            <a:schemeClr val="accent1"/>
-          </a:effectRef>
-          <a:fontRef idx="minor">
-            <a:schemeClr val="lt1"/>
-          </a:fontRef>
-        </p:style>
-        <p:txBody>
-          <a:bodyPr rtlCol="0" anchor="ctr"/>
-          <a:lstStyle/>
-          <a:p>
-            <a:pPr algn="ctr"/>
-            <a:endParaRPr lang="en-US">
-              <a:solidFill>
-                <a:schemeClr val="tx1"/>
-              </a:solidFill>
-            </a:endParaRPr>
+            <a:r>
+              <a:rPr lang="en-US" b="1" i="1" dirty="0">
+                <a:solidFill>
+                  <a:srgbClr val="FFC000"/>
+                </a:solidFill>
+              </a:rPr>
+              <a:t>k</a:t>
+            </a:r>
+            <a:r>
+              <a:rPr lang="en-US" b="1" i="1" baseline="-25000" dirty="0">
+                <a:solidFill>
+                  <a:srgbClr val="FFC000"/>
+                </a:solidFill>
+              </a:rPr>
+              <a:t>2(N-1)</a:t>
+            </a:r>
           </a:p>
         </p:txBody>
       </p:sp>

</xml_diff>

<commit_message>
Plot for control analysis
</commit_message>
<xml_diff>
--- a/plots/frequency_response_paper_figures.pptx
+++ b/plots/frequency_response_paper_figures.pptx
@@ -5,14 +5,15 @@
     <p:sldMasterId id="2147483648" r:id="rId1"/>
   </p:sldMasterIdLst>
   <p:notesMasterIdLst>
-    <p:notesMasterId r:id="rId4"/>
+    <p:notesMasterId r:id="rId5"/>
   </p:notesMasterIdLst>
   <p:handoutMasterIdLst>
-    <p:handoutMasterId r:id="rId5"/>
+    <p:handoutMasterId r:id="rId6"/>
   </p:handoutMasterIdLst>
   <p:sldIdLst>
     <p:sldId id="260" r:id="rId2"/>
     <p:sldId id="261" r:id="rId3"/>
+    <p:sldId id="262" r:id="rId4"/>
   </p:sldIdLst>
   <p:sldSz cx="9144000" cy="6858000" type="screen4x3"/>
   <p:notesSz cx="6858000" cy="9144000"/>
@@ -275,7 +276,7 @@
               <a:pPr>
                 <a:defRPr/>
               </a:pPr>
-              <a:t>8/17/23</a:t>
+              <a:t>8/25/23</a:t>
             </a:fld>
             <a:endParaRPr lang="en-US" altLang="x-none"/>
           </a:p>
@@ -484,7 +485,7 @@
               <a:pPr>
                 <a:defRPr/>
               </a:pPr>
-              <a:t>8/17/23</a:t>
+              <a:t>8/25/23</a:t>
             </a:fld>
             <a:endParaRPr lang="en-US" altLang="x-none"/>
           </a:p>
@@ -1017,6 +1018,96 @@
     <p:extLst>
       <p:ext uri="{BB962C8B-B14F-4D97-AF65-F5344CB8AC3E}">
         <p14:creationId xmlns:p14="http://schemas.microsoft.com/office/powerpoint/2010/main" val="1026110309"/>
+      </p:ext>
+    </p:extLst>
+  </p:cSld>
+  <p:clrMapOvr>
+    <a:masterClrMapping/>
+  </p:clrMapOvr>
+</p:notes>
+</file>
+
+<file path=ppt/notesSlides/notesSlide3.xml><?xml version="1.0" encoding="utf-8"?>
+<p:notes xmlns:a="http://schemas.openxmlformats.org/drawingml/2006/main" xmlns:r="http://schemas.openxmlformats.org/officeDocument/2006/relationships" xmlns:p="http://schemas.openxmlformats.org/presentationml/2006/main">
+  <p:cSld>
+    <p:spTree>
+      <p:nvGrpSpPr>
+        <p:cNvPr id="1" name=""/>
+        <p:cNvGrpSpPr/>
+        <p:nvPr/>
+      </p:nvGrpSpPr>
+      <p:grpSpPr>
+        <a:xfrm>
+          <a:off x="0" y="0"/>
+          <a:ext cx="0" cy="0"/>
+          <a:chOff x="0" y="0"/>
+          <a:chExt cx="0" cy="0"/>
+        </a:xfrm>
+      </p:grpSpPr>
+      <p:sp>
+        <p:nvSpPr>
+          <p:cNvPr id="2" name="Slide Image Placeholder 1"/>
+          <p:cNvSpPr>
+            <a:spLocks noGrp="1" noRot="1" noChangeAspect="1"/>
+          </p:cNvSpPr>
+          <p:nvPr>
+            <p:ph type="sldImg"/>
+          </p:nvPr>
+        </p:nvSpPr>
+        <p:spPr/>
+      </p:sp>
+      <p:sp>
+        <p:nvSpPr>
+          <p:cNvPr id="3" name="Notes Placeholder 2"/>
+          <p:cNvSpPr>
+            <a:spLocks noGrp="1"/>
+          </p:cNvSpPr>
+          <p:nvPr>
+            <p:ph type="body" idx="1"/>
+          </p:nvPr>
+        </p:nvSpPr>
+        <p:spPr/>
+        <p:txBody>
+          <a:bodyPr/>
+          <a:lstStyle/>
+          <a:p>
+            <a:endParaRPr lang="en-US" dirty="0"/>
+          </a:p>
+        </p:txBody>
+      </p:sp>
+      <p:sp>
+        <p:nvSpPr>
+          <p:cNvPr id="4" name="Slide Number Placeholder 3"/>
+          <p:cNvSpPr>
+            <a:spLocks noGrp="1"/>
+          </p:cNvSpPr>
+          <p:nvPr>
+            <p:ph type="sldNum" sz="quarter" idx="5"/>
+          </p:nvPr>
+        </p:nvSpPr>
+        <p:spPr/>
+        <p:txBody>
+          <a:bodyPr/>
+          <a:lstStyle/>
+          <a:p>
+            <a:pPr>
+              <a:defRPr/>
+            </a:pPr>
+            <a:fld id="{1E3608CA-DBCA-4E8F-8DAB-6E1AFAF19782}" type="slidenum">
+              <a:rPr lang="en-US" altLang="x-none" smtClean="0"/>
+              <a:pPr>
+                <a:defRPr/>
+              </a:pPr>
+              <a:t>3</a:t>
+            </a:fld>
+            <a:endParaRPr lang="en-US" altLang="x-none"/>
+          </a:p>
+        </p:txBody>
+      </p:sp>
+    </p:spTree>
+    <p:extLst>
+      <p:ext uri="{BB962C8B-B14F-4D97-AF65-F5344CB8AC3E}">
+        <p14:creationId xmlns:p14="http://schemas.microsoft.com/office/powerpoint/2010/main" val="3350195125"/>
       </p:ext>
     </p:extLst>
   </p:cSld>
@@ -7116,8 +7207,8 @@
           </a:p>
         </p:txBody>
       </p:sp>
-      <mc:AlternateContent xmlns:mc="http://schemas.openxmlformats.org/markup-compatibility/2006">
-        <mc:Choice xmlns:a14="http://schemas.microsoft.com/office/drawing/2010/main" Requires="a14">
+      <mc:AlternateContent xmlns:mc="http://schemas.openxmlformats.org/markup-compatibility/2006" xmlns:a14="http://schemas.microsoft.com/office/drawing/2010/main">
+        <mc:Choice Requires="a14">
           <p:sp>
             <p:nvSpPr>
               <p:cNvPr id="56" name="TextBox 55">
@@ -7146,6 +7237,7 @@
               </a:bodyPr>
               <a:lstStyle/>
               <a:p>
+                <a:pPr/>
                 <a14:m>
                   <m:oMathPara xmlns:m="http://schemas.openxmlformats.org/officeDocument/2006/math">
                     <m:oMathParaPr>
@@ -7396,7 +7488,7 @@
             </p:txBody>
           </p:sp>
         </mc:Choice>
-        <mc:Fallback>
+        <mc:Fallback xmlns="">
           <p:sp>
             <p:nvSpPr>
               <p:cNvPr id="56" name="TextBox 55">
@@ -7543,6 +7635,2746 @@
     <p:extLst>
       <p:ext uri="{BB962C8B-B14F-4D97-AF65-F5344CB8AC3E}">
         <p14:creationId xmlns:p14="http://schemas.microsoft.com/office/powerpoint/2010/main" val="3520516607"/>
+      </p:ext>
+    </p:extLst>
+  </p:cSld>
+  <p:clrMapOvr>
+    <a:masterClrMapping/>
+  </p:clrMapOvr>
+</p:sld>
+</file>
+
+<file path=ppt/slides/slide3.xml><?xml version="1.0" encoding="utf-8"?>
+<p:sld xmlns:a="http://schemas.openxmlformats.org/drawingml/2006/main" xmlns:r="http://schemas.openxmlformats.org/officeDocument/2006/relationships" xmlns:p="http://schemas.openxmlformats.org/presentationml/2006/main">
+  <p:cSld>
+    <p:spTree>
+      <p:nvGrpSpPr>
+        <p:cNvPr id="1" name=""/>
+        <p:cNvGrpSpPr/>
+        <p:nvPr/>
+      </p:nvGrpSpPr>
+      <p:grpSpPr>
+        <a:xfrm>
+          <a:off x="0" y="0"/>
+          <a:ext cx="0" cy="0"/>
+          <a:chOff x="0" y="0"/>
+          <a:chExt cx="0" cy="0"/>
+        </a:xfrm>
+      </p:grpSpPr>
+      <p:sp>
+        <p:nvSpPr>
+          <p:cNvPr id="9" name="TextBox 8">
+            <a:extLst>
+              <a:ext uri="{FF2B5EF4-FFF2-40B4-BE49-F238E27FC236}">
+                <a16:creationId xmlns:a16="http://schemas.microsoft.com/office/drawing/2014/main" id="{54157578-A47E-2B72-971B-C5083135C6E0}"/>
+              </a:ext>
+            </a:extLst>
+          </p:cNvPr>
+          <p:cNvSpPr txBox="1"/>
+          <p:nvPr/>
+        </p:nvSpPr>
+        <p:spPr>
+          <a:xfrm>
+            <a:off x="625035" y="2465408"/>
+            <a:ext cx="556563" cy="523220"/>
+          </a:xfrm>
+          <a:prstGeom prst="rect">
+            <a:avLst/>
+          </a:prstGeom>
+          <a:noFill/>
+        </p:spPr>
+        <p:txBody>
+          <a:bodyPr wrap="none" rtlCol="0">
+            <a:spAutoFit/>
+          </a:bodyPr>
+          <a:lstStyle/>
+          <a:p>
+            <a:r>
+              <a:rPr lang="en-US" sz="2800" dirty="0"/>
+              <a:t>S</a:t>
+            </a:r>
+            <a:r>
+              <a:rPr lang="en-US" sz="2800" baseline="-25000" dirty="0"/>
+              <a:t>1</a:t>
+            </a:r>
+            <a:endParaRPr lang="en-US" sz="2800" dirty="0"/>
+          </a:p>
+        </p:txBody>
+      </p:sp>
+      <p:sp>
+        <p:nvSpPr>
+          <p:cNvPr id="10" name="TextBox 9">
+            <a:extLst>
+              <a:ext uri="{FF2B5EF4-FFF2-40B4-BE49-F238E27FC236}">
+                <a16:creationId xmlns:a16="http://schemas.microsoft.com/office/drawing/2014/main" id="{BC7C7872-892F-F98A-05F5-A3CC915E7641}"/>
+              </a:ext>
+            </a:extLst>
+          </p:cNvPr>
+          <p:cNvSpPr txBox="1"/>
+          <p:nvPr/>
+        </p:nvSpPr>
+        <p:spPr>
+          <a:xfrm>
+            <a:off x="1889137" y="2465408"/>
+            <a:ext cx="556563" cy="523220"/>
+          </a:xfrm>
+          <a:prstGeom prst="rect">
+            <a:avLst/>
+          </a:prstGeom>
+          <a:noFill/>
+        </p:spPr>
+        <p:txBody>
+          <a:bodyPr wrap="none" rtlCol="0">
+            <a:spAutoFit/>
+          </a:bodyPr>
+          <a:lstStyle/>
+          <a:p>
+            <a:r>
+              <a:rPr lang="en-US" sz="2800" dirty="0"/>
+              <a:t>S</a:t>
+            </a:r>
+            <a:r>
+              <a:rPr lang="en-US" sz="2800" baseline="-25000" dirty="0"/>
+              <a:t>2</a:t>
+            </a:r>
+            <a:endParaRPr lang="en-US" sz="2800" dirty="0"/>
+          </a:p>
+        </p:txBody>
+      </p:sp>
+      <p:sp>
+        <p:nvSpPr>
+          <p:cNvPr id="12" name="TextBox 11">
+            <a:extLst>
+              <a:ext uri="{FF2B5EF4-FFF2-40B4-BE49-F238E27FC236}">
+                <a16:creationId xmlns:a16="http://schemas.microsoft.com/office/drawing/2014/main" id="{343491E1-8D07-5BBC-E057-C862A6D98A03}"/>
+              </a:ext>
+            </a:extLst>
+          </p:cNvPr>
+          <p:cNvSpPr txBox="1"/>
+          <p:nvPr/>
+        </p:nvSpPr>
+        <p:spPr>
+          <a:xfrm>
+            <a:off x="3153239" y="2465408"/>
+            <a:ext cx="556563" cy="523220"/>
+          </a:xfrm>
+          <a:prstGeom prst="rect">
+            <a:avLst/>
+          </a:prstGeom>
+          <a:noFill/>
+        </p:spPr>
+        <p:txBody>
+          <a:bodyPr wrap="none" rtlCol="0">
+            <a:spAutoFit/>
+          </a:bodyPr>
+          <a:lstStyle/>
+          <a:p>
+            <a:r>
+              <a:rPr lang="en-US" sz="2800" dirty="0"/>
+              <a:t>S</a:t>
+            </a:r>
+            <a:r>
+              <a:rPr lang="en-US" sz="2800" baseline="-25000" dirty="0"/>
+              <a:t>3</a:t>
+            </a:r>
+            <a:endParaRPr lang="en-US" sz="2800" dirty="0"/>
+          </a:p>
+        </p:txBody>
+      </p:sp>
+      <p:sp>
+        <p:nvSpPr>
+          <p:cNvPr id="13" name="TextBox 12">
+            <a:extLst>
+              <a:ext uri="{FF2B5EF4-FFF2-40B4-BE49-F238E27FC236}">
+                <a16:creationId xmlns:a16="http://schemas.microsoft.com/office/drawing/2014/main" id="{EAB9AFDB-8369-E13B-D3BA-E2ED7D05A0F0}"/>
+              </a:ext>
+            </a:extLst>
+          </p:cNvPr>
+          <p:cNvSpPr txBox="1"/>
+          <p:nvPr/>
+        </p:nvSpPr>
+        <p:spPr>
+          <a:xfrm>
+            <a:off x="4417341" y="2465407"/>
+            <a:ext cx="556563" cy="523220"/>
+          </a:xfrm>
+          <a:prstGeom prst="rect">
+            <a:avLst/>
+          </a:prstGeom>
+          <a:noFill/>
+        </p:spPr>
+        <p:txBody>
+          <a:bodyPr wrap="none" rtlCol="0">
+            <a:spAutoFit/>
+          </a:bodyPr>
+          <a:lstStyle/>
+          <a:p>
+            <a:r>
+              <a:rPr lang="en-US" sz="2800" dirty="0"/>
+              <a:t>S</a:t>
+            </a:r>
+            <a:r>
+              <a:rPr lang="en-US" sz="2800" baseline="-25000" dirty="0"/>
+              <a:t>4</a:t>
+            </a:r>
+            <a:endParaRPr lang="en-US" sz="2800" dirty="0"/>
+          </a:p>
+        </p:txBody>
+      </p:sp>
+      <p:sp>
+        <p:nvSpPr>
+          <p:cNvPr id="14" name="TextBox 13">
+            <a:extLst>
+              <a:ext uri="{FF2B5EF4-FFF2-40B4-BE49-F238E27FC236}">
+                <a16:creationId xmlns:a16="http://schemas.microsoft.com/office/drawing/2014/main" id="{CD4B2C52-541D-3014-696C-01E15483D63A}"/>
+              </a:ext>
+            </a:extLst>
+          </p:cNvPr>
+          <p:cNvSpPr txBox="1"/>
+          <p:nvPr/>
+        </p:nvSpPr>
+        <p:spPr>
+          <a:xfrm>
+            <a:off x="6410640" y="2471759"/>
+            <a:ext cx="809837" cy="523220"/>
+          </a:xfrm>
+          <a:prstGeom prst="rect">
+            <a:avLst/>
+          </a:prstGeom>
+          <a:noFill/>
+        </p:spPr>
+        <p:txBody>
+          <a:bodyPr wrap="none" rtlCol="0">
+            <a:spAutoFit/>
+          </a:bodyPr>
+          <a:lstStyle/>
+          <a:p>
+            <a:r>
+              <a:rPr lang="en-US" sz="2800" dirty="0"/>
+              <a:t>S</a:t>
+            </a:r>
+            <a:r>
+              <a:rPr lang="en-US" sz="2800" i="1" baseline="-25000" dirty="0"/>
+              <a:t>N</a:t>
+            </a:r>
+            <a:r>
+              <a:rPr lang="en-US" sz="2800" baseline="-25000" dirty="0"/>
+              <a:t>-1</a:t>
+            </a:r>
+            <a:endParaRPr lang="en-US" sz="2800" dirty="0"/>
+          </a:p>
+        </p:txBody>
+      </p:sp>
+      <p:sp>
+        <p:nvSpPr>
+          <p:cNvPr id="15" name="TextBox 14">
+            <a:extLst>
+              <a:ext uri="{FF2B5EF4-FFF2-40B4-BE49-F238E27FC236}">
+                <a16:creationId xmlns:a16="http://schemas.microsoft.com/office/drawing/2014/main" id="{59869952-D603-E63B-96C8-9DBEF23F6D7A}"/>
+              </a:ext>
+            </a:extLst>
+          </p:cNvPr>
+          <p:cNvSpPr txBox="1"/>
+          <p:nvPr/>
+        </p:nvSpPr>
+        <p:spPr>
+          <a:xfrm>
+            <a:off x="7549313" y="2471758"/>
+            <a:ext cx="596638" cy="523220"/>
+          </a:xfrm>
+          <a:prstGeom prst="rect">
+            <a:avLst/>
+          </a:prstGeom>
+          <a:noFill/>
+        </p:spPr>
+        <p:txBody>
+          <a:bodyPr wrap="none" rtlCol="0">
+            <a:spAutoFit/>
+          </a:bodyPr>
+          <a:lstStyle/>
+          <a:p>
+            <a:r>
+              <a:rPr lang="en-US" sz="2800" dirty="0"/>
+              <a:t>S</a:t>
+            </a:r>
+            <a:r>
+              <a:rPr lang="en-US" sz="2800" i="1" baseline="-25000" dirty="0"/>
+              <a:t>N</a:t>
+            </a:r>
+            <a:endParaRPr lang="en-US" sz="2800" i="1" dirty="0"/>
+          </a:p>
+        </p:txBody>
+      </p:sp>
+      <p:cxnSp>
+        <p:nvCxnSpPr>
+          <p:cNvPr id="23" name="Curved Connector 22">
+            <a:extLst>
+              <a:ext uri="{FF2B5EF4-FFF2-40B4-BE49-F238E27FC236}">
+                <a16:creationId xmlns:a16="http://schemas.microsoft.com/office/drawing/2014/main" id="{19740C2A-E4E8-E392-709D-DA9B28447BEE}"/>
+              </a:ext>
+            </a:extLst>
+          </p:cNvPr>
+          <p:cNvCxnSpPr>
+            <a:cxnSpLocks/>
+            <a:stCxn id="9" idx="0"/>
+            <a:endCxn id="10" idx="0"/>
+          </p:cNvCxnSpPr>
+          <p:nvPr/>
+        </p:nvCxnSpPr>
+        <p:spPr>
+          <a:xfrm rot="5400000" flipH="1" flipV="1">
+            <a:off x="1535368" y="1833357"/>
+            <a:ext cx="12700" cy="1264102"/>
+          </a:xfrm>
+          <a:prstGeom prst="curvedConnector3">
+            <a:avLst>
+              <a:gd name="adj1" fmla="val 1800000"/>
+            </a:avLst>
+          </a:prstGeom>
+          <a:ln w="28575">
+            <a:solidFill>
+              <a:schemeClr val="tx1"/>
+            </a:solidFill>
+            <a:tailEnd type="triangle" w="lg" len="med"/>
+          </a:ln>
+          <a:effectLst>
+            <a:outerShdw dist="20000" sx="1000" sy="1000" rotWithShape="0">
+              <a:srgbClr val="000000"/>
+            </a:outerShdw>
+          </a:effectLst>
+        </p:spPr>
+        <p:style>
+          <a:lnRef idx="2">
+            <a:schemeClr val="accent1"/>
+          </a:lnRef>
+          <a:fillRef idx="0">
+            <a:schemeClr val="accent1"/>
+          </a:fillRef>
+          <a:effectRef idx="1">
+            <a:schemeClr val="accent1"/>
+          </a:effectRef>
+          <a:fontRef idx="minor">
+            <a:schemeClr val="tx1"/>
+          </a:fontRef>
+        </p:style>
+      </p:cxnSp>
+      <p:cxnSp>
+        <p:nvCxnSpPr>
+          <p:cNvPr id="35" name="Curved Connector 34">
+            <a:extLst>
+              <a:ext uri="{FF2B5EF4-FFF2-40B4-BE49-F238E27FC236}">
+                <a16:creationId xmlns:a16="http://schemas.microsoft.com/office/drawing/2014/main" id="{988B2AD7-CF76-0B61-B9E1-CBF379095DAA}"/>
+              </a:ext>
+            </a:extLst>
+          </p:cNvPr>
+          <p:cNvCxnSpPr>
+            <a:cxnSpLocks/>
+            <a:stCxn id="10" idx="0"/>
+            <a:endCxn id="12" idx="0"/>
+          </p:cNvCxnSpPr>
+          <p:nvPr/>
+        </p:nvCxnSpPr>
+        <p:spPr>
+          <a:xfrm rot="5400000" flipH="1" flipV="1">
+            <a:off x="2799470" y="1833357"/>
+            <a:ext cx="12700" cy="1264102"/>
+          </a:xfrm>
+          <a:prstGeom prst="curvedConnector3">
+            <a:avLst>
+              <a:gd name="adj1" fmla="val 1800000"/>
+            </a:avLst>
+          </a:prstGeom>
+          <a:ln w="28575">
+            <a:solidFill>
+              <a:schemeClr val="tx1"/>
+            </a:solidFill>
+            <a:tailEnd type="triangle" w="lg" len="med"/>
+          </a:ln>
+          <a:effectLst>
+            <a:outerShdw dist="20000" sx="1000" sy="1000" rotWithShape="0">
+              <a:srgbClr val="000000"/>
+            </a:outerShdw>
+          </a:effectLst>
+        </p:spPr>
+        <p:style>
+          <a:lnRef idx="2">
+            <a:schemeClr val="accent1"/>
+          </a:lnRef>
+          <a:fillRef idx="0">
+            <a:schemeClr val="accent1"/>
+          </a:fillRef>
+          <a:effectRef idx="1">
+            <a:schemeClr val="accent1"/>
+          </a:effectRef>
+          <a:fontRef idx="minor">
+            <a:schemeClr val="tx1"/>
+          </a:fontRef>
+        </p:style>
+      </p:cxnSp>
+      <mc:AlternateContent xmlns:mc="http://schemas.openxmlformats.org/markup-compatibility/2006">
+        <mc:Choice xmlns:a14="http://schemas.microsoft.com/office/drawing/2010/main" Requires="a14">
+          <p:sp>
+            <p:nvSpPr>
+              <p:cNvPr id="39" name="TextBox 38">
+                <a:extLst>
+                  <a:ext uri="{FF2B5EF4-FFF2-40B4-BE49-F238E27FC236}">
+                    <a16:creationId xmlns:a16="http://schemas.microsoft.com/office/drawing/2014/main" id="{FEA7FF25-7D48-4A93-3A1B-C8378B0A2D7D}"/>
+                  </a:ext>
+                </a:extLst>
+              </p:cNvPr>
+              <p:cNvSpPr txBox="1"/>
+              <p:nvPr/>
+            </p:nvSpPr>
+            <p:spPr>
+              <a:xfrm>
+                <a:off x="1025390" y="1942188"/>
+                <a:ext cx="1032655" cy="276999"/>
+              </a:xfrm>
+              <a:prstGeom prst="rect">
+                <a:avLst/>
+              </a:prstGeom>
+              <a:noFill/>
+            </p:spPr>
+            <p:txBody>
+              <a:bodyPr wrap="none" lIns="0" tIns="0" rIns="0" bIns="0" rtlCol="0">
+                <a:spAutoFit/>
+              </a:bodyPr>
+              <a:lstStyle/>
+              <a:p>
+                <a14:m>
+                  <m:oMathPara xmlns:m="http://schemas.openxmlformats.org/officeDocument/2006/math">
+                    <m:oMathParaPr>
+                      <m:jc m:val="centerGroup"/>
+                    </m:oMathParaPr>
+                    <m:oMath xmlns:m="http://schemas.openxmlformats.org/officeDocument/2006/math">
+                      <m:sSub>
+                        <m:sSubPr>
+                          <m:ctrlPr>
+                            <a:rPr lang="en-US" b="0" i="1" smtClean="0">
+                              <a:latin typeface="Cambria Math" panose="02040503050406030204" pitchFamily="18" charset="0"/>
+                            </a:rPr>
+                          </m:ctrlPr>
+                        </m:sSubPr>
+                        <m:e>
+                          <m:r>
+                            <a:rPr lang="en-US" b="0" i="1" smtClean="0">
+                              <a:latin typeface="Cambria Math" panose="02040503050406030204" pitchFamily="18" charset="0"/>
+                            </a:rPr>
+                            <m:t>𝑣</m:t>
+                          </m:r>
+                        </m:e>
+                        <m:sub>
+                          <m:r>
+                            <a:rPr lang="en-US" b="0" i="1" smtClean="0">
+                              <a:latin typeface="Cambria Math" panose="02040503050406030204" pitchFamily="18" charset="0"/>
+                            </a:rPr>
+                            <m:t>1</m:t>
+                          </m:r>
+                        </m:sub>
+                      </m:sSub>
+                      <m:r>
+                        <a:rPr lang="en-US" b="0" i="1" smtClean="0">
+                          <a:latin typeface="Cambria Math" panose="02040503050406030204" pitchFamily="18" charset="0"/>
+                        </a:rPr>
+                        <m:t>=</m:t>
+                      </m:r>
+                      <m:sSub>
+                        <m:sSubPr>
+                          <m:ctrlPr>
+                            <a:rPr lang="en-US" b="0" i="1" smtClean="0">
+                              <a:latin typeface="Cambria Math" panose="02040503050406030204" pitchFamily="18" charset="0"/>
+                            </a:rPr>
+                          </m:ctrlPr>
+                        </m:sSubPr>
+                        <m:e>
+                          <m:r>
+                            <a:rPr lang="en-US" b="0" i="1" smtClean="0">
+                              <a:latin typeface="Cambria Math" panose="02040503050406030204" pitchFamily="18" charset="0"/>
+                            </a:rPr>
+                            <m:t>𝑘</m:t>
+                          </m:r>
+                        </m:e>
+                        <m:sub>
+                          <m:r>
+                            <a:rPr lang="en-US" b="0" i="1" smtClean="0">
+                              <a:latin typeface="Cambria Math" panose="02040503050406030204" pitchFamily="18" charset="0"/>
+                            </a:rPr>
+                            <m:t>1</m:t>
+                          </m:r>
+                        </m:sub>
+                      </m:sSub>
+                      <m:sSub>
+                        <m:sSubPr>
+                          <m:ctrlPr>
+                            <a:rPr lang="en-US" b="0" i="1" smtClean="0">
+                              <a:latin typeface="Cambria Math" panose="02040503050406030204" pitchFamily="18" charset="0"/>
+                            </a:rPr>
+                          </m:ctrlPr>
+                        </m:sSubPr>
+                        <m:e>
+                          <m:r>
+                            <a:rPr lang="en-US" b="0" i="1" smtClean="0">
+                              <a:latin typeface="Cambria Math" panose="02040503050406030204" pitchFamily="18" charset="0"/>
+                            </a:rPr>
+                            <m:t>𝑆</m:t>
+                          </m:r>
+                        </m:e>
+                        <m:sub>
+                          <m:r>
+                            <a:rPr lang="en-US" b="0" i="1" smtClean="0">
+                              <a:latin typeface="Cambria Math" panose="02040503050406030204" pitchFamily="18" charset="0"/>
+                            </a:rPr>
+                            <m:t>1</m:t>
+                          </m:r>
+                        </m:sub>
+                      </m:sSub>
+                    </m:oMath>
+                  </m:oMathPara>
+                </a14:m>
+                <a:endParaRPr lang="en-US" dirty="0"/>
+              </a:p>
+            </p:txBody>
+          </p:sp>
+        </mc:Choice>
+        <mc:Fallback>
+          <p:sp>
+            <p:nvSpPr>
+              <p:cNvPr id="39" name="TextBox 38">
+                <a:extLst>
+                  <a:ext uri="{FF2B5EF4-FFF2-40B4-BE49-F238E27FC236}">
+                    <a16:creationId xmlns:a16="http://schemas.microsoft.com/office/drawing/2014/main" id="{FEA7FF25-7D48-4A93-3A1B-C8378B0A2D7D}"/>
+                  </a:ext>
+                </a:extLst>
+              </p:cNvPr>
+              <p:cNvSpPr txBox="1">
+                <a:spLocks noRot="1" noChangeAspect="1" noMove="1" noResize="1" noEditPoints="1" noAdjustHandles="1" noChangeArrowheads="1" noChangeShapeType="1" noTextEdit="1"/>
+              </p:cNvSpPr>
+              <p:nvPr/>
+            </p:nvSpPr>
+            <p:spPr>
+              <a:xfrm>
+                <a:off x="1025390" y="1942188"/>
+                <a:ext cx="1032655" cy="276999"/>
+              </a:xfrm>
+              <a:prstGeom prst="rect">
+                <a:avLst/>
+              </a:prstGeom>
+              <a:blipFill>
+                <a:blip r:embed="rId3"/>
+                <a:stretch>
+                  <a:fillRect l="-2410" b="-22727"/>
+                </a:stretch>
+              </a:blipFill>
+            </p:spPr>
+            <p:txBody>
+              <a:bodyPr/>
+              <a:lstStyle/>
+              <a:p>
+                <a:r>
+                  <a:rPr lang="en-US">
+                    <a:noFill/>
+                  </a:rPr>
+                  <a:t> </a:t>
+                </a:r>
+              </a:p>
+            </p:txBody>
+          </p:sp>
+        </mc:Fallback>
+      </mc:AlternateContent>
+      <mc:AlternateContent xmlns:mc="http://schemas.openxmlformats.org/markup-compatibility/2006">
+        <mc:Choice xmlns:a14="http://schemas.microsoft.com/office/drawing/2010/main" Requires="a14">
+          <p:sp>
+            <p:nvSpPr>
+              <p:cNvPr id="46" name="TextBox 45">
+                <a:extLst>
+                  <a:ext uri="{FF2B5EF4-FFF2-40B4-BE49-F238E27FC236}">
+                    <a16:creationId xmlns:a16="http://schemas.microsoft.com/office/drawing/2014/main" id="{D4FA7380-DC14-AF38-EFCA-48C1AD6BA3E1}"/>
+                  </a:ext>
+                </a:extLst>
+              </p:cNvPr>
+              <p:cNvSpPr txBox="1"/>
+              <p:nvPr/>
+            </p:nvSpPr>
+            <p:spPr>
+              <a:xfrm>
+                <a:off x="2350318" y="1927857"/>
+                <a:ext cx="1048620" cy="276999"/>
+              </a:xfrm>
+              <a:prstGeom prst="rect">
+                <a:avLst/>
+              </a:prstGeom>
+              <a:noFill/>
+            </p:spPr>
+            <p:txBody>
+              <a:bodyPr wrap="none" lIns="0" tIns="0" rIns="0" bIns="0" rtlCol="0">
+                <a:spAutoFit/>
+              </a:bodyPr>
+              <a:lstStyle/>
+              <a:p>
+                <a14:m>
+                  <m:oMathPara xmlns:m="http://schemas.openxmlformats.org/officeDocument/2006/math">
+                    <m:oMathParaPr>
+                      <m:jc m:val="centerGroup"/>
+                    </m:oMathParaPr>
+                    <m:oMath xmlns:m="http://schemas.openxmlformats.org/officeDocument/2006/math">
+                      <m:sSub>
+                        <m:sSubPr>
+                          <m:ctrlPr>
+                            <a:rPr lang="en-US" b="0" i="1" smtClean="0">
+                              <a:latin typeface="Cambria Math" panose="02040503050406030204" pitchFamily="18" charset="0"/>
+                            </a:rPr>
+                          </m:ctrlPr>
+                        </m:sSubPr>
+                        <m:e>
+                          <m:r>
+                            <a:rPr lang="en-US" b="0" i="1" smtClean="0">
+                              <a:latin typeface="Cambria Math" panose="02040503050406030204" pitchFamily="18" charset="0"/>
+                            </a:rPr>
+                            <m:t>𝑣</m:t>
+                          </m:r>
+                        </m:e>
+                        <m:sub>
+                          <m:r>
+                            <a:rPr lang="en-US" b="0" i="1" smtClean="0">
+                              <a:latin typeface="Cambria Math" panose="02040503050406030204" pitchFamily="18" charset="0"/>
+                            </a:rPr>
+                            <m:t>3</m:t>
+                          </m:r>
+                        </m:sub>
+                      </m:sSub>
+                      <m:r>
+                        <a:rPr lang="en-US" b="0" i="1" smtClean="0">
+                          <a:latin typeface="Cambria Math" panose="02040503050406030204" pitchFamily="18" charset="0"/>
+                        </a:rPr>
+                        <m:t>=</m:t>
+                      </m:r>
+                      <m:sSub>
+                        <m:sSubPr>
+                          <m:ctrlPr>
+                            <a:rPr lang="en-US" b="0" i="1" smtClean="0">
+                              <a:latin typeface="Cambria Math" panose="02040503050406030204" pitchFamily="18" charset="0"/>
+                            </a:rPr>
+                          </m:ctrlPr>
+                        </m:sSubPr>
+                        <m:e>
+                          <m:r>
+                            <a:rPr lang="en-US" b="0" i="1" smtClean="0">
+                              <a:latin typeface="Cambria Math" panose="02040503050406030204" pitchFamily="18" charset="0"/>
+                            </a:rPr>
+                            <m:t>𝑘</m:t>
+                          </m:r>
+                        </m:e>
+                        <m:sub>
+                          <m:r>
+                            <a:rPr lang="en-US" b="0" i="1" smtClean="0">
+                              <a:latin typeface="Cambria Math" panose="02040503050406030204" pitchFamily="18" charset="0"/>
+                            </a:rPr>
+                            <m:t>3</m:t>
+                          </m:r>
+                        </m:sub>
+                      </m:sSub>
+                      <m:sSub>
+                        <m:sSubPr>
+                          <m:ctrlPr>
+                            <a:rPr lang="en-US" b="0" i="1" smtClean="0">
+                              <a:latin typeface="Cambria Math" panose="02040503050406030204" pitchFamily="18" charset="0"/>
+                            </a:rPr>
+                          </m:ctrlPr>
+                        </m:sSubPr>
+                        <m:e>
+                          <m:r>
+                            <a:rPr lang="en-US" b="0" i="1" smtClean="0">
+                              <a:latin typeface="Cambria Math" panose="02040503050406030204" pitchFamily="18" charset="0"/>
+                            </a:rPr>
+                            <m:t>𝑆</m:t>
+                          </m:r>
+                        </m:e>
+                        <m:sub>
+                          <m:r>
+                            <a:rPr lang="en-US" b="0" i="1" smtClean="0">
+                              <a:latin typeface="Cambria Math" panose="02040503050406030204" pitchFamily="18" charset="0"/>
+                            </a:rPr>
+                            <m:t>2</m:t>
+                          </m:r>
+                        </m:sub>
+                      </m:sSub>
+                    </m:oMath>
+                  </m:oMathPara>
+                </a14:m>
+                <a:endParaRPr lang="en-US" dirty="0"/>
+              </a:p>
+            </p:txBody>
+          </p:sp>
+        </mc:Choice>
+        <mc:Fallback>
+          <p:sp>
+            <p:nvSpPr>
+              <p:cNvPr id="46" name="TextBox 45">
+                <a:extLst>
+                  <a:ext uri="{FF2B5EF4-FFF2-40B4-BE49-F238E27FC236}">
+                    <a16:creationId xmlns:a16="http://schemas.microsoft.com/office/drawing/2014/main" id="{D4FA7380-DC14-AF38-EFCA-48C1AD6BA3E1}"/>
+                  </a:ext>
+                </a:extLst>
+              </p:cNvPr>
+              <p:cNvSpPr txBox="1">
+                <a:spLocks noRot="1" noChangeAspect="1" noMove="1" noResize="1" noEditPoints="1" noAdjustHandles="1" noChangeArrowheads="1" noChangeShapeType="1" noTextEdit="1"/>
+              </p:cNvSpPr>
+              <p:nvPr/>
+            </p:nvSpPr>
+            <p:spPr>
+              <a:xfrm>
+                <a:off x="2350318" y="1927857"/>
+                <a:ext cx="1048620" cy="276999"/>
+              </a:xfrm>
+              <a:prstGeom prst="rect">
+                <a:avLst/>
+              </a:prstGeom>
+              <a:blipFill>
+                <a:blip r:embed="rId4"/>
+                <a:stretch>
+                  <a:fillRect l="-2410" r="-1205" b="-17391"/>
+                </a:stretch>
+              </a:blipFill>
+            </p:spPr>
+            <p:txBody>
+              <a:bodyPr/>
+              <a:lstStyle/>
+              <a:p>
+                <a:r>
+                  <a:rPr lang="en-US">
+                    <a:noFill/>
+                  </a:rPr>
+                  <a:t> </a:t>
+                </a:r>
+              </a:p>
+            </p:txBody>
+          </p:sp>
+        </mc:Fallback>
+      </mc:AlternateContent>
+      <p:cxnSp>
+        <p:nvCxnSpPr>
+          <p:cNvPr id="59" name="Curved Connector 58">
+            <a:extLst>
+              <a:ext uri="{FF2B5EF4-FFF2-40B4-BE49-F238E27FC236}">
+                <a16:creationId xmlns:a16="http://schemas.microsoft.com/office/drawing/2014/main" id="{EB60D73D-7DAB-DC8C-BE1F-30A786F5BBAE}"/>
+              </a:ext>
+            </a:extLst>
+          </p:cNvPr>
+          <p:cNvCxnSpPr>
+            <a:cxnSpLocks/>
+            <a:stCxn id="12" idx="0"/>
+            <a:endCxn id="13" idx="0"/>
+          </p:cNvCxnSpPr>
+          <p:nvPr/>
+        </p:nvCxnSpPr>
+        <p:spPr>
+          <a:xfrm rot="5400000" flipH="1" flipV="1">
+            <a:off x="4063572" y="1833357"/>
+            <a:ext cx="1" cy="1264102"/>
+          </a:xfrm>
+          <a:prstGeom prst="curvedConnector3">
+            <a:avLst>
+              <a:gd name="adj1" fmla="val 22860100000"/>
+            </a:avLst>
+          </a:prstGeom>
+          <a:ln w="28575">
+            <a:solidFill>
+              <a:schemeClr val="tx1"/>
+            </a:solidFill>
+            <a:tailEnd type="triangle" w="lg" len="med"/>
+          </a:ln>
+          <a:effectLst>
+            <a:outerShdw dist="20000" sx="1000" sy="1000" rotWithShape="0">
+              <a:srgbClr val="000000"/>
+            </a:outerShdw>
+          </a:effectLst>
+        </p:spPr>
+        <p:style>
+          <a:lnRef idx="2">
+            <a:schemeClr val="accent1"/>
+          </a:lnRef>
+          <a:fillRef idx="0">
+            <a:schemeClr val="accent1"/>
+          </a:fillRef>
+          <a:effectRef idx="1">
+            <a:schemeClr val="accent1"/>
+          </a:effectRef>
+          <a:fontRef idx="minor">
+            <a:schemeClr val="tx1"/>
+          </a:fontRef>
+        </p:style>
+      </p:cxnSp>
+      <mc:AlternateContent xmlns:mc="http://schemas.openxmlformats.org/markup-compatibility/2006">
+        <mc:Choice xmlns:a14="http://schemas.microsoft.com/office/drawing/2010/main" Requires="a14">
+          <p:sp>
+            <p:nvSpPr>
+              <p:cNvPr id="63" name="TextBox 62">
+                <a:extLst>
+                  <a:ext uri="{FF2B5EF4-FFF2-40B4-BE49-F238E27FC236}">
+                    <a16:creationId xmlns:a16="http://schemas.microsoft.com/office/drawing/2014/main" id="{8C612F17-DAF9-5EF7-C49E-8A648C73AA62}"/>
+                  </a:ext>
+                </a:extLst>
+              </p:cNvPr>
+              <p:cNvSpPr txBox="1"/>
+              <p:nvPr/>
+            </p:nvSpPr>
+            <p:spPr>
+              <a:xfrm>
+                <a:off x="3539262" y="1913526"/>
+                <a:ext cx="1048620" cy="276999"/>
+              </a:xfrm>
+              <a:prstGeom prst="rect">
+                <a:avLst/>
+              </a:prstGeom>
+              <a:noFill/>
+            </p:spPr>
+            <p:txBody>
+              <a:bodyPr wrap="none" lIns="0" tIns="0" rIns="0" bIns="0" rtlCol="0">
+                <a:spAutoFit/>
+              </a:bodyPr>
+              <a:lstStyle/>
+              <a:p>
+                <a14:m>
+                  <m:oMathPara xmlns:m="http://schemas.openxmlformats.org/officeDocument/2006/math">
+                    <m:oMathParaPr>
+                      <m:jc m:val="centerGroup"/>
+                    </m:oMathParaPr>
+                    <m:oMath xmlns:m="http://schemas.openxmlformats.org/officeDocument/2006/math">
+                      <m:sSub>
+                        <m:sSubPr>
+                          <m:ctrlPr>
+                            <a:rPr lang="en-US" b="0" i="1" smtClean="0">
+                              <a:latin typeface="Cambria Math" panose="02040503050406030204" pitchFamily="18" charset="0"/>
+                            </a:rPr>
+                          </m:ctrlPr>
+                        </m:sSubPr>
+                        <m:e>
+                          <m:r>
+                            <a:rPr lang="en-US" b="0" i="1" smtClean="0">
+                              <a:latin typeface="Cambria Math" panose="02040503050406030204" pitchFamily="18" charset="0"/>
+                            </a:rPr>
+                            <m:t>𝑣</m:t>
+                          </m:r>
+                        </m:e>
+                        <m:sub>
+                          <m:r>
+                            <a:rPr lang="en-US" b="0" i="1" smtClean="0">
+                              <a:latin typeface="Cambria Math" panose="02040503050406030204" pitchFamily="18" charset="0"/>
+                            </a:rPr>
+                            <m:t>5</m:t>
+                          </m:r>
+                        </m:sub>
+                      </m:sSub>
+                      <m:r>
+                        <a:rPr lang="en-US" b="0" i="1" smtClean="0">
+                          <a:latin typeface="Cambria Math" panose="02040503050406030204" pitchFamily="18" charset="0"/>
+                        </a:rPr>
+                        <m:t>=</m:t>
+                      </m:r>
+                      <m:sSub>
+                        <m:sSubPr>
+                          <m:ctrlPr>
+                            <a:rPr lang="en-US" b="0" i="1" smtClean="0">
+                              <a:latin typeface="Cambria Math" panose="02040503050406030204" pitchFamily="18" charset="0"/>
+                            </a:rPr>
+                          </m:ctrlPr>
+                        </m:sSubPr>
+                        <m:e>
+                          <m:r>
+                            <a:rPr lang="en-US" b="0" i="1" smtClean="0">
+                              <a:latin typeface="Cambria Math" panose="02040503050406030204" pitchFamily="18" charset="0"/>
+                            </a:rPr>
+                            <m:t>𝑘</m:t>
+                          </m:r>
+                        </m:e>
+                        <m:sub>
+                          <m:r>
+                            <a:rPr lang="en-US" b="0" i="1" smtClean="0">
+                              <a:latin typeface="Cambria Math" panose="02040503050406030204" pitchFamily="18" charset="0"/>
+                            </a:rPr>
+                            <m:t>5</m:t>
+                          </m:r>
+                        </m:sub>
+                      </m:sSub>
+                      <m:sSub>
+                        <m:sSubPr>
+                          <m:ctrlPr>
+                            <a:rPr lang="en-US" b="0" i="1" smtClean="0">
+                              <a:latin typeface="Cambria Math" panose="02040503050406030204" pitchFamily="18" charset="0"/>
+                            </a:rPr>
+                          </m:ctrlPr>
+                        </m:sSubPr>
+                        <m:e>
+                          <m:r>
+                            <a:rPr lang="en-US" b="0" i="1" smtClean="0">
+                              <a:latin typeface="Cambria Math" panose="02040503050406030204" pitchFamily="18" charset="0"/>
+                            </a:rPr>
+                            <m:t>𝑆</m:t>
+                          </m:r>
+                        </m:e>
+                        <m:sub>
+                          <m:r>
+                            <a:rPr lang="en-US" b="0" i="1" smtClean="0">
+                              <a:latin typeface="Cambria Math" panose="02040503050406030204" pitchFamily="18" charset="0"/>
+                            </a:rPr>
+                            <m:t>3</m:t>
+                          </m:r>
+                        </m:sub>
+                      </m:sSub>
+                    </m:oMath>
+                  </m:oMathPara>
+                </a14:m>
+                <a:endParaRPr lang="en-US" dirty="0"/>
+              </a:p>
+            </p:txBody>
+          </p:sp>
+        </mc:Choice>
+        <mc:Fallback>
+          <p:sp>
+            <p:nvSpPr>
+              <p:cNvPr id="63" name="TextBox 62">
+                <a:extLst>
+                  <a:ext uri="{FF2B5EF4-FFF2-40B4-BE49-F238E27FC236}">
+                    <a16:creationId xmlns:a16="http://schemas.microsoft.com/office/drawing/2014/main" id="{8C612F17-DAF9-5EF7-C49E-8A648C73AA62}"/>
+                  </a:ext>
+                </a:extLst>
+              </p:cNvPr>
+              <p:cNvSpPr txBox="1">
+                <a:spLocks noRot="1" noChangeAspect="1" noMove="1" noResize="1" noEditPoints="1" noAdjustHandles="1" noChangeArrowheads="1" noChangeShapeType="1" noTextEdit="1"/>
+              </p:cNvSpPr>
+              <p:nvPr/>
+            </p:nvSpPr>
+            <p:spPr>
+              <a:xfrm>
+                <a:off x="3539262" y="1913526"/>
+                <a:ext cx="1048620" cy="276999"/>
+              </a:xfrm>
+              <a:prstGeom prst="rect">
+                <a:avLst/>
+              </a:prstGeom>
+              <a:blipFill>
+                <a:blip r:embed="rId5"/>
+                <a:stretch>
+                  <a:fillRect l="-2381" b="-17391"/>
+                </a:stretch>
+              </a:blipFill>
+            </p:spPr>
+            <p:txBody>
+              <a:bodyPr/>
+              <a:lstStyle/>
+              <a:p>
+                <a:r>
+                  <a:rPr lang="en-US">
+                    <a:noFill/>
+                  </a:rPr>
+                  <a:t> </a:t>
+                </a:r>
+              </a:p>
+            </p:txBody>
+          </p:sp>
+        </mc:Fallback>
+      </mc:AlternateContent>
+      <p:cxnSp>
+        <p:nvCxnSpPr>
+          <p:cNvPr id="64" name="Curved Connector 63">
+            <a:extLst>
+              <a:ext uri="{FF2B5EF4-FFF2-40B4-BE49-F238E27FC236}">
+                <a16:creationId xmlns:a16="http://schemas.microsoft.com/office/drawing/2014/main" id="{F42232CC-1F02-8BCA-84EE-37C3797F1A25}"/>
+              </a:ext>
+            </a:extLst>
+          </p:cNvPr>
+          <p:cNvCxnSpPr>
+            <a:cxnSpLocks/>
+          </p:cNvCxnSpPr>
+          <p:nvPr/>
+        </p:nvCxnSpPr>
+        <p:spPr>
+          <a:xfrm rot="5400000">
+            <a:off x="1535368" y="2356577"/>
+            <a:ext cx="12700" cy="1264102"/>
+          </a:xfrm>
+          <a:prstGeom prst="curvedConnector3">
+            <a:avLst>
+              <a:gd name="adj1" fmla="val 1800000"/>
+            </a:avLst>
+          </a:prstGeom>
+          <a:ln w="28575">
+            <a:solidFill>
+              <a:schemeClr val="tx1"/>
+            </a:solidFill>
+            <a:tailEnd type="triangle" w="lg" len="med"/>
+          </a:ln>
+          <a:effectLst>
+            <a:outerShdw dist="20000" sx="1000" sy="1000" rotWithShape="0">
+              <a:srgbClr val="000000"/>
+            </a:outerShdw>
+          </a:effectLst>
+        </p:spPr>
+        <p:style>
+          <a:lnRef idx="2">
+            <a:schemeClr val="accent1"/>
+          </a:lnRef>
+          <a:fillRef idx="0">
+            <a:schemeClr val="accent1"/>
+          </a:fillRef>
+          <a:effectRef idx="1">
+            <a:schemeClr val="accent1"/>
+          </a:effectRef>
+          <a:fontRef idx="minor">
+            <a:schemeClr val="tx1"/>
+          </a:fontRef>
+        </p:style>
+      </p:cxnSp>
+      <mc:AlternateContent xmlns:mc="http://schemas.openxmlformats.org/markup-compatibility/2006">
+        <mc:Choice xmlns:a14="http://schemas.microsoft.com/office/drawing/2010/main" Requires="a14">
+          <p:sp>
+            <p:nvSpPr>
+              <p:cNvPr id="67" name="TextBox 66">
+                <a:extLst>
+                  <a:ext uri="{FF2B5EF4-FFF2-40B4-BE49-F238E27FC236}">
+                    <a16:creationId xmlns:a16="http://schemas.microsoft.com/office/drawing/2014/main" id="{E05C07C8-393F-A7CD-9B79-27A948E27DE8}"/>
+                  </a:ext>
+                </a:extLst>
+              </p:cNvPr>
+              <p:cNvSpPr txBox="1"/>
+              <p:nvPr/>
+            </p:nvSpPr>
+            <p:spPr>
+              <a:xfrm>
+                <a:off x="970358" y="3298050"/>
+                <a:ext cx="1048620" cy="276999"/>
+              </a:xfrm>
+              <a:prstGeom prst="rect">
+                <a:avLst/>
+              </a:prstGeom>
+              <a:noFill/>
+            </p:spPr>
+            <p:txBody>
+              <a:bodyPr wrap="none" lIns="0" tIns="0" rIns="0" bIns="0" rtlCol="0">
+                <a:spAutoFit/>
+              </a:bodyPr>
+              <a:lstStyle/>
+              <a:p>
+                <a14:m>
+                  <m:oMathPara xmlns:m="http://schemas.openxmlformats.org/officeDocument/2006/math">
+                    <m:oMathParaPr>
+                      <m:jc m:val="centerGroup"/>
+                    </m:oMathParaPr>
+                    <m:oMath xmlns:m="http://schemas.openxmlformats.org/officeDocument/2006/math">
+                      <m:sSub>
+                        <m:sSubPr>
+                          <m:ctrlPr>
+                            <a:rPr lang="en-US" b="0" i="1" smtClean="0">
+                              <a:latin typeface="Cambria Math" panose="02040503050406030204" pitchFamily="18" charset="0"/>
+                            </a:rPr>
+                          </m:ctrlPr>
+                        </m:sSubPr>
+                        <m:e>
+                          <m:r>
+                            <a:rPr lang="en-US" b="0" i="1" smtClean="0">
+                              <a:latin typeface="Cambria Math" panose="02040503050406030204" pitchFamily="18" charset="0"/>
+                            </a:rPr>
+                            <m:t>𝑣</m:t>
+                          </m:r>
+                        </m:e>
+                        <m:sub>
+                          <m:r>
+                            <a:rPr lang="en-US" b="0" i="1" smtClean="0">
+                              <a:latin typeface="Cambria Math" panose="02040503050406030204" pitchFamily="18" charset="0"/>
+                            </a:rPr>
+                            <m:t>2</m:t>
+                          </m:r>
+                        </m:sub>
+                      </m:sSub>
+                      <m:r>
+                        <a:rPr lang="en-US" b="0" i="1" smtClean="0">
+                          <a:latin typeface="Cambria Math" panose="02040503050406030204" pitchFamily="18" charset="0"/>
+                        </a:rPr>
+                        <m:t>=</m:t>
+                      </m:r>
+                      <m:sSub>
+                        <m:sSubPr>
+                          <m:ctrlPr>
+                            <a:rPr lang="en-US" b="0" i="1" smtClean="0">
+                              <a:latin typeface="Cambria Math" panose="02040503050406030204" pitchFamily="18" charset="0"/>
+                            </a:rPr>
+                          </m:ctrlPr>
+                        </m:sSubPr>
+                        <m:e>
+                          <m:r>
+                            <a:rPr lang="en-US" b="0" i="1" smtClean="0">
+                              <a:latin typeface="Cambria Math" panose="02040503050406030204" pitchFamily="18" charset="0"/>
+                            </a:rPr>
+                            <m:t>𝑘</m:t>
+                          </m:r>
+                        </m:e>
+                        <m:sub>
+                          <m:r>
+                            <a:rPr lang="en-US" b="0" i="1" smtClean="0">
+                              <a:latin typeface="Cambria Math" panose="02040503050406030204" pitchFamily="18" charset="0"/>
+                            </a:rPr>
+                            <m:t>2</m:t>
+                          </m:r>
+                        </m:sub>
+                      </m:sSub>
+                      <m:sSub>
+                        <m:sSubPr>
+                          <m:ctrlPr>
+                            <a:rPr lang="en-US" b="0" i="1" smtClean="0">
+                              <a:latin typeface="Cambria Math" panose="02040503050406030204" pitchFamily="18" charset="0"/>
+                            </a:rPr>
+                          </m:ctrlPr>
+                        </m:sSubPr>
+                        <m:e>
+                          <m:r>
+                            <a:rPr lang="en-US" b="0" i="1" smtClean="0">
+                              <a:latin typeface="Cambria Math" panose="02040503050406030204" pitchFamily="18" charset="0"/>
+                            </a:rPr>
+                            <m:t>𝑆</m:t>
+                          </m:r>
+                        </m:e>
+                        <m:sub>
+                          <m:r>
+                            <a:rPr lang="en-US" b="0" i="1" smtClean="0">
+                              <a:latin typeface="Cambria Math" panose="02040503050406030204" pitchFamily="18" charset="0"/>
+                            </a:rPr>
+                            <m:t>2</m:t>
+                          </m:r>
+                        </m:sub>
+                      </m:sSub>
+                    </m:oMath>
+                  </m:oMathPara>
+                </a14:m>
+                <a:endParaRPr lang="en-US" dirty="0"/>
+              </a:p>
+            </p:txBody>
+          </p:sp>
+        </mc:Choice>
+        <mc:Fallback>
+          <p:sp>
+            <p:nvSpPr>
+              <p:cNvPr id="67" name="TextBox 66">
+                <a:extLst>
+                  <a:ext uri="{FF2B5EF4-FFF2-40B4-BE49-F238E27FC236}">
+                    <a16:creationId xmlns:a16="http://schemas.microsoft.com/office/drawing/2014/main" id="{E05C07C8-393F-A7CD-9B79-27A948E27DE8}"/>
+                  </a:ext>
+                </a:extLst>
+              </p:cNvPr>
+              <p:cNvSpPr txBox="1">
+                <a:spLocks noRot="1" noChangeAspect="1" noMove="1" noResize="1" noEditPoints="1" noAdjustHandles="1" noChangeArrowheads="1" noChangeShapeType="1" noTextEdit="1"/>
+              </p:cNvSpPr>
+              <p:nvPr/>
+            </p:nvSpPr>
+            <p:spPr>
+              <a:xfrm>
+                <a:off x="970358" y="3298050"/>
+                <a:ext cx="1048620" cy="276999"/>
+              </a:xfrm>
+              <a:prstGeom prst="rect">
+                <a:avLst/>
+              </a:prstGeom>
+              <a:blipFill>
+                <a:blip r:embed="rId6"/>
+                <a:stretch>
+                  <a:fillRect l="-2410" r="-1205" b="-17391"/>
+                </a:stretch>
+              </a:blipFill>
+            </p:spPr>
+            <p:txBody>
+              <a:bodyPr/>
+              <a:lstStyle/>
+              <a:p>
+                <a:r>
+                  <a:rPr lang="en-US">
+                    <a:noFill/>
+                  </a:rPr>
+                  <a:t> </a:t>
+                </a:r>
+              </a:p>
+            </p:txBody>
+          </p:sp>
+        </mc:Fallback>
+      </mc:AlternateContent>
+      <p:cxnSp>
+        <p:nvCxnSpPr>
+          <p:cNvPr id="68" name="Curved Connector 67">
+            <a:extLst>
+              <a:ext uri="{FF2B5EF4-FFF2-40B4-BE49-F238E27FC236}">
+                <a16:creationId xmlns:a16="http://schemas.microsoft.com/office/drawing/2014/main" id="{3D4CC019-7F0B-DA11-03E0-E3962762C301}"/>
+              </a:ext>
+            </a:extLst>
+          </p:cNvPr>
+          <p:cNvCxnSpPr>
+            <a:cxnSpLocks/>
+            <a:stCxn id="12" idx="2"/>
+            <a:endCxn id="10" idx="2"/>
+          </p:cNvCxnSpPr>
+          <p:nvPr/>
+        </p:nvCxnSpPr>
+        <p:spPr>
+          <a:xfrm rot="5400000">
+            <a:off x="2799470" y="2356577"/>
+            <a:ext cx="12700" cy="1264102"/>
+          </a:xfrm>
+          <a:prstGeom prst="curvedConnector3">
+            <a:avLst>
+              <a:gd name="adj1" fmla="val 1800000"/>
+            </a:avLst>
+          </a:prstGeom>
+          <a:ln w="28575">
+            <a:solidFill>
+              <a:schemeClr val="tx1"/>
+            </a:solidFill>
+            <a:tailEnd type="triangle" w="lg" len="med"/>
+          </a:ln>
+          <a:effectLst>
+            <a:outerShdw dist="20000" sx="1000" sy="1000" rotWithShape="0">
+              <a:srgbClr val="000000"/>
+            </a:outerShdw>
+          </a:effectLst>
+        </p:spPr>
+        <p:style>
+          <a:lnRef idx="2">
+            <a:schemeClr val="accent1"/>
+          </a:lnRef>
+          <a:fillRef idx="0">
+            <a:schemeClr val="accent1"/>
+          </a:fillRef>
+          <a:effectRef idx="1">
+            <a:schemeClr val="accent1"/>
+          </a:effectRef>
+          <a:fontRef idx="minor">
+            <a:schemeClr val="tx1"/>
+          </a:fontRef>
+        </p:style>
+      </p:cxnSp>
+      <p:cxnSp>
+        <p:nvCxnSpPr>
+          <p:cNvPr id="72" name="Straight Arrow Connector 71">
+            <a:extLst>
+              <a:ext uri="{FF2B5EF4-FFF2-40B4-BE49-F238E27FC236}">
+                <a16:creationId xmlns:a16="http://schemas.microsoft.com/office/drawing/2014/main" id="{04DFBDB4-3D1A-9DF4-D58F-0E920582FABD}"/>
+              </a:ext>
+            </a:extLst>
+          </p:cNvPr>
+          <p:cNvCxnSpPr>
+            <a:cxnSpLocks/>
+          </p:cNvCxnSpPr>
+          <p:nvPr/>
+        </p:nvCxnSpPr>
+        <p:spPr>
+          <a:xfrm>
+            <a:off x="1669039" y="944009"/>
+            <a:ext cx="0" cy="983848"/>
+          </a:xfrm>
+          <a:prstGeom prst="straightConnector1">
+            <a:avLst/>
+          </a:prstGeom>
+          <a:ln w="38100">
+            <a:solidFill>
+              <a:schemeClr val="tx1"/>
+            </a:solidFill>
+            <a:tailEnd type="triangle"/>
+          </a:ln>
+          <a:effectLst>
+            <a:outerShdw dist="20000" sx="1000" sy="1000" rotWithShape="0">
+              <a:srgbClr val="000000"/>
+            </a:outerShdw>
+          </a:effectLst>
+        </p:spPr>
+        <p:style>
+          <a:lnRef idx="2">
+            <a:schemeClr val="accent1"/>
+          </a:lnRef>
+          <a:fillRef idx="0">
+            <a:schemeClr val="accent1"/>
+          </a:fillRef>
+          <a:effectRef idx="1">
+            <a:schemeClr val="accent1"/>
+          </a:effectRef>
+          <a:fontRef idx="minor">
+            <a:schemeClr val="tx1"/>
+          </a:fontRef>
+        </p:style>
+      </p:cxnSp>
+      <p:cxnSp>
+        <p:nvCxnSpPr>
+          <p:cNvPr id="73" name="Curved Connector 72">
+            <a:extLst>
+              <a:ext uri="{FF2B5EF4-FFF2-40B4-BE49-F238E27FC236}">
+                <a16:creationId xmlns:a16="http://schemas.microsoft.com/office/drawing/2014/main" id="{0D91AC06-D3C0-9B20-8567-2660F8F75F88}"/>
+              </a:ext>
+            </a:extLst>
+          </p:cNvPr>
+          <p:cNvCxnSpPr>
+            <a:cxnSpLocks/>
+            <a:stCxn id="13" idx="2"/>
+            <a:endCxn id="12" idx="2"/>
+          </p:cNvCxnSpPr>
+          <p:nvPr/>
+        </p:nvCxnSpPr>
+        <p:spPr>
+          <a:xfrm rot="5400000">
+            <a:off x="4063572" y="2356576"/>
+            <a:ext cx="1" cy="1264102"/>
+          </a:xfrm>
+          <a:prstGeom prst="curvedConnector3">
+            <a:avLst>
+              <a:gd name="adj1" fmla="val 22860100000"/>
+            </a:avLst>
+          </a:prstGeom>
+          <a:ln w="28575">
+            <a:solidFill>
+              <a:schemeClr val="tx1"/>
+            </a:solidFill>
+            <a:tailEnd type="triangle" w="lg" len="med"/>
+          </a:ln>
+          <a:effectLst>
+            <a:outerShdw dist="20000" sx="1000" sy="1000" rotWithShape="0">
+              <a:srgbClr val="000000"/>
+            </a:outerShdw>
+          </a:effectLst>
+        </p:spPr>
+        <p:style>
+          <a:lnRef idx="2">
+            <a:schemeClr val="accent1"/>
+          </a:lnRef>
+          <a:fillRef idx="0">
+            <a:schemeClr val="accent1"/>
+          </a:fillRef>
+          <a:effectRef idx="1">
+            <a:schemeClr val="accent1"/>
+          </a:effectRef>
+          <a:fontRef idx="minor">
+            <a:schemeClr val="tx1"/>
+          </a:fontRef>
+        </p:style>
+      </p:cxnSp>
+      <p:cxnSp>
+        <p:nvCxnSpPr>
+          <p:cNvPr id="79" name="Curved Connector 78">
+            <a:extLst>
+              <a:ext uri="{FF2B5EF4-FFF2-40B4-BE49-F238E27FC236}">
+                <a16:creationId xmlns:a16="http://schemas.microsoft.com/office/drawing/2014/main" id="{15FF421D-2496-0B96-70D4-B9BFBF2DD760}"/>
+              </a:ext>
+            </a:extLst>
+          </p:cNvPr>
+          <p:cNvCxnSpPr>
+            <a:cxnSpLocks/>
+          </p:cNvCxnSpPr>
+          <p:nvPr/>
+        </p:nvCxnSpPr>
+        <p:spPr>
+          <a:xfrm rot="5400000" flipH="1">
+            <a:off x="6381984" y="2746604"/>
+            <a:ext cx="12702" cy="530348"/>
+          </a:xfrm>
+          <a:prstGeom prst="curvedConnector4">
+            <a:avLst>
+              <a:gd name="adj1" fmla="val -1799717"/>
+              <a:gd name="adj2" fmla="val 88175"/>
+            </a:avLst>
+          </a:prstGeom>
+          <a:ln w="28575">
+            <a:solidFill>
+              <a:schemeClr val="tx1"/>
+            </a:solidFill>
+            <a:tailEnd type="triangle" w="lg" len="med"/>
+          </a:ln>
+          <a:effectLst>
+            <a:outerShdw dist="20000" sx="1000" sy="1000" rotWithShape="0">
+              <a:srgbClr val="000000"/>
+            </a:outerShdw>
+          </a:effectLst>
+        </p:spPr>
+        <p:style>
+          <a:lnRef idx="2">
+            <a:schemeClr val="accent1"/>
+          </a:lnRef>
+          <a:fillRef idx="0">
+            <a:schemeClr val="accent1"/>
+          </a:fillRef>
+          <a:effectRef idx="1">
+            <a:schemeClr val="accent1"/>
+          </a:effectRef>
+          <a:fontRef idx="minor">
+            <a:schemeClr val="tx1"/>
+          </a:fontRef>
+        </p:style>
+      </p:cxnSp>
+      <p:cxnSp>
+        <p:nvCxnSpPr>
+          <p:cNvPr id="87" name="Curved Connector 86">
+            <a:extLst>
+              <a:ext uri="{FF2B5EF4-FFF2-40B4-BE49-F238E27FC236}">
+                <a16:creationId xmlns:a16="http://schemas.microsoft.com/office/drawing/2014/main" id="{92E4644B-492C-8680-0D37-F232655FCF0B}"/>
+              </a:ext>
+            </a:extLst>
+          </p:cNvPr>
+          <p:cNvCxnSpPr>
+            <a:cxnSpLocks/>
+          </p:cNvCxnSpPr>
+          <p:nvPr/>
+        </p:nvCxnSpPr>
+        <p:spPr>
+          <a:xfrm rot="5400000" flipH="1">
+            <a:off x="4967553" y="2736155"/>
+            <a:ext cx="12702" cy="530348"/>
+          </a:xfrm>
+          <a:prstGeom prst="curvedConnector4">
+            <a:avLst>
+              <a:gd name="adj1" fmla="val -1799717"/>
+              <a:gd name="adj2" fmla="val 88175"/>
+            </a:avLst>
+          </a:prstGeom>
+          <a:ln w="28575">
+            <a:solidFill>
+              <a:schemeClr val="tx1"/>
+            </a:solidFill>
+            <a:tailEnd type="triangle" w="lg" len="med"/>
+          </a:ln>
+          <a:effectLst>
+            <a:outerShdw dist="20000" sx="1000" sy="1000" rotWithShape="0">
+              <a:srgbClr val="000000"/>
+            </a:outerShdw>
+          </a:effectLst>
+        </p:spPr>
+        <p:style>
+          <a:lnRef idx="2">
+            <a:schemeClr val="accent1"/>
+          </a:lnRef>
+          <a:fillRef idx="0">
+            <a:schemeClr val="accent1"/>
+          </a:fillRef>
+          <a:effectRef idx="1">
+            <a:schemeClr val="accent1"/>
+          </a:effectRef>
+          <a:fontRef idx="minor">
+            <a:schemeClr val="tx1"/>
+          </a:fontRef>
+        </p:style>
+      </p:cxnSp>
+      <p:cxnSp>
+        <p:nvCxnSpPr>
+          <p:cNvPr id="89" name="Curved Connector 88">
+            <a:extLst>
+              <a:ext uri="{FF2B5EF4-FFF2-40B4-BE49-F238E27FC236}">
+                <a16:creationId xmlns:a16="http://schemas.microsoft.com/office/drawing/2014/main" id="{1D806D37-2BF8-522D-50FB-7C3B05B95932}"/>
+              </a:ext>
+            </a:extLst>
+          </p:cNvPr>
+          <p:cNvCxnSpPr>
+            <a:cxnSpLocks/>
+          </p:cNvCxnSpPr>
+          <p:nvPr/>
+        </p:nvCxnSpPr>
+        <p:spPr>
+          <a:xfrm rot="5400000" flipV="1">
+            <a:off x="6383913" y="2239246"/>
+            <a:ext cx="12702" cy="530348"/>
+          </a:xfrm>
+          <a:prstGeom prst="curvedConnector4">
+            <a:avLst>
+              <a:gd name="adj1" fmla="val -1799717"/>
+              <a:gd name="adj2" fmla="val 88175"/>
+            </a:avLst>
+          </a:prstGeom>
+          <a:ln w="28575">
+            <a:solidFill>
+              <a:schemeClr val="tx1"/>
+            </a:solidFill>
+            <a:tailEnd type="triangle" w="lg" len="med"/>
+          </a:ln>
+          <a:effectLst>
+            <a:outerShdw dist="20000" sx="1000" sy="1000" rotWithShape="0">
+              <a:srgbClr val="000000"/>
+            </a:outerShdw>
+          </a:effectLst>
+        </p:spPr>
+        <p:style>
+          <a:lnRef idx="2">
+            <a:schemeClr val="accent1"/>
+          </a:lnRef>
+          <a:fillRef idx="0">
+            <a:schemeClr val="accent1"/>
+          </a:fillRef>
+          <a:effectRef idx="1">
+            <a:schemeClr val="accent1"/>
+          </a:effectRef>
+          <a:fontRef idx="minor">
+            <a:schemeClr val="tx1"/>
+          </a:fontRef>
+        </p:style>
+      </p:cxnSp>
+      <p:cxnSp>
+        <p:nvCxnSpPr>
+          <p:cNvPr id="90" name="Curved Connector 89">
+            <a:extLst>
+              <a:ext uri="{FF2B5EF4-FFF2-40B4-BE49-F238E27FC236}">
+                <a16:creationId xmlns:a16="http://schemas.microsoft.com/office/drawing/2014/main" id="{67E6226F-812F-4FCB-1E16-9A31C8E4528A}"/>
+              </a:ext>
+            </a:extLst>
+          </p:cNvPr>
+          <p:cNvCxnSpPr>
+            <a:cxnSpLocks/>
+          </p:cNvCxnSpPr>
+          <p:nvPr/>
+        </p:nvCxnSpPr>
+        <p:spPr>
+          <a:xfrm rot="5400000" flipV="1">
+            <a:off x="4998615" y="2194995"/>
+            <a:ext cx="12702" cy="530348"/>
+          </a:xfrm>
+          <a:prstGeom prst="curvedConnector4">
+            <a:avLst>
+              <a:gd name="adj1" fmla="val -1799717"/>
+              <a:gd name="adj2" fmla="val 88175"/>
+            </a:avLst>
+          </a:prstGeom>
+          <a:ln w="28575">
+            <a:solidFill>
+              <a:schemeClr val="tx1"/>
+            </a:solidFill>
+            <a:tailEnd type="triangle" w="lg" len="med"/>
+          </a:ln>
+          <a:effectLst>
+            <a:outerShdw dist="20000" sx="1000" sy="1000" rotWithShape="0">
+              <a:srgbClr val="000000"/>
+            </a:outerShdw>
+          </a:effectLst>
+        </p:spPr>
+        <p:style>
+          <a:lnRef idx="2">
+            <a:schemeClr val="accent1"/>
+          </a:lnRef>
+          <a:fillRef idx="0">
+            <a:schemeClr val="accent1"/>
+          </a:fillRef>
+          <a:effectRef idx="1">
+            <a:schemeClr val="accent1"/>
+          </a:effectRef>
+          <a:fontRef idx="minor">
+            <a:schemeClr val="tx1"/>
+          </a:fontRef>
+        </p:style>
+      </p:cxnSp>
+      <p:cxnSp>
+        <p:nvCxnSpPr>
+          <p:cNvPr id="91" name="Curved Connector 90">
+            <a:extLst>
+              <a:ext uri="{FF2B5EF4-FFF2-40B4-BE49-F238E27FC236}">
+                <a16:creationId xmlns:a16="http://schemas.microsoft.com/office/drawing/2014/main" id="{58B01549-BE75-3F29-F2BA-5EA9625482C0}"/>
+              </a:ext>
+            </a:extLst>
+          </p:cNvPr>
+          <p:cNvCxnSpPr>
+            <a:cxnSpLocks/>
+            <a:stCxn id="15" idx="2"/>
+            <a:endCxn id="14" idx="2"/>
+          </p:cNvCxnSpPr>
+          <p:nvPr/>
+        </p:nvCxnSpPr>
+        <p:spPr>
+          <a:xfrm rot="5400000">
+            <a:off x="7331596" y="2478942"/>
+            <a:ext cx="1" cy="1032073"/>
+          </a:xfrm>
+          <a:prstGeom prst="curvedConnector3">
+            <a:avLst>
+              <a:gd name="adj1" fmla="val 22860100000"/>
+            </a:avLst>
+          </a:prstGeom>
+          <a:ln w="28575">
+            <a:solidFill>
+              <a:schemeClr val="tx1"/>
+            </a:solidFill>
+            <a:tailEnd type="triangle" w="lg" len="med"/>
+          </a:ln>
+          <a:effectLst>
+            <a:outerShdw dist="20000" sx="1000" sy="1000" rotWithShape="0">
+              <a:srgbClr val="000000"/>
+            </a:outerShdw>
+          </a:effectLst>
+        </p:spPr>
+        <p:style>
+          <a:lnRef idx="2">
+            <a:schemeClr val="accent1"/>
+          </a:lnRef>
+          <a:fillRef idx="0">
+            <a:schemeClr val="accent1"/>
+          </a:fillRef>
+          <a:effectRef idx="1">
+            <a:schemeClr val="accent1"/>
+          </a:effectRef>
+          <a:fontRef idx="minor">
+            <a:schemeClr val="tx1"/>
+          </a:fontRef>
+        </p:style>
+      </p:cxnSp>
+      <p:cxnSp>
+        <p:nvCxnSpPr>
+          <p:cNvPr id="95" name="Curved Connector 94">
+            <a:extLst>
+              <a:ext uri="{FF2B5EF4-FFF2-40B4-BE49-F238E27FC236}">
+                <a16:creationId xmlns:a16="http://schemas.microsoft.com/office/drawing/2014/main" id="{ADD75E77-3CE3-5FBD-EF43-8A1443EDA68B}"/>
+              </a:ext>
+            </a:extLst>
+          </p:cNvPr>
+          <p:cNvCxnSpPr>
+            <a:cxnSpLocks/>
+            <a:stCxn id="14" idx="0"/>
+            <a:endCxn id="15" idx="0"/>
+          </p:cNvCxnSpPr>
+          <p:nvPr/>
+        </p:nvCxnSpPr>
+        <p:spPr>
+          <a:xfrm rot="5400000" flipH="1" flipV="1">
+            <a:off x="7331595" y="1955723"/>
+            <a:ext cx="1" cy="1032073"/>
+          </a:xfrm>
+          <a:prstGeom prst="curvedConnector3">
+            <a:avLst>
+              <a:gd name="adj1" fmla="val 22860100000"/>
+            </a:avLst>
+          </a:prstGeom>
+          <a:ln w="28575">
+            <a:solidFill>
+              <a:schemeClr val="tx1"/>
+            </a:solidFill>
+            <a:tailEnd type="triangle" w="lg" len="med"/>
+          </a:ln>
+          <a:effectLst>
+            <a:outerShdw dist="20000" sx="1000" sy="1000" rotWithShape="0">
+              <a:srgbClr val="000000"/>
+            </a:outerShdw>
+          </a:effectLst>
+        </p:spPr>
+        <p:style>
+          <a:lnRef idx="2">
+            <a:schemeClr val="accent1"/>
+          </a:lnRef>
+          <a:fillRef idx="0">
+            <a:schemeClr val="accent1"/>
+          </a:fillRef>
+          <a:effectRef idx="1">
+            <a:schemeClr val="accent1"/>
+          </a:effectRef>
+          <a:fontRef idx="minor">
+            <a:schemeClr val="tx1"/>
+          </a:fontRef>
+        </p:style>
+      </p:cxnSp>
+      <p:grpSp>
+        <p:nvGrpSpPr>
+          <p:cNvPr id="98" name="Group 97">
+            <a:extLst>
+              <a:ext uri="{FF2B5EF4-FFF2-40B4-BE49-F238E27FC236}">
+                <a16:creationId xmlns:a16="http://schemas.microsoft.com/office/drawing/2014/main" id="{7E00291F-C25A-AE60-FE1D-86DBE2D0CA55}"/>
+              </a:ext>
+            </a:extLst>
+          </p:cNvPr>
+          <p:cNvGrpSpPr/>
+          <p:nvPr/>
+        </p:nvGrpSpPr>
+        <p:grpSpPr>
+          <a:xfrm>
+            <a:off x="5494152" y="2727017"/>
+            <a:ext cx="396240" cy="91440"/>
+            <a:chOff x="5521124" y="5626696"/>
+            <a:chExt cx="396240" cy="91440"/>
+          </a:xfrm>
+        </p:grpSpPr>
+        <p:sp>
+          <p:nvSpPr>
+            <p:cNvPr id="99" name="Oval 98">
+              <a:extLst>
+                <a:ext uri="{FF2B5EF4-FFF2-40B4-BE49-F238E27FC236}">
+                  <a16:creationId xmlns:a16="http://schemas.microsoft.com/office/drawing/2014/main" id="{50A1BA05-C62F-84AE-D210-5F696D416005}"/>
+                </a:ext>
+              </a:extLst>
+            </p:cNvPr>
+            <p:cNvSpPr>
+              <a:spLocks noChangeAspect="1"/>
+            </p:cNvSpPr>
+            <p:nvPr/>
+          </p:nvSpPr>
+          <p:spPr>
+            <a:xfrm>
+              <a:off x="5521124" y="5626696"/>
+              <a:ext cx="91440" cy="91440"/>
+            </a:xfrm>
+            <a:prstGeom prst="ellipse">
+              <a:avLst/>
+            </a:prstGeom>
+            <a:solidFill>
+              <a:schemeClr val="tx1"/>
+            </a:solidFill>
+            <a:ln>
+              <a:noFill/>
+            </a:ln>
+            <a:effectLst>
+              <a:outerShdw dist="23000" sx="1000" sy="1000" rotWithShape="0">
+                <a:srgbClr val="000000"/>
+              </a:outerShdw>
+            </a:effectLst>
+          </p:spPr>
+          <p:style>
+            <a:lnRef idx="1">
+              <a:schemeClr val="accent1"/>
+            </a:lnRef>
+            <a:fillRef idx="3">
+              <a:schemeClr val="accent1"/>
+            </a:fillRef>
+            <a:effectRef idx="2">
+              <a:schemeClr val="accent1"/>
+            </a:effectRef>
+            <a:fontRef idx="minor">
+              <a:schemeClr val="lt1"/>
+            </a:fontRef>
+          </p:style>
+          <p:txBody>
+            <a:bodyPr rtlCol="0" anchor="ctr"/>
+            <a:lstStyle/>
+            <a:p>
+              <a:pPr algn="ctr"/>
+              <a:endParaRPr lang="en-US"/>
+            </a:p>
+          </p:txBody>
+        </p:sp>
+        <p:sp>
+          <p:nvSpPr>
+            <p:cNvPr id="100" name="Oval 99">
+              <a:extLst>
+                <a:ext uri="{FF2B5EF4-FFF2-40B4-BE49-F238E27FC236}">
+                  <a16:creationId xmlns:a16="http://schemas.microsoft.com/office/drawing/2014/main" id="{02CA3FFD-1D59-8977-D6DF-2730CAFEEB55}"/>
+                </a:ext>
+              </a:extLst>
+            </p:cNvPr>
+            <p:cNvSpPr>
+              <a:spLocks noChangeAspect="1"/>
+            </p:cNvSpPr>
+            <p:nvPr/>
+          </p:nvSpPr>
+          <p:spPr>
+            <a:xfrm>
+              <a:off x="5673524" y="5626696"/>
+              <a:ext cx="91440" cy="91440"/>
+            </a:xfrm>
+            <a:prstGeom prst="ellipse">
+              <a:avLst/>
+            </a:prstGeom>
+            <a:solidFill>
+              <a:schemeClr val="tx1"/>
+            </a:solidFill>
+            <a:ln>
+              <a:noFill/>
+            </a:ln>
+            <a:effectLst>
+              <a:outerShdw dist="23000" sx="1000" sy="1000" rotWithShape="0">
+                <a:srgbClr val="000000"/>
+              </a:outerShdw>
+            </a:effectLst>
+          </p:spPr>
+          <p:style>
+            <a:lnRef idx="1">
+              <a:schemeClr val="accent1"/>
+            </a:lnRef>
+            <a:fillRef idx="3">
+              <a:schemeClr val="accent1"/>
+            </a:fillRef>
+            <a:effectRef idx="2">
+              <a:schemeClr val="accent1"/>
+            </a:effectRef>
+            <a:fontRef idx="minor">
+              <a:schemeClr val="lt1"/>
+            </a:fontRef>
+          </p:style>
+          <p:txBody>
+            <a:bodyPr rtlCol="0" anchor="ctr"/>
+            <a:lstStyle/>
+            <a:p>
+              <a:pPr algn="ctr"/>
+              <a:endParaRPr lang="en-US"/>
+            </a:p>
+          </p:txBody>
+        </p:sp>
+        <p:sp>
+          <p:nvSpPr>
+            <p:cNvPr id="101" name="Oval 100">
+              <a:extLst>
+                <a:ext uri="{FF2B5EF4-FFF2-40B4-BE49-F238E27FC236}">
+                  <a16:creationId xmlns:a16="http://schemas.microsoft.com/office/drawing/2014/main" id="{1FCDD64A-7584-AA53-7A9D-E656267B7566}"/>
+                </a:ext>
+              </a:extLst>
+            </p:cNvPr>
+            <p:cNvSpPr>
+              <a:spLocks noChangeAspect="1"/>
+            </p:cNvSpPr>
+            <p:nvPr/>
+          </p:nvSpPr>
+          <p:spPr>
+            <a:xfrm>
+              <a:off x="5825924" y="5626696"/>
+              <a:ext cx="91440" cy="91440"/>
+            </a:xfrm>
+            <a:prstGeom prst="ellipse">
+              <a:avLst/>
+            </a:prstGeom>
+            <a:solidFill>
+              <a:schemeClr val="tx1"/>
+            </a:solidFill>
+            <a:ln>
+              <a:noFill/>
+            </a:ln>
+            <a:effectLst>
+              <a:outerShdw dist="23000" sx="1000" sy="1000" rotWithShape="0">
+                <a:srgbClr val="000000"/>
+              </a:outerShdw>
+            </a:effectLst>
+          </p:spPr>
+          <p:style>
+            <a:lnRef idx="1">
+              <a:schemeClr val="accent1"/>
+            </a:lnRef>
+            <a:fillRef idx="3">
+              <a:schemeClr val="accent1"/>
+            </a:fillRef>
+            <a:effectRef idx="2">
+              <a:schemeClr val="accent1"/>
+            </a:effectRef>
+            <a:fontRef idx="minor">
+              <a:schemeClr val="lt1"/>
+            </a:fontRef>
+          </p:style>
+          <p:txBody>
+            <a:bodyPr rtlCol="0" anchor="ctr"/>
+            <a:lstStyle/>
+            <a:p>
+              <a:pPr algn="ctr"/>
+              <a:endParaRPr lang="en-US"/>
+            </a:p>
+          </p:txBody>
+        </p:sp>
+      </p:grpSp>
+      <mc:AlternateContent xmlns:mc="http://schemas.openxmlformats.org/markup-compatibility/2006">
+        <mc:Choice xmlns:a14="http://schemas.microsoft.com/office/drawing/2010/main" Requires="a14">
+          <p:sp>
+            <p:nvSpPr>
+              <p:cNvPr id="102" name="TextBox 101">
+                <a:extLst>
+                  <a:ext uri="{FF2B5EF4-FFF2-40B4-BE49-F238E27FC236}">
+                    <a16:creationId xmlns:a16="http://schemas.microsoft.com/office/drawing/2014/main" id="{070328B2-068C-5CF6-3789-1E5E1A7E5D0C}"/>
+                  </a:ext>
+                </a:extLst>
+              </p:cNvPr>
+              <p:cNvSpPr txBox="1"/>
+              <p:nvPr/>
+            </p:nvSpPr>
+            <p:spPr>
+              <a:xfrm>
+                <a:off x="2352825" y="3298050"/>
+                <a:ext cx="1038746" cy="276999"/>
+              </a:xfrm>
+              <a:prstGeom prst="rect">
+                <a:avLst/>
+              </a:prstGeom>
+              <a:noFill/>
+            </p:spPr>
+            <p:txBody>
+              <a:bodyPr wrap="none" lIns="0" tIns="0" rIns="0" bIns="0" rtlCol="0">
+                <a:spAutoFit/>
+              </a:bodyPr>
+              <a:lstStyle/>
+              <a:p>
+                <a14:m>
+                  <m:oMathPara xmlns:m="http://schemas.openxmlformats.org/officeDocument/2006/math">
+                    <m:oMathParaPr>
+                      <m:jc m:val="centerGroup"/>
+                    </m:oMathParaPr>
+                    <m:oMath xmlns:m="http://schemas.openxmlformats.org/officeDocument/2006/math">
+                      <m:sSub>
+                        <m:sSubPr>
+                          <m:ctrlPr>
+                            <a:rPr lang="en-US" b="0" i="1" smtClean="0">
+                              <a:latin typeface="Cambria Math" panose="02040503050406030204" pitchFamily="18" charset="0"/>
+                            </a:rPr>
+                          </m:ctrlPr>
+                        </m:sSubPr>
+                        <m:e>
+                          <m:r>
+                            <a:rPr lang="en-US" b="0" i="1" smtClean="0">
+                              <a:latin typeface="Cambria Math" panose="02040503050406030204" pitchFamily="18" charset="0"/>
+                            </a:rPr>
+                            <m:t>𝑣</m:t>
+                          </m:r>
+                        </m:e>
+                        <m:sub>
+                          <m:r>
+                            <a:rPr lang="en-US" b="0" i="1" smtClean="0">
+                              <a:latin typeface="Cambria Math" panose="02040503050406030204" pitchFamily="18" charset="0"/>
+                            </a:rPr>
+                            <m:t>4</m:t>
+                          </m:r>
+                        </m:sub>
+                      </m:sSub>
+                      <m:r>
+                        <a:rPr lang="en-US" b="0" i="1" smtClean="0">
+                          <a:latin typeface="Cambria Math" panose="02040503050406030204" pitchFamily="18" charset="0"/>
+                        </a:rPr>
+                        <m:t>=</m:t>
+                      </m:r>
+                      <m:sSub>
+                        <m:sSubPr>
+                          <m:ctrlPr>
+                            <a:rPr lang="en-US" b="0" i="1" smtClean="0">
+                              <a:latin typeface="Cambria Math" panose="02040503050406030204" pitchFamily="18" charset="0"/>
+                            </a:rPr>
+                          </m:ctrlPr>
+                        </m:sSubPr>
+                        <m:e>
+                          <m:r>
+                            <a:rPr lang="en-US" b="0" i="1" smtClean="0">
+                              <a:latin typeface="Cambria Math" panose="02040503050406030204" pitchFamily="18" charset="0"/>
+                            </a:rPr>
+                            <m:t>𝑘</m:t>
+                          </m:r>
+                        </m:e>
+                        <m:sub>
+                          <m:r>
+                            <a:rPr lang="en-US" b="0" i="1" smtClean="0">
+                              <a:latin typeface="Cambria Math" panose="02040503050406030204" pitchFamily="18" charset="0"/>
+                            </a:rPr>
+                            <m:t>4</m:t>
+                          </m:r>
+                        </m:sub>
+                      </m:sSub>
+                      <m:sSub>
+                        <m:sSubPr>
+                          <m:ctrlPr>
+                            <a:rPr lang="en-US" b="0" i="1" smtClean="0">
+                              <a:latin typeface="Cambria Math" panose="02040503050406030204" pitchFamily="18" charset="0"/>
+                            </a:rPr>
+                          </m:ctrlPr>
+                        </m:sSubPr>
+                        <m:e>
+                          <m:r>
+                            <a:rPr lang="en-US" b="0" i="1" smtClean="0">
+                              <a:latin typeface="Cambria Math" panose="02040503050406030204" pitchFamily="18" charset="0"/>
+                            </a:rPr>
+                            <m:t>𝑆</m:t>
+                          </m:r>
+                        </m:e>
+                        <m:sub>
+                          <m:r>
+                            <a:rPr lang="en-US" b="0" i="1" smtClean="0">
+                              <a:latin typeface="Cambria Math" panose="02040503050406030204" pitchFamily="18" charset="0"/>
+                            </a:rPr>
+                            <m:t>3</m:t>
+                          </m:r>
+                        </m:sub>
+                      </m:sSub>
+                    </m:oMath>
+                  </m:oMathPara>
+                </a14:m>
+                <a:endParaRPr lang="en-US" dirty="0"/>
+              </a:p>
+            </p:txBody>
+          </p:sp>
+        </mc:Choice>
+        <mc:Fallback>
+          <p:sp>
+            <p:nvSpPr>
+              <p:cNvPr id="102" name="TextBox 101">
+                <a:extLst>
+                  <a:ext uri="{FF2B5EF4-FFF2-40B4-BE49-F238E27FC236}">
+                    <a16:creationId xmlns:a16="http://schemas.microsoft.com/office/drawing/2014/main" id="{070328B2-068C-5CF6-3789-1E5E1A7E5D0C}"/>
+                  </a:ext>
+                </a:extLst>
+              </p:cNvPr>
+              <p:cNvSpPr txBox="1">
+                <a:spLocks noRot="1" noChangeAspect="1" noMove="1" noResize="1" noEditPoints="1" noAdjustHandles="1" noChangeArrowheads="1" noChangeShapeType="1" noTextEdit="1"/>
+              </p:cNvSpPr>
+              <p:nvPr/>
+            </p:nvSpPr>
+            <p:spPr>
+              <a:xfrm>
+                <a:off x="2352825" y="3298050"/>
+                <a:ext cx="1038746" cy="276999"/>
+              </a:xfrm>
+              <a:prstGeom prst="rect">
+                <a:avLst/>
+              </a:prstGeom>
+              <a:blipFill>
+                <a:blip r:embed="rId7"/>
+                <a:stretch>
+                  <a:fillRect l="-2439" r="-1220" b="-17391"/>
+                </a:stretch>
+              </a:blipFill>
+            </p:spPr>
+            <p:txBody>
+              <a:bodyPr/>
+              <a:lstStyle/>
+              <a:p>
+                <a:r>
+                  <a:rPr lang="en-US">
+                    <a:noFill/>
+                  </a:rPr>
+                  <a:t> </a:t>
+                </a:r>
+              </a:p>
+            </p:txBody>
+          </p:sp>
+        </mc:Fallback>
+      </mc:AlternateContent>
+      <mc:AlternateContent xmlns:mc="http://schemas.openxmlformats.org/markup-compatibility/2006">
+        <mc:Choice xmlns:a14="http://schemas.microsoft.com/office/drawing/2010/main" Requires="a14">
+          <p:sp>
+            <p:nvSpPr>
+              <p:cNvPr id="104" name="TextBox 103">
+                <a:extLst>
+                  <a:ext uri="{FF2B5EF4-FFF2-40B4-BE49-F238E27FC236}">
+                    <a16:creationId xmlns:a16="http://schemas.microsoft.com/office/drawing/2014/main" id="{9DCCBFBE-5916-3030-E1A0-5E9DDB71A4B5}"/>
+                  </a:ext>
+                </a:extLst>
+              </p:cNvPr>
+              <p:cNvSpPr txBox="1"/>
+              <p:nvPr/>
+            </p:nvSpPr>
+            <p:spPr>
+              <a:xfrm>
+                <a:off x="6653509" y="3284713"/>
+                <a:ext cx="2044599" cy="303673"/>
+              </a:xfrm>
+              <a:prstGeom prst="rect">
+                <a:avLst/>
+              </a:prstGeom>
+              <a:noFill/>
+            </p:spPr>
+            <p:txBody>
+              <a:bodyPr wrap="none" lIns="0" tIns="0" rIns="0" bIns="0" rtlCol="0">
+                <a:spAutoFit/>
+              </a:bodyPr>
+              <a:lstStyle/>
+              <a:p>
+                <a14:m>
+                  <m:oMathPara xmlns:m="http://schemas.openxmlformats.org/officeDocument/2006/math">
+                    <m:oMathParaPr>
+                      <m:jc m:val="centerGroup"/>
+                    </m:oMathParaPr>
+                    <m:oMath xmlns:m="http://schemas.openxmlformats.org/officeDocument/2006/math">
+                      <m:sSub>
+                        <m:sSubPr>
+                          <m:ctrlPr>
+                            <a:rPr lang="en-US" b="0" i="1" smtClean="0">
+                              <a:latin typeface="Cambria Math" panose="02040503050406030204" pitchFamily="18" charset="0"/>
+                            </a:rPr>
+                          </m:ctrlPr>
+                        </m:sSubPr>
+                        <m:e>
+                          <m:r>
+                            <a:rPr lang="en-US" b="0" i="1" smtClean="0">
+                              <a:latin typeface="Cambria Math" panose="02040503050406030204" pitchFamily="18" charset="0"/>
+                            </a:rPr>
+                            <m:t>𝑣</m:t>
+                          </m:r>
+                        </m:e>
+                        <m:sub>
+                          <m:r>
+                            <a:rPr lang="en-US" b="0" i="1" smtClean="0">
+                              <a:latin typeface="Cambria Math" panose="02040503050406030204" pitchFamily="18" charset="0"/>
+                            </a:rPr>
+                            <m:t>𝑁</m:t>
+                          </m:r>
+                          <m:r>
+                            <a:rPr lang="en-US" b="0" i="1" smtClean="0">
+                              <a:latin typeface="Cambria Math" panose="02040503050406030204" pitchFamily="18" charset="0"/>
+                            </a:rPr>
+                            <m:t>−1</m:t>
+                          </m:r>
+                        </m:sub>
+                      </m:sSub>
+                      <m:r>
+                        <a:rPr lang="en-US" b="0" i="1" smtClean="0">
+                          <a:latin typeface="Cambria Math" panose="02040503050406030204" pitchFamily="18" charset="0"/>
+                        </a:rPr>
+                        <m:t>=</m:t>
+                      </m:r>
+                      <m:sSub>
+                        <m:sSubPr>
+                          <m:ctrlPr>
+                            <a:rPr lang="en-US" b="0" i="1" smtClean="0">
+                              <a:latin typeface="Cambria Math" panose="02040503050406030204" pitchFamily="18" charset="0"/>
+                            </a:rPr>
+                          </m:ctrlPr>
+                        </m:sSubPr>
+                        <m:e>
+                          <m:r>
+                            <a:rPr lang="en-US" b="0" i="1" smtClean="0">
+                              <a:latin typeface="Cambria Math" panose="02040503050406030204" pitchFamily="18" charset="0"/>
+                            </a:rPr>
+                            <m:t>𝑘</m:t>
+                          </m:r>
+                        </m:e>
+                        <m:sub>
+                          <m:r>
+                            <a:rPr lang="en-US" b="0" i="1" smtClean="0">
+                              <a:latin typeface="Cambria Math" panose="02040503050406030204" pitchFamily="18" charset="0"/>
+                            </a:rPr>
+                            <m:t>2(</m:t>
+                          </m:r>
+                          <m:r>
+                            <a:rPr lang="en-US" b="0" i="1" smtClean="0">
+                              <a:latin typeface="Cambria Math" panose="02040503050406030204" pitchFamily="18" charset="0"/>
+                            </a:rPr>
+                            <m:t>𝑁</m:t>
+                          </m:r>
+                          <m:r>
+                            <a:rPr lang="en-US" b="0" i="1" smtClean="0">
+                              <a:latin typeface="Cambria Math" panose="02040503050406030204" pitchFamily="18" charset="0"/>
+                            </a:rPr>
+                            <m:t>−1)</m:t>
+                          </m:r>
+                        </m:sub>
+                      </m:sSub>
+                      <m:sSub>
+                        <m:sSubPr>
+                          <m:ctrlPr>
+                            <a:rPr lang="en-US" b="0" i="1" smtClean="0">
+                              <a:latin typeface="Cambria Math" panose="02040503050406030204" pitchFamily="18" charset="0"/>
+                            </a:rPr>
+                          </m:ctrlPr>
+                        </m:sSubPr>
+                        <m:e>
+                          <m:r>
+                            <a:rPr lang="en-US" b="0" i="1" smtClean="0">
+                              <a:latin typeface="Cambria Math" panose="02040503050406030204" pitchFamily="18" charset="0"/>
+                            </a:rPr>
+                            <m:t>𝑆</m:t>
+                          </m:r>
+                        </m:e>
+                        <m:sub>
+                          <m:r>
+                            <a:rPr lang="en-US" b="0" i="1" smtClean="0">
+                              <a:latin typeface="Cambria Math" panose="02040503050406030204" pitchFamily="18" charset="0"/>
+                            </a:rPr>
+                            <m:t>𝑁</m:t>
+                          </m:r>
+                          <m:r>
+                            <a:rPr lang="en-US" b="0" i="1" smtClean="0">
+                              <a:latin typeface="Cambria Math" panose="02040503050406030204" pitchFamily="18" charset="0"/>
+                            </a:rPr>
+                            <m:t>−1</m:t>
+                          </m:r>
+                        </m:sub>
+                      </m:sSub>
+                    </m:oMath>
+                  </m:oMathPara>
+                </a14:m>
+                <a:endParaRPr lang="en-US" b="0" dirty="0"/>
+              </a:p>
+            </p:txBody>
+          </p:sp>
+        </mc:Choice>
+        <mc:Fallback>
+          <p:sp>
+            <p:nvSpPr>
+              <p:cNvPr id="104" name="TextBox 103">
+                <a:extLst>
+                  <a:ext uri="{FF2B5EF4-FFF2-40B4-BE49-F238E27FC236}">
+                    <a16:creationId xmlns:a16="http://schemas.microsoft.com/office/drawing/2014/main" id="{9DCCBFBE-5916-3030-E1A0-5E9DDB71A4B5}"/>
+                  </a:ext>
+                </a:extLst>
+              </p:cNvPr>
+              <p:cNvSpPr txBox="1">
+                <a:spLocks noRot="1" noChangeAspect="1" noMove="1" noResize="1" noEditPoints="1" noAdjustHandles="1" noChangeArrowheads="1" noChangeShapeType="1" noTextEdit="1"/>
+              </p:cNvSpPr>
+              <p:nvPr/>
+            </p:nvSpPr>
+            <p:spPr>
+              <a:xfrm>
+                <a:off x="6653509" y="3284713"/>
+                <a:ext cx="2044599" cy="303673"/>
+              </a:xfrm>
+              <a:prstGeom prst="rect">
+                <a:avLst/>
+              </a:prstGeom>
+              <a:blipFill>
+                <a:blip r:embed="rId8"/>
+                <a:stretch>
+                  <a:fillRect l="-617" b="-24000"/>
+                </a:stretch>
+              </a:blipFill>
+            </p:spPr>
+            <p:txBody>
+              <a:bodyPr/>
+              <a:lstStyle/>
+              <a:p>
+                <a:r>
+                  <a:rPr lang="en-US">
+                    <a:noFill/>
+                  </a:rPr>
+                  <a:t> </a:t>
+                </a:r>
+              </a:p>
+            </p:txBody>
+          </p:sp>
+        </mc:Fallback>
+      </mc:AlternateContent>
+      <mc:AlternateContent xmlns:mc="http://schemas.openxmlformats.org/markup-compatibility/2006">
+        <mc:Choice xmlns:a14="http://schemas.microsoft.com/office/drawing/2010/main" Requires="a14">
+          <p:sp>
+            <p:nvSpPr>
+              <p:cNvPr id="106" name="TextBox 105">
+                <a:extLst>
+                  <a:ext uri="{FF2B5EF4-FFF2-40B4-BE49-F238E27FC236}">
+                    <a16:creationId xmlns:a16="http://schemas.microsoft.com/office/drawing/2014/main" id="{0EF08F40-09C5-CC0E-668A-5AF992F7A172}"/>
+                  </a:ext>
+                </a:extLst>
+              </p:cNvPr>
+              <p:cNvSpPr txBox="1"/>
+              <p:nvPr/>
+            </p:nvSpPr>
+            <p:spPr>
+              <a:xfrm>
+                <a:off x="5966963" y="1856339"/>
+                <a:ext cx="2722605" cy="296556"/>
+              </a:xfrm>
+              <a:prstGeom prst="rect">
+                <a:avLst/>
+              </a:prstGeom>
+              <a:noFill/>
+            </p:spPr>
+            <p:txBody>
+              <a:bodyPr wrap="none" lIns="0" tIns="0" rIns="0" bIns="0" rtlCol="0">
+                <a:spAutoFit/>
+              </a:bodyPr>
+              <a:lstStyle/>
+              <a:p>
+                <a14:m>
+                  <m:oMathPara xmlns:m="http://schemas.openxmlformats.org/officeDocument/2006/math">
+                    <m:oMathParaPr>
+                      <m:jc m:val="centerGroup"/>
+                    </m:oMathParaPr>
+                    <m:oMath xmlns:m="http://schemas.openxmlformats.org/officeDocument/2006/math">
+                      <m:sSub>
+                        <m:sSubPr>
+                          <m:ctrlPr>
+                            <a:rPr lang="en-US" b="0" i="1" smtClean="0">
+                              <a:latin typeface="Cambria Math" panose="02040503050406030204" pitchFamily="18" charset="0"/>
+                            </a:rPr>
+                          </m:ctrlPr>
+                        </m:sSubPr>
+                        <m:e>
+                          <m:r>
+                            <a:rPr lang="en-US" b="0" i="1" smtClean="0">
+                              <a:latin typeface="Cambria Math" panose="02040503050406030204" pitchFamily="18" charset="0"/>
+                            </a:rPr>
+                            <m:t>𝑣</m:t>
+                          </m:r>
+                        </m:e>
+                        <m:sub>
+                          <m:r>
+                            <a:rPr lang="en-US" b="0" i="1" smtClean="0">
+                              <a:latin typeface="Cambria Math" panose="02040503050406030204" pitchFamily="18" charset="0"/>
+                            </a:rPr>
+                            <m:t>2</m:t>
+                          </m:r>
+                          <m:d>
+                            <m:dPr>
+                              <m:ctrlPr>
+                                <a:rPr lang="en-US" b="0" i="1" smtClean="0">
+                                  <a:latin typeface="Cambria Math" panose="02040503050406030204" pitchFamily="18" charset="0"/>
+                                </a:rPr>
+                              </m:ctrlPr>
+                            </m:dPr>
+                            <m:e>
+                              <m:r>
+                                <a:rPr lang="en-US" b="0" i="1" smtClean="0">
+                                  <a:latin typeface="Cambria Math" panose="02040503050406030204" pitchFamily="18" charset="0"/>
+                                </a:rPr>
+                                <m:t>𝑁</m:t>
+                              </m:r>
+                              <m:r>
+                                <a:rPr lang="en-US" b="0" i="1" smtClean="0">
+                                  <a:latin typeface="Cambria Math" panose="02040503050406030204" pitchFamily="18" charset="0"/>
+                                </a:rPr>
+                                <m:t>−1</m:t>
+                              </m:r>
+                            </m:e>
+                          </m:d>
+                          <m:r>
+                            <a:rPr lang="en-US" b="0" i="1" smtClean="0">
+                              <a:latin typeface="Cambria Math" panose="02040503050406030204" pitchFamily="18" charset="0"/>
+                            </a:rPr>
+                            <m:t>−1</m:t>
+                          </m:r>
+                        </m:sub>
+                      </m:sSub>
+                      <m:r>
+                        <a:rPr lang="en-US" b="0" i="1" smtClean="0">
+                          <a:latin typeface="Cambria Math" panose="02040503050406030204" pitchFamily="18" charset="0"/>
+                        </a:rPr>
+                        <m:t>=</m:t>
+                      </m:r>
+                      <m:sSub>
+                        <m:sSubPr>
+                          <m:ctrlPr>
+                            <a:rPr lang="en-US" b="0" i="1" smtClean="0">
+                              <a:latin typeface="Cambria Math" panose="02040503050406030204" pitchFamily="18" charset="0"/>
+                            </a:rPr>
+                          </m:ctrlPr>
+                        </m:sSubPr>
+                        <m:e>
+                          <m:r>
+                            <a:rPr lang="en-US" b="0" i="1" smtClean="0">
+                              <a:latin typeface="Cambria Math" panose="02040503050406030204" pitchFamily="18" charset="0"/>
+                            </a:rPr>
+                            <m:t>𝑘</m:t>
+                          </m:r>
+                        </m:e>
+                        <m:sub>
+                          <m:r>
+                            <a:rPr lang="en-US" b="0" i="1" smtClean="0">
+                              <a:latin typeface="Cambria Math" panose="02040503050406030204" pitchFamily="18" charset="0"/>
+                            </a:rPr>
+                            <m:t>2</m:t>
+                          </m:r>
+                          <m:d>
+                            <m:dPr>
+                              <m:ctrlPr>
+                                <a:rPr lang="en-US" b="0" i="1" smtClean="0">
+                                  <a:latin typeface="Cambria Math" panose="02040503050406030204" pitchFamily="18" charset="0"/>
+                                </a:rPr>
+                              </m:ctrlPr>
+                            </m:dPr>
+                            <m:e>
+                              <m:r>
+                                <a:rPr lang="en-US" b="0" i="1" smtClean="0">
+                                  <a:latin typeface="Cambria Math" panose="02040503050406030204" pitchFamily="18" charset="0"/>
+                                </a:rPr>
+                                <m:t>𝑁</m:t>
+                              </m:r>
+                              <m:r>
+                                <a:rPr lang="en-US" b="0" i="1" smtClean="0">
+                                  <a:latin typeface="Cambria Math" panose="02040503050406030204" pitchFamily="18" charset="0"/>
+                                </a:rPr>
+                                <m:t>−1</m:t>
+                              </m:r>
+                            </m:e>
+                          </m:d>
+                          <m:r>
+                            <a:rPr lang="en-US" b="0" i="1" smtClean="0">
+                              <a:latin typeface="Cambria Math" panose="02040503050406030204" pitchFamily="18" charset="0"/>
+                            </a:rPr>
+                            <m:t>−1</m:t>
+                          </m:r>
+                        </m:sub>
+                      </m:sSub>
+                      <m:sSub>
+                        <m:sSubPr>
+                          <m:ctrlPr>
+                            <a:rPr lang="en-US" b="0" i="1" smtClean="0">
+                              <a:latin typeface="Cambria Math" panose="02040503050406030204" pitchFamily="18" charset="0"/>
+                            </a:rPr>
+                          </m:ctrlPr>
+                        </m:sSubPr>
+                        <m:e>
+                          <m:r>
+                            <a:rPr lang="en-US" b="0" i="1" smtClean="0">
+                              <a:latin typeface="Cambria Math" panose="02040503050406030204" pitchFamily="18" charset="0"/>
+                            </a:rPr>
+                            <m:t>𝑆</m:t>
+                          </m:r>
+                        </m:e>
+                        <m:sub>
+                          <m:r>
+                            <a:rPr lang="en-US" b="0" i="1" smtClean="0">
+                              <a:latin typeface="Cambria Math" panose="02040503050406030204" pitchFamily="18" charset="0"/>
+                            </a:rPr>
+                            <m:t>𝑁</m:t>
+                          </m:r>
+                          <m:r>
+                            <a:rPr lang="en-US" b="0" i="1" smtClean="0">
+                              <a:latin typeface="Cambria Math" panose="02040503050406030204" pitchFamily="18" charset="0"/>
+                            </a:rPr>
+                            <m:t>−1</m:t>
+                          </m:r>
+                        </m:sub>
+                      </m:sSub>
+                    </m:oMath>
+                  </m:oMathPara>
+                </a14:m>
+                <a:endParaRPr lang="en-US" dirty="0"/>
+              </a:p>
+            </p:txBody>
+          </p:sp>
+        </mc:Choice>
+        <mc:Fallback>
+          <p:sp>
+            <p:nvSpPr>
+              <p:cNvPr id="106" name="TextBox 105">
+                <a:extLst>
+                  <a:ext uri="{FF2B5EF4-FFF2-40B4-BE49-F238E27FC236}">
+                    <a16:creationId xmlns:a16="http://schemas.microsoft.com/office/drawing/2014/main" id="{0EF08F40-09C5-CC0E-668A-5AF992F7A172}"/>
+                  </a:ext>
+                </a:extLst>
+              </p:cNvPr>
+              <p:cNvSpPr txBox="1">
+                <a:spLocks noRot="1" noChangeAspect="1" noMove="1" noResize="1" noEditPoints="1" noAdjustHandles="1" noChangeArrowheads="1" noChangeShapeType="1" noTextEdit="1"/>
+              </p:cNvSpPr>
+              <p:nvPr/>
+            </p:nvSpPr>
+            <p:spPr>
+              <a:xfrm>
+                <a:off x="5966963" y="1856339"/>
+                <a:ext cx="2722605" cy="296556"/>
+              </a:xfrm>
+              <a:prstGeom prst="rect">
+                <a:avLst/>
+              </a:prstGeom>
+              <a:blipFill>
+                <a:blip r:embed="rId9"/>
+                <a:stretch>
+                  <a:fillRect l="-465" b="-4167"/>
+                </a:stretch>
+              </a:blipFill>
+            </p:spPr>
+            <p:txBody>
+              <a:bodyPr/>
+              <a:lstStyle/>
+              <a:p>
+                <a:r>
+                  <a:rPr lang="en-US">
+                    <a:noFill/>
+                  </a:rPr>
+                  <a:t> </a:t>
+                </a:r>
+              </a:p>
+            </p:txBody>
+          </p:sp>
+        </mc:Fallback>
+      </mc:AlternateContent>
+      <p:cxnSp>
+        <p:nvCxnSpPr>
+          <p:cNvPr id="107" name="Straight Arrow Connector 106">
+            <a:extLst>
+              <a:ext uri="{FF2B5EF4-FFF2-40B4-BE49-F238E27FC236}">
+                <a16:creationId xmlns:a16="http://schemas.microsoft.com/office/drawing/2014/main" id="{5C154090-2A6E-7E5A-EF30-AF0015B4D4B5}"/>
+              </a:ext>
+            </a:extLst>
+          </p:cNvPr>
+          <p:cNvCxnSpPr>
+            <a:cxnSpLocks/>
+          </p:cNvCxnSpPr>
+          <p:nvPr/>
+        </p:nvCxnSpPr>
+        <p:spPr>
+          <a:xfrm>
+            <a:off x="3013631" y="958340"/>
+            <a:ext cx="0" cy="983848"/>
+          </a:xfrm>
+          <a:prstGeom prst="straightConnector1">
+            <a:avLst/>
+          </a:prstGeom>
+          <a:ln w="38100">
+            <a:solidFill>
+              <a:schemeClr val="tx1"/>
+            </a:solidFill>
+            <a:tailEnd type="triangle"/>
+          </a:ln>
+          <a:effectLst>
+            <a:outerShdw dist="20000" sx="1000" sy="1000" rotWithShape="0">
+              <a:srgbClr val="000000"/>
+            </a:outerShdw>
+          </a:effectLst>
+        </p:spPr>
+        <p:style>
+          <a:lnRef idx="2">
+            <a:schemeClr val="accent1"/>
+          </a:lnRef>
+          <a:fillRef idx="0">
+            <a:schemeClr val="accent1"/>
+          </a:fillRef>
+          <a:effectRef idx="1">
+            <a:schemeClr val="accent1"/>
+          </a:effectRef>
+          <a:fontRef idx="minor">
+            <a:schemeClr val="tx1"/>
+          </a:fontRef>
+        </p:style>
+      </p:cxnSp>
+      <p:cxnSp>
+        <p:nvCxnSpPr>
+          <p:cNvPr id="108" name="Straight Arrow Connector 107">
+            <a:extLst>
+              <a:ext uri="{FF2B5EF4-FFF2-40B4-BE49-F238E27FC236}">
+                <a16:creationId xmlns:a16="http://schemas.microsoft.com/office/drawing/2014/main" id="{02A127AC-7688-6EF9-0074-0C271E98DE64}"/>
+              </a:ext>
+            </a:extLst>
+          </p:cNvPr>
+          <p:cNvCxnSpPr>
+            <a:cxnSpLocks/>
+          </p:cNvCxnSpPr>
+          <p:nvPr/>
+        </p:nvCxnSpPr>
+        <p:spPr>
+          <a:xfrm>
+            <a:off x="4173028" y="944009"/>
+            <a:ext cx="0" cy="983848"/>
+          </a:xfrm>
+          <a:prstGeom prst="straightConnector1">
+            <a:avLst/>
+          </a:prstGeom>
+          <a:ln w="38100">
+            <a:solidFill>
+              <a:schemeClr val="tx1"/>
+            </a:solidFill>
+            <a:tailEnd type="triangle"/>
+          </a:ln>
+          <a:effectLst>
+            <a:outerShdw dist="20000" sx="1000" sy="1000" rotWithShape="0">
+              <a:srgbClr val="000000"/>
+            </a:outerShdw>
+          </a:effectLst>
+        </p:spPr>
+        <p:style>
+          <a:lnRef idx="2">
+            <a:schemeClr val="accent1"/>
+          </a:lnRef>
+          <a:fillRef idx="0">
+            <a:schemeClr val="accent1"/>
+          </a:fillRef>
+          <a:effectRef idx="1">
+            <a:schemeClr val="accent1"/>
+          </a:effectRef>
+          <a:fontRef idx="minor">
+            <a:schemeClr val="tx1"/>
+          </a:fontRef>
+        </p:style>
+      </p:cxnSp>
+      <p:cxnSp>
+        <p:nvCxnSpPr>
+          <p:cNvPr id="109" name="Straight Arrow Connector 108">
+            <a:extLst>
+              <a:ext uri="{FF2B5EF4-FFF2-40B4-BE49-F238E27FC236}">
+                <a16:creationId xmlns:a16="http://schemas.microsoft.com/office/drawing/2014/main" id="{09DE27C0-5E72-518D-52F2-568F70ACA8B7}"/>
+              </a:ext>
+            </a:extLst>
+          </p:cNvPr>
+          <p:cNvCxnSpPr>
+            <a:cxnSpLocks/>
+          </p:cNvCxnSpPr>
+          <p:nvPr/>
+        </p:nvCxnSpPr>
+        <p:spPr>
+          <a:xfrm>
+            <a:off x="7328265" y="872491"/>
+            <a:ext cx="0" cy="983848"/>
+          </a:xfrm>
+          <a:prstGeom prst="straightConnector1">
+            <a:avLst/>
+          </a:prstGeom>
+          <a:ln w="38100">
+            <a:solidFill>
+              <a:schemeClr val="tx1"/>
+            </a:solidFill>
+            <a:tailEnd type="triangle"/>
+          </a:ln>
+          <a:effectLst>
+            <a:outerShdw dist="20000" sx="1000" sy="1000" rotWithShape="0">
+              <a:srgbClr val="000000"/>
+            </a:outerShdw>
+          </a:effectLst>
+        </p:spPr>
+        <p:style>
+          <a:lnRef idx="2">
+            <a:schemeClr val="accent1"/>
+          </a:lnRef>
+          <a:fillRef idx="0">
+            <a:schemeClr val="accent1"/>
+          </a:fillRef>
+          <a:effectRef idx="1">
+            <a:schemeClr val="accent1"/>
+          </a:effectRef>
+          <a:fontRef idx="minor">
+            <a:schemeClr val="tx1"/>
+          </a:fontRef>
+        </p:style>
+      </p:cxnSp>
+      <mc:AlternateContent xmlns:mc="http://schemas.openxmlformats.org/markup-compatibility/2006">
+        <mc:Choice xmlns:a14="http://schemas.microsoft.com/office/drawing/2010/main" Requires="a14">
+          <p:sp>
+            <p:nvSpPr>
+              <p:cNvPr id="111" name="TextBox 110">
+                <a:extLst>
+                  <a:ext uri="{FF2B5EF4-FFF2-40B4-BE49-F238E27FC236}">
+                    <a16:creationId xmlns:a16="http://schemas.microsoft.com/office/drawing/2014/main" id="{B20E10CA-BE06-4116-3BFC-01F8E4784B6B}"/>
+                  </a:ext>
+                </a:extLst>
+              </p:cNvPr>
+              <p:cNvSpPr txBox="1"/>
+              <p:nvPr/>
+            </p:nvSpPr>
+            <p:spPr>
+              <a:xfrm>
+                <a:off x="3549325" y="3311387"/>
+                <a:ext cx="1048620" cy="276999"/>
+              </a:xfrm>
+              <a:prstGeom prst="rect">
+                <a:avLst/>
+              </a:prstGeom>
+              <a:noFill/>
+            </p:spPr>
+            <p:txBody>
+              <a:bodyPr wrap="none" lIns="0" tIns="0" rIns="0" bIns="0" rtlCol="0">
+                <a:spAutoFit/>
+              </a:bodyPr>
+              <a:lstStyle/>
+              <a:p>
+                <a14:m>
+                  <m:oMathPara xmlns:m="http://schemas.openxmlformats.org/officeDocument/2006/math">
+                    <m:oMathParaPr>
+                      <m:jc m:val="centerGroup"/>
+                    </m:oMathParaPr>
+                    <m:oMath xmlns:m="http://schemas.openxmlformats.org/officeDocument/2006/math">
+                      <m:sSub>
+                        <m:sSubPr>
+                          <m:ctrlPr>
+                            <a:rPr lang="en-US" b="0" i="1" smtClean="0">
+                              <a:latin typeface="Cambria Math" panose="02040503050406030204" pitchFamily="18" charset="0"/>
+                            </a:rPr>
+                          </m:ctrlPr>
+                        </m:sSubPr>
+                        <m:e>
+                          <m:r>
+                            <a:rPr lang="en-US" b="0" i="1" smtClean="0">
+                              <a:latin typeface="Cambria Math" panose="02040503050406030204" pitchFamily="18" charset="0"/>
+                            </a:rPr>
+                            <m:t>𝑣</m:t>
+                          </m:r>
+                        </m:e>
+                        <m:sub>
+                          <m:r>
+                            <a:rPr lang="en-US" b="0" i="1" smtClean="0">
+                              <a:latin typeface="Cambria Math" panose="02040503050406030204" pitchFamily="18" charset="0"/>
+                            </a:rPr>
+                            <m:t>3</m:t>
+                          </m:r>
+                        </m:sub>
+                      </m:sSub>
+                      <m:r>
+                        <a:rPr lang="en-US" b="0" i="1" smtClean="0">
+                          <a:latin typeface="Cambria Math" panose="02040503050406030204" pitchFamily="18" charset="0"/>
+                        </a:rPr>
+                        <m:t>=</m:t>
+                      </m:r>
+                      <m:sSub>
+                        <m:sSubPr>
+                          <m:ctrlPr>
+                            <a:rPr lang="en-US" b="0" i="1" smtClean="0">
+                              <a:latin typeface="Cambria Math" panose="02040503050406030204" pitchFamily="18" charset="0"/>
+                            </a:rPr>
+                          </m:ctrlPr>
+                        </m:sSubPr>
+                        <m:e>
+                          <m:r>
+                            <a:rPr lang="en-US" b="0" i="1" smtClean="0">
+                              <a:latin typeface="Cambria Math" panose="02040503050406030204" pitchFamily="18" charset="0"/>
+                            </a:rPr>
+                            <m:t>𝑘</m:t>
+                          </m:r>
+                        </m:e>
+                        <m:sub>
+                          <m:r>
+                            <a:rPr lang="en-US" b="0" i="1" smtClean="0">
+                              <a:latin typeface="Cambria Math" panose="02040503050406030204" pitchFamily="18" charset="0"/>
+                            </a:rPr>
+                            <m:t>6</m:t>
+                          </m:r>
+                        </m:sub>
+                      </m:sSub>
+                      <m:sSub>
+                        <m:sSubPr>
+                          <m:ctrlPr>
+                            <a:rPr lang="en-US" b="0" i="1" smtClean="0">
+                              <a:latin typeface="Cambria Math" panose="02040503050406030204" pitchFamily="18" charset="0"/>
+                            </a:rPr>
+                          </m:ctrlPr>
+                        </m:sSubPr>
+                        <m:e>
+                          <m:r>
+                            <a:rPr lang="en-US" b="0" i="1" smtClean="0">
+                              <a:latin typeface="Cambria Math" panose="02040503050406030204" pitchFamily="18" charset="0"/>
+                            </a:rPr>
+                            <m:t>𝑆</m:t>
+                          </m:r>
+                        </m:e>
+                        <m:sub>
+                          <m:r>
+                            <a:rPr lang="en-US" b="0" i="1" smtClean="0">
+                              <a:latin typeface="Cambria Math" panose="02040503050406030204" pitchFamily="18" charset="0"/>
+                            </a:rPr>
+                            <m:t>3</m:t>
+                          </m:r>
+                        </m:sub>
+                      </m:sSub>
+                    </m:oMath>
+                  </m:oMathPara>
+                </a14:m>
+                <a:endParaRPr lang="en-US" dirty="0"/>
+              </a:p>
+            </p:txBody>
+          </p:sp>
+        </mc:Choice>
+        <mc:Fallback>
+          <p:sp>
+            <p:nvSpPr>
+              <p:cNvPr id="111" name="TextBox 110">
+                <a:extLst>
+                  <a:ext uri="{FF2B5EF4-FFF2-40B4-BE49-F238E27FC236}">
+                    <a16:creationId xmlns:a16="http://schemas.microsoft.com/office/drawing/2014/main" id="{B20E10CA-BE06-4116-3BFC-01F8E4784B6B}"/>
+                  </a:ext>
+                </a:extLst>
+              </p:cNvPr>
+              <p:cNvSpPr txBox="1">
+                <a:spLocks noRot="1" noChangeAspect="1" noMove="1" noResize="1" noEditPoints="1" noAdjustHandles="1" noChangeArrowheads="1" noChangeShapeType="1" noTextEdit="1"/>
+              </p:cNvSpPr>
+              <p:nvPr/>
+            </p:nvSpPr>
+            <p:spPr>
+              <a:xfrm>
+                <a:off x="3549325" y="3311387"/>
+                <a:ext cx="1048620" cy="276999"/>
+              </a:xfrm>
+              <a:prstGeom prst="rect">
+                <a:avLst/>
+              </a:prstGeom>
+              <a:blipFill>
+                <a:blip r:embed="rId10"/>
+                <a:stretch>
+                  <a:fillRect l="-2410" r="-1205" b="-17391"/>
+                </a:stretch>
+              </a:blipFill>
+            </p:spPr>
+            <p:txBody>
+              <a:bodyPr/>
+              <a:lstStyle/>
+              <a:p>
+                <a:r>
+                  <a:rPr lang="en-US">
+                    <a:noFill/>
+                  </a:rPr>
+                  <a:t> </a:t>
+                </a:r>
+              </a:p>
+            </p:txBody>
+          </p:sp>
+        </mc:Fallback>
+      </mc:AlternateContent>
+    </p:spTree>
+    <p:extLst>
+      <p:ext uri="{BB962C8B-B14F-4D97-AF65-F5344CB8AC3E}">
+        <p14:creationId xmlns:p14="http://schemas.microsoft.com/office/powerpoint/2010/main" val="3905642403"/>
       </p:ext>
     </p:extLst>
   </p:cSld>

</xml_diff>